<commit_message>
Added slides on MonoBehaviour and physics methods
</commit_message>
<xml_diff>
--- a/ST_Unity_101.pptx
+++ b/ST_Unity_101.pptx
@@ -5,7 +5,7 @@
     <p:sldMasterId id="2147483648" r:id="rId1"/>
   </p:sldMasterIdLst>
   <p:notesMasterIdLst>
-    <p:notesMasterId r:id="rId38"/>
+    <p:notesMasterId r:id="rId40"/>
   </p:notesMasterIdLst>
   <p:sldIdLst>
     <p:sldId id="256" r:id="rId2"/>
@@ -19,31 +19,33 @@
     <p:sldId id="273" r:id="rId10"/>
     <p:sldId id="274" r:id="rId11"/>
     <p:sldId id="262" r:id="rId12"/>
-    <p:sldId id="260" r:id="rId13"/>
-    <p:sldId id="261" r:id="rId14"/>
-    <p:sldId id="289" r:id="rId15"/>
-    <p:sldId id="290" r:id="rId16"/>
-    <p:sldId id="275" r:id="rId17"/>
-    <p:sldId id="264" r:id="rId18"/>
-    <p:sldId id="263" r:id="rId19"/>
-    <p:sldId id="276" r:id="rId20"/>
-    <p:sldId id="265" r:id="rId21"/>
-    <p:sldId id="266" r:id="rId22"/>
-    <p:sldId id="277" r:id="rId23"/>
-    <p:sldId id="278" r:id="rId24"/>
-    <p:sldId id="279" r:id="rId25"/>
-    <p:sldId id="280" r:id="rId26"/>
-    <p:sldId id="268" r:id="rId27"/>
-    <p:sldId id="281" r:id="rId28"/>
-    <p:sldId id="282" r:id="rId29"/>
-    <p:sldId id="283" r:id="rId30"/>
-    <p:sldId id="284" r:id="rId31"/>
-    <p:sldId id="287" r:id="rId32"/>
-    <p:sldId id="285" r:id="rId33"/>
-    <p:sldId id="292" r:id="rId34"/>
-    <p:sldId id="286" r:id="rId35"/>
-    <p:sldId id="288" r:id="rId36"/>
-    <p:sldId id="291" r:id="rId37"/>
+    <p:sldId id="293" r:id="rId13"/>
+    <p:sldId id="260" r:id="rId14"/>
+    <p:sldId id="261" r:id="rId15"/>
+    <p:sldId id="289" r:id="rId16"/>
+    <p:sldId id="290" r:id="rId17"/>
+    <p:sldId id="275" r:id="rId18"/>
+    <p:sldId id="264" r:id="rId19"/>
+    <p:sldId id="263" r:id="rId20"/>
+    <p:sldId id="276" r:id="rId21"/>
+    <p:sldId id="265" r:id="rId22"/>
+    <p:sldId id="266" r:id="rId23"/>
+    <p:sldId id="277" r:id="rId24"/>
+    <p:sldId id="278" r:id="rId25"/>
+    <p:sldId id="279" r:id="rId26"/>
+    <p:sldId id="280" r:id="rId27"/>
+    <p:sldId id="294" r:id="rId28"/>
+    <p:sldId id="268" r:id="rId29"/>
+    <p:sldId id="281" r:id="rId30"/>
+    <p:sldId id="282" r:id="rId31"/>
+    <p:sldId id="283" r:id="rId32"/>
+    <p:sldId id="284" r:id="rId33"/>
+    <p:sldId id="287" r:id="rId34"/>
+    <p:sldId id="285" r:id="rId35"/>
+    <p:sldId id="292" r:id="rId36"/>
+    <p:sldId id="286" r:id="rId37"/>
+    <p:sldId id="288" r:id="rId38"/>
+    <p:sldId id="291" r:id="rId39"/>
   </p:sldIdLst>
   <p:sldSz cx="12192000" cy="6858000"/>
   <p:notesSz cx="6858000" cy="9144000"/>
@@ -166,6 +168,7 @@
           <p14:sldIdLst>
             <p14:sldId id="274"/>
             <p14:sldId id="262"/>
+            <p14:sldId id="293"/>
             <p14:sldId id="260"/>
             <p14:sldId id="261"/>
             <p14:sldId id="289"/>
@@ -188,6 +191,7 @@
             <p14:sldId id="278"/>
             <p14:sldId id="279"/>
             <p14:sldId id="280"/>
+            <p14:sldId id="294"/>
           </p14:sldIdLst>
         </p14:section>
         <p14:section name="Demo - Breakout" id="{62FE6DE8-967E-4495-A91F-4485350F975E}">
@@ -220,7 +224,18 @@
       </p14:sectionLst>
     </p:ext>
     <p:ext uri="{EFAFB233-063F-42B5-8137-9DF3F51BA10A}">
-      <p15:sldGuideLst xmlns="" xmlns:p15="http://schemas.microsoft.com/office/powerpoint/2012/main"/>
+      <p15:sldGuideLst xmlns:p15="http://schemas.microsoft.com/office/powerpoint/2012/main">
+        <p15:guide id="1" orient="horz" pos="2160">
+          <p15:clr>
+            <a:srgbClr val="A4A3A4"/>
+          </p15:clr>
+        </p15:guide>
+        <p15:guide id="2" pos="3840">
+          <p15:clr>
+            <a:srgbClr val="A4A3A4"/>
+          </p15:clr>
+        </p15:guide>
+      </p15:sldGuideLst>
     </p:ext>
   </p:extLst>
 </p:presentation>
@@ -308,7 +323,7 @@
           <a:p>
             <a:fld id="{A724FAEC-7584-44B3-B386-6ADB31723F26}" type="datetimeFigureOut">
               <a:rPr lang="en-AU" smtClean="0"/>
-              <a:t>8/06/14</a:t>
+              <a:t>9/06/2014</a:t>
             </a:fld>
             <a:endParaRPr lang="en-AU"/>
           </a:p>
@@ -791,7 +806,7 @@
           <a:p>
             <a:fld id="{814B4410-C701-44AF-9574-9C423ED2E94B}" type="slidenum">
               <a:rPr lang="en-AU" smtClean="0"/>
-              <a:t>31</a:t>
+              <a:t>33</a:t>
             </a:fld>
             <a:endParaRPr lang="en-AU"/>
           </a:p>
@@ -1429,7 +1444,7 @@
           <a:p>
             <a:fld id="{814B4410-C701-44AF-9574-9C423ED2E94B}" type="slidenum">
               <a:rPr lang="en-AU" smtClean="0"/>
-              <a:t>14</a:t>
+              <a:t>15</a:t>
             </a:fld>
             <a:endParaRPr lang="en-AU"/>
           </a:p>
@@ -1517,7 +1532,7 @@
           <a:p>
             <a:fld id="{814B4410-C701-44AF-9574-9C423ED2E94B}" type="slidenum">
               <a:rPr lang="en-AU" smtClean="0"/>
-              <a:t>20</a:t>
+              <a:t>21</a:t>
             </a:fld>
             <a:endParaRPr lang="en-AU"/>
           </a:p>
@@ -1609,7 +1624,7 @@
           <a:p>
             <a:fld id="{814B4410-C701-44AF-9574-9C423ED2E94B}" type="slidenum">
               <a:rPr lang="en-AU" smtClean="0"/>
-              <a:t>24</a:t>
+              <a:t>25</a:t>
             </a:fld>
             <a:endParaRPr lang="en-AU"/>
           </a:p>
@@ -1759,7 +1774,7 @@
           <a:p>
             <a:fld id="{C33626A4-D0D9-4927-8F98-739B1D29D8AB}" type="datetimeFigureOut">
               <a:rPr lang="en-AU" smtClean="0"/>
-              <a:t>8/06/14</a:t>
+              <a:t>9/06/2014</a:t>
             </a:fld>
             <a:endParaRPr lang="en-AU"/>
           </a:p>
@@ -1929,7 +1944,7 @@
           <a:p>
             <a:fld id="{C33626A4-D0D9-4927-8F98-739B1D29D8AB}" type="datetimeFigureOut">
               <a:rPr lang="en-AU" smtClean="0"/>
-              <a:t>8/06/14</a:t>
+              <a:t>9/06/2014</a:t>
             </a:fld>
             <a:endParaRPr lang="en-AU"/>
           </a:p>
@@ -2109,7 +2124,7 @@
           <a:p>
             <a:fld id="{C33626A4-D0D9-4927-8F98-739B1D29D8AB}" type="datetimeFigureOut">
               <a:rPr lang="en-AU" smtClean="0"/>
-              <a:t>8/06/14</a:t>
+              <a:t>9/06/2014</a:t>
             </a:fld>
             <a:endParaRPr lang="en-AU"/>
           </a:p>
@@ -2279,7 +2294,7 @@
           <a:p>
             <a:fld id="{C33626A4-D0D9-4927-8F98-739B1D29D8AB}" type="datetimeFigureOut">
               <a:rPr lang="en-AU" smtClean="0"/>
-              <a:t>8/06/14</a:t>
+              <a:t>9/06/2014</a:t>
             </a:fld>
             <a:endParaRPr lang="en-AU"/>
           </a:p>
@@ -2525,7 +2540,7 @@
           <a:p>
             <a:fld id="{C33626A4-D0D9-4927-8F98-739B1D29D8AB}" type="datetimeFigureOut">
               <a:rPr lang="en-AU" smtClean="0"/>
-              <a:t>8/06/14</a:t>
+              <a:t>9/06/2014</a:t>
             </a:fld>
             <a:endParaRPr lang="en-AU"/>
           </a:p>
@@ -2757,7 +2772,7 @@
           <a:p>
             <a:fld id="{C33626A4-D0D9-4927-8F98-739B1D29D8AB}" type="datetimeFigureOut">
               <a:rPr lang="en-AU" smtClean="0"/>
-              <a:t>8/06/14</a:t>
+              <a:t>9/06/2014</a:t>
             </a:fld>
             <a:endParaRPr lang="en-AU"/>
           </a:p>
@@ -3124,7 +3139,7 @@
           <a:p>
             <a:fld id="{C33626A4-D0D9-4927-8F98-739B1D29D8AB}" type="datetimeFigureOut">
               <a:rPr lang="en-AU" smtClean="0"/>
-              <a:t>8/06/14</a:t>
+              <a:t>9/06/2014</a:t>
             </a:fld>
             <a:endParaRPr lang="en-AU"/>
           </a:p>
@@ -3242,7 +3257,7 @@
           <a:p>
             <a:fld id="{C33626A4-D0D9-4927-8F98-739B1D29D8AB}" type="datetimeFigureOut">
               <a:rPr lang="en-AU" smtClean="0"/>
-              <a:t>8/06/14</a:t>
+              <a:t>9/06/2014</a:t>
             </a:fld>
             <a:endParaRPr lang="en-AU"/>
           </a:p>
@@ -3337,7 +3352,7 @@
           <a:p>
             <a:fld id="{C33626A4-D0D9-4927-8F98-739B1D29D8AB}" type="datetimeFigureOut">
               <a:rPr lang="en-AU" smtClean="0"/>
-              <a:t>8/06/14</a:t>
+              <a:t>9/06/2014</a:t>
             </a:fld>
             <a:endParaRPr lang="en-AU"/>
           </a:p>
@@ -3614,7 +3629,7 @@
           <a:p>
             <a:fld id="{C33626A4-D0D9-4927-8F98-739B1D29D8AB}" type="datetimeFigureOut">
               <a:rPr lang="en-AU" smtClean="0"/>
-              <a:t>8/06/14</a:t>
+              <a:t>9/06/2014</a:t>
             </a:fld>
             <a:endParaRPr lang="en-AU"/>
           </a:p>
@@ -3867,7 +3882,7 @@
           <a:p>
             <a:fld id="{C33626A4-D0D9-4927-8F98-739B1D29D8AB}" type="datetimeFigureOut">
               <a:rPr lang="en-AU" smtClean="0"/>
-              <a:t>8/06/14</a:t>
+              <a:t>9/06/2014</a:t>
             </a:fld>
             <a:endParaRPr lang="en-AU"/>
           </a:p>
@@ -4083,7 +4098,7 @@
           <a:p>
             <a:fld id="{C33626A4-D0D9-4927-8F98-739B1D29D8AB}" type="datetimeFigureOut">
               <a:rPr lang="en-AU" smtClean="0"/>
-              <a:t>8/06/14</a:t>
+              <a:t>9/06/2014</a:t>
             </a:fld>
             <a:endParaRPr lang="en-AU"/>
           </a:p>
@@ -4789,12 +4804,8 @@
           <a:lstStyle/>
           <a:p>
             <a:r>
-              <a:rPr lang="en-AU" dirty="0" smtClean="0"/>
-              <a:t>Unity </a:t>
-            </a:r>
-            <a:r>
               <a:rPr lang="en-AU" dirty="0" err="1" smtClean="0"/>
-              <a:t>GameObjects</a:t>
+              <a:t>MonoBehaviour</a:t>
             </a:r>
             <a:endParaRPr lang="en-AU" dirty="0"/>
           </a:p>
@@ -4816,59 +4827,47 @@
           <a:lstStyle/>
           <a:p>
             <a:r>
-              <a:rPr lang="en-AU" dirty="0" err="1" smtClean="0"/>
-              <a:t>GameObjects</a:t>
-            </a:r>
-            <a:r>
-              <a:rPr lang="en-AU" dirty="0" smtClean="0"/>
-              <a:t> represent “things” within the game</a:t>
+              <a:rPr lang="en-AU" dirty="0" smtClean="0"/>
+              <a:t>Start() – Runs on creation</a:t>
             </a:r>
           </a:p>
           <a:p>
             <a:pPr lvl="1"/>
             <a:r>
               <a:rPr lang="en-AU" dirty="0" smtClean="0"/>
-              <a:t>Objects that can be seen (or represented to the user)</a:t>
+              <a:t>Initialise data</a:t>
+            </a:r>
+          </a:p>
+          <a:p>
+            <a:r>
+              <a:rPr lang="en-AU" dirty="0" smtClean="0"/>
+              <a:t>Awake() – Runs after all components are created, before Update</a:t>
             </a:r>
           </a:p>
           <a:p>
             <a:pPr lvl="1"/>
             <a:r>
               <a:rPr lang="en-AU" dirty="0" smtClean="0"/>
-              <a:t>Logical objects</a:t>
-            </a:r>
-          </a:p>
-          <a:p>
-            <a:r>
-              <a:rPr lang="en-AU" dirty="0" err="1" smtClean="0"/>
-              <a:t>GameObjects</a:t>
-            </a:r>
-            <a:r>
-              <a:rPr lang="en-AU" dirty="0"/>
-              <a:t> </a:t>
-            </a:r>
-            <a:r>
-              <a:rPr lang="en-AU" dirty="0" smtClean="0"/>
-              <a:t>only come with a Transform</a:t>
-            </a:r>
-          </a:p>
-          <a:p>
-            <a:r>
-              <a:rPr lang="en-AU" dirty="0" smtClean="0"/>
-              <a:t>Can be parented to create a Transform hierarchy</a:t>
+              <a:t>Cache references to other components</a:t>
+            </a:r>
+          </a:p>
+          <a:p>
+            <a:r>
+              <a:rPr lang="en-AU" dirty="0" smtClean="0"/>
+              <a:t>Update() – Runs once per “Tick” (frame)</a:t>
             </a:r>
           </a:p>
           <a:p>
             <a:pPr lvl="1"/>
             <a:r>
               <a:rPr lang="en-AU" dirty="0" smtClean="0"/>
-              <a:t>Move parent and every child moves relative to parent</a:t>
-            </a:r>
-          </a:p>
-          <a:p>
-            <a:r>
-              <a:rPr lang="en-AU" dirty="0" smtClean="0"/>
-              <a:t>Has Components, which define the object</a:t>
+              <a:t>Gameplay logic</a:t>
+            </a:r>
+          </a:p>
+          <a:p>
+            <a:r>
+              <a:rPr lang="en-AU" dirty="0" smtClean="0"/>
+              <a:t>Many others</a:t>
             </a:r>
             <a:endParaRPr lang="en-AU" dirty="0"/>
           </a:p>
@@ -4877,7 +4876,7 @@
     </p:spTree>
     <p:extLst>
       <p:ext uri="{BB962C8B-B14F-4D97-AF65-F5344CB8AC3E}">
-        <p14:creationId xmlns:p14="http://schemas.microsoft.com/office/powerpoint/2010/main" val="1072914218"/>
+        <p14:creationId xmlns:p14="http://schemas.microsoft.com/office/powerpoint/2010/main" val="943467426"/>
       </p:ext>
     </p:extLst>
   </p:cSld>
@@ -4921,67 +4920,85 @@
           <a:p>
             <a:r>
               <a:rPr lang="en-AU" dirty="0" smtClean="0"/>
-              <a:t>Components</a:t>
-            </a:r>
-            <a:endParaRPr lang="en-AU" dirty="0"/>
-          </a:p>
-        </p:txBody>
-      </p:sp>
-      <p:sp>
-        <p:nvSpPr>
-          <p:cNvPr id="3" name="Content Placeholder 2"/>
-          <p:cNvSpPr>
-            <a:spLocks noGrp="1"/>
-          </p:cNvSpPr>
-          <p:nvPr>
-            <p:ph idx="1"/>
-          </p:nvPr>
-        </p:nvSpPr>
-        <p:spPr/>
-        <p:txBody>
-          <a:bodyPr/>
-          <a:lstStyle/>
-          <a:p>
-            <a:r>
-              <a:rPr lang="en-AU" dirty="0" smtClean="0"/>
-              <a:t>Building blocks for </a:t>
+              <a:t>Unity </a:t>
             </a:r>
             <a:r>
               <a:rPr lang="en-AU" dirty="0" err="1" smtClean="0"/>
               <a:t>GameObjects</a:t>
             </a:r>
-            <a:endParaRPr lang="en-AU" dirty="0" smtClean="0"/>
-          </a:p>
+            <a:endParaRPr lang="en-AU" dirty="0"/>
+          </a:p>
+        </p:txBody>
+      </p:sp>
+      <p:sp>
+        <p:nvSpPr>
+          <p:cNvPr id="3" name="Content Placeholder 2"/>
+          <p:cNvSpPr>
+            <a:spLocks noGrp="1"/>
+          </p:cNvSpPr>
+          <p:nvPr>
+            <p:ph idx="1"/>
+          </p:nvPr>
+        </p:nvSpPr>
+        <p:spPr/>
+        <p:txBody>
+          <a:bodyPr/>
+          <a:lstStyle/>
           <a:p>
             <a:r>
               <a:rPr lang="en-AU" dirty="0" err="1" smtClean="0"/>
-              <a:t>AddComponent</a:t>
-            </a:r>
-            <a:r>
-              <a:rPr lang="en-AU" dirty="0" smtClean="0"/>
-              <a:t>&lt;&gt;</a:t>
+              <a:t>GameObjects</a:t>
+            </a:r>
+            <a:r>
+              <a:rPr lang="en-AU" dirty="0" smtClean="0"/>
+              <a:t> represent “things” within the game</a:t>
+            </a:r>
+          </a:p>
+          <a:p>
+            <a:pPr lvl="1"/>
+            <a:r>
+              <a:rPr lang="en-AU" dirty="0" smtClean="0"/>
+              <a:t>Objects that can be seen (or represented to the user)</a:t>
+            </a:r>
+          </a:p>
+          <a:p>
+            <a:pPr lvl="1"/>
+            <a:r>
+              <a:rPr lang="en-AU" dirty="0" smtClean="0"/>
+              <a:t>Logical objects</a:t>
             </a:r>
           </a:p>
           <a:p>
             <a:r>
               <a:rPr lang="en-AU" dirty="0" err="1" smtClean="0"/>
-              <a:t>GetComponent</a:t>
-            </a:r>
-            <a:r>
-              <a:rPr lang="en-AU" dirty="0" smtClean="0"/>
-              <a:t>&lt;&gt;</a:t>
-            </a:r>
-          </a:p>
-          <a:p>
-            <a:r>
-              <a:rPr lang="en-AU" dirty="0" smtClean="0"/>
-              <a:t>Added in Editor</a:t>
-            </a:r>
-          </a:p>
-          <a:p>
-            <a:r>
-              <a:rPr lang="en-AU" dirty="0" smtClean="0"/>
-              <a:t>Scripts, Physics, Rendering, anything</a:t>
+              <a:t>GameObjects</a:t>
+            </a:r>
+            <a:r>
+              <a:rPr lang="en-AU" dirty="0"/>
+              <a:t> </a:t>
+            </a:r>
+            <a:r>
+              <a:rPr lang="en-AU" dirty="0" smtClean="0"/>
+              <a:t>only come with a Transform</a:t>
+            </a:r>
+          </a:p>
+          <a:p>
+            <a:r>
+              <a:rPr lang="en-AU" dirty="0" smtClean="0"/>
+              <a:t>Can be parented to create a Transform hierarchy</a:t>
+            </a:r>
+          </a:p>
+          <a:p>
+            <a:pPr lvl="1"/>
+            <a:r>
+              <a:rPr lang="en-AU" dirty="0" smtClean="0"/>
+              <a:t>Move parent and every child moves relative to parent</a:t>
+            </a:r>
+          </a:p>
+          <a:p>
+            <a:r>
+              <a:rPr lang="en-AU" dirty="0" smtClean="0"/>
+              <a:t>Has Components, which define the object</a:t>
             </a:r>
             <a:endParaRPr lang="en-AU" dirty="0"/>
           </a:p>
@@ -4990,7 +5007,7 @@
     </p:spTree>
     <p:extLst>
       <p:ext uri="{BB962C8B-B14F-4D97-AF65-F5344CB8AC3E}">
-        <p14:creationId xmlns:p14="http://schemas.microsoft.com/office/powerpoint/2010/main" val="3770468816"/>
+        <p14:creationId xmlns:p14="http://schemas.microsoft.com/office/powerpoint/2010/main" val="1072914218"/>
       </p:ext>
     </p:extLst>
   </p:cSld>
@@ -5034,7 +5051,7 @@
           <a:p>
             <a:r>
               <a:rPr lang="en-AU" dirty="0" smtClean="0"/>
-              <a:t>Transform</a:t>
+              <a:t>Components</a:t>
             </a:r>
             <a:endParaRPr lang="en-AU" dirty="0"/>
           </a:p>
@@ -5050,66 +5067,51 @@
             <p:ph idx="1"/>
           </p:nvPr>
         </p:nvSpPr>
-        <p:spPr>
-          <a:xfrm>
-            <a:off x="838200" y="1825625"/>
-            <a:ext cx="10515600" cy="4351338"/>
-          </a:xfrm>
-        </p:spPr>
-        <p:txBody>
-          <a:bodyPr>
-            <a:normAutofit lnSpcReduction="10000"/>
-          </a:bodyPr>
-          <a:lstStyle/>
-          <a:p>
-            <a:r>
-              <a:rPr lang="en-AU" dirty="0" smtClean="0"/>
-              <a:t>Position (Vector3)</a:t>
-            </a:r>
-          </a:p>
-          <a:p>
-            <a:r>
-              <a:rPr lang="en-AU" dirty="0" smtClean="0"/>
-              <a:t>Rotation (Quaternion)</a:t>
-            </a:r>
-          </a:p>
-          <a:p>
-            <a:r>
-              <a:rPr lang="en-AU" dirty="0" smtClean="0"/>
-              <a:t>Scale (Vector3)</a:t>
-            </a:r>
-          </a:p>
-          <a:p>
-            <a:endParaRPr lang="en-AU" dirty="0"/>
-          </a:p>
-          <a:p>
+        <p:spPr/>
+        <p:txBody>
+          <a:bodyPr/>
+          <a:lstStyle/>
+          <a:p>
+            <a:r>
+              <a:rPr lang="en-AU" dirty="0" smtClean="0"/>
+              <a:t>Building blocks for </a:t>
+            </a:r>
             <a:r>
               <a:rPr lang="en-AU" dirty="0" err="1" smtClean="0"/>
-              <a:t>LocalPosition</a:t>
+              <a:t>GameObjects</a:t>
             </a:r>
             <a:endParaRPr lang="en-AU" dirty="0" smtClean="0"/>
           </a:p>
           <a:p>
             <a:r>
               <a:rPr lang="en-AU" dirty="0" err="1" smtClean="0"/>
-              <a:t>LocalRotation</a:t>
-            </a:r>
-            <a:endParaRPr lang="en-AU" dirty="0" smtClean="0"/>
+              <a:t>AddComponent</a:t>
+            </a:r>
+            <a:r>
+              <a:rPr lang="en-AU" dirty="0" smtClean="0"/>
+              <a:t>&lt;&gt;</a:t>
+            </a:r>
           </a:p>
           <a:p>
             <a:r>
               <a:rPr lang="en-AU" dirty="0" err="1" smtClean="0"/>
-              <a:t>LocalScale</a:t>
-            </a:r>
-            <a:endParaRPr lang="en-AU" dirty="0" smtClean="0"/>
-          </a:p>
-          <a:p>
-            <a:endParaRPr lang="en-AU" dirty="0"/>
-          </a:p>
-          <a:p>
-            <a:r>
-              <a:rPr lang="en-AU" dirty="0" smtClean="0"/>
-              <a:t>Can be Parent of another Transform</a:t>
+              <a:t>GetComponent</a:t>
+            </a:r>
+            <a:r>
+              <a:rPr lang="en-AU" dirty="0" smtClean="0"/>
+              <a:t>&lt;&gt;</a:t>
+            </a:r>
+          </a:p>
+          <a:p>
+            <a:r>
+              <a:rPr lang="en-AU" dirty="0" smtClean="0"/>
+              <a:t>Added in Editor</a:t>
+            </a:r>
+          </a:p>
+          <a:p>
+            <a:r>
+              <a:rPr lang="en-AU" dirty="0" smtClean="0"/>
+              <a:t>Scripts, Physics, Rendering, anything</a:t>
             </a:r>
             <a:endParaRPr lang="en-AU" dirty="0"/>
           </a:p>
@@ -5118,7 +5120,7 @@
     </p:spTree>
     <p:extLst>
       <p:ext uri="{BB962C8B-B14F-4D97-AF65-F5344CB8AC3E}">
-        <p14:creationId xmlns:p14="http://schemas.microsoft.com/office/powerpoint/2010/main" val="1393021482"/>
+        <p14:creationId xmlns:p14="http://schemas.microsoft.com/office/powerpoint/2010/main" val="3770468816"/>
       </p:ext>
     </p:extLst>
   </p:cSld>
@@ -5162,7 +5164,7 @@
           <a:p>
             <a:r>
               <a:rPr lang="en-AU" dirty="0" smtClean="0"/>
-              <a:t>Scenes</a:t>
+              <a:t>Transform</a:t>
             </a:r>
             <a:endParaRPr lang="en-AU" dirty="0"/>
           </a:p>
@@ -5178,64 +5180,75 @@
             <p:ph idx="1"/>
           </p:nvPr>
         </p:nvSpPr>
-        <p:spPr/>
-        <p:txBody>
-          <a:bodyPr/>
-          <a:lstStyle/>
-          <a:p>
-            <a:r>
-              <a:rPr lang="en-AU" dirty="0" smtClean="0"/>
-              <a:t>Stores a </a:t>
-            </a:r>
+        <p:spPr>
+          <a:xfrm>
+            <a:off x="838200" y="1825625"/>
+            <a:ext cx="10515600" cy="4351338"/>
+          </a:xfrm>
+        </p:spPr>
+        <p:txBody>
+          <a:bodyPr>
+            <a:normAutofit lnSpcReduction="10000"/>
+          </a:bodyPr>
+          <a:lstStyle/>
+          <a:p>
+            <a:r>
+              <a:rPr lang="en-AU" dirty="0" smtClean="0"/>
+              <a:t>Position (Vector3)</a:t>
+            </a:r>
+          </a:p>
+          <a:p>
+            <a:r>
+              <a:rPr lang="en-AU" dirty="0" smtClean="0"/>
+              <a:t>Rotation (Quaternion)</a:t>
+            </a:r>
+          </a:p>
+          <a:p>
+            <a:r>
+              <a:rPr lang="en-AU" dirty="0" smtClean="0"/>
+              <a:t>Scale (Vector3)</a:t>
+            </a:r>
+          </a:p>
+          <a:p>
+            <a:endParaRPr lang="en-AU" dirty="0"/>
+          </a:p>
+          <a:p>
             <a:r>
               <a:rPr lang="en-AU" dirty="0" err="1" smtClean="0"/>
-              <a:t>GameObject</a:t>
-            </a:r>
-            <a:r>
-              <a:rPr lang="en-AU" dirty="0" smtClean="0"/>
-              <a:t> hierarchy</a:t>
-            </a:r>
+              <a:t>LocalPosition</a:t>
+            </a:r>
+            <a:endParaRPr lang="en-AU" dirty="0" smtClean="0"/>
           </a:p>
           <a:p>
             <a:r>
               <a:rPr lang="en-AU" dirty="0" err="1" smtClean="0"/>
-              <a:t>Filetype</a:t>
-            </a:r>
-            <a:r>
-              <a:rPr lang="en-AU" smtClean="0"/>
-              <a:t> is &lt;name</a:t>
-            </a:r>
-            <a:r>
-              <a:rPr lang="en-AU" dirty="0" smtClean="0"/>
-              <a:t>&gt;.unity</a:t>
-            </a:r>
+              <a:t>LocalRotation</a:t>
+            </a:r>
+            <a:endParaRPr lang="en-AU" dirty="0" smtClean="0"/>
           </a:p>
           <a:p>
             <a:r>
               <a:rPr lang="en-AU" dirty="0" err="1" smtClean="0"/>
-              <a:t>Application.LoadLevel</a:t>
+              <a:t>LocalScale</a:t>
             </a:r>
             <a:endParaRPr lang="en-AU" dirty="0" smtClean="0"/>
           </a:p>
           <a:p>
-            <a:r>
-              <a:rPr lang="en-AU" dirty="0" err="1" smtClean="0"/>
-              <a:t>Application.LoadLevelAdditive</a:t>
-            </a:r>
-            <a:endParaRPr lang="en-AU" dirty="0" smtClean="0"/>
-          </a:p>
-          <a:p>
-            <a:r>
-              <a:rPr lang="en-AU" dirty="0" smtClean="0"/>
-              <a:t>[Pro] Asynchronous Loading</a:t>
-            </a:r>
+            <a:endParaRPr lang="en-AU" dirty="0"/>
+          </a:p>
+          <a:p>
+            <a:r>
+              <a:rPr lang="en-AU" dirty="0" smtClean="0"/>
+              <a:t>Can be Parent of another Transform</a:t>
+            </a:r>
+            <a:endParaRPr lang="en-AU" dirty="0"/>
           </a:p>
         </p:txBody>
       </p:sp>
     </p:spTree>
     <p:extLst>
       <p:ext uri="{BB962C8B-B14F-4D97-AF65-F5344CB8AC3E}">
-        <p14:creationId xmlns:p14="http://schemas.microsoft.com/office/powerpoint/2010/main" val="3223928873"/>
+        <p14:creationId xmlns:p14="http://schemas.microsoft.com/office/powerpoint/2010/main" val="1393021482"/>
       </p:ext>
     </p:extLst>
   </p:cSld>
@@ -5264,7 +5277,7 @@
       </p:grpSpPr>
       <p:sp>
         <p:nvSpPr>
-          <p:cNvPr id="4" name="Title 3"/>
+          <p:cNvPr id="2" name="Title 1"/>
           <p:cNvSpPr>
             <a:spLocks noGrp="1"/>
           </p:cNvSpPr>
@@ -5279,15 +5292,7 @@
           <a:p>
             <a:r>
               <a:rPr lang="en-AU" dirty="0" smtClean="0"/>
-              <a:t>Putting </a:t>
-            </a:r>
-            <a:r>
-              <a:rPr lang="en-AU" dirty="0"/>
-              <a:t>I</a:t>
-            </a:r>
-            <a:r>
-              <a:rPr lang="en-AU" dirty="0" smtClean="0"/>
-              <a:t>t Together</a:t>
+              <a:t>Scenes</a:t>
             </a:r>
             <a:endParaRPr lang="en-AU" dirty="0"/>
           </a:p>
@@ -5295,27 +5300,72 @@
       </p:sp>
       <p:sp>
         <p:nvSpPr>
-          <p:cNvPr id="5" name="Text Placeholder 4"/>
-          <p:cNvSpPr>
-            <a:spLocks noGrp="1"/>
-          </p:cNvSpPr>
-          <p:nvPr>
-            <p:ph type="body" idx="1"/>
-          </p:nvPr>
-        </p:nvSpPr>
-        <p:spPr/>
-        <p:txBody>
-          <a:bodyPr/>
-          <a:lstStyle/>
-          <a:p>
-            <a:endParaRPr lang="en-AU"/>
+          <p:cNvPr id="3" name="Content Placeholder 2"/>
+          <p:cNvSpPr>
+            <a:spLocks noGrp="1"/>
+          </p:cNvSpPr>
+          <p:nvPr>
+            <p:ph idx="1"/>
+          </p:nvPr>
+        </p:nvSpPr>
+        <p:spPr/>
+        <p:txBody>
+          <a:bodyPr/>
+          <a:lstStyle/>
+          <a:p>
+            <a:r>
+              <a:rPr lang="en-AU" dirty="0" smtClean="0"/>
+              <a:t>Stores a </a:t>
+            </a:r>
+            <a:r>
+              <a:rPr lang="en-AU" dirty="0" err="1" smtClean="0"/>
+              <a:t>GameObject</a:t>
+            </a:r>
+            <a:r>
+              <a:rPr lang="en-AU" dirty="0" smtClean="0"/>
+              <a:t> hierarchy</a:t>
+            </a:r>
+          </a:p>
+          <a:p>
+            <a:r>
+              <a:rPr lang="en-AU" dirty="0" err="1" smtClean="0"/>
+              <a:t>Filetype</a:t>
+            </a:r>
+            <a:r>
+              <a:rPr lang="en-AU" smtClean="0"/>
+              <a:t> is &lt;name</a:t>
+            </a:r>
+            <a:r>
+              <a:rPr lang="en-AU" dirty="0" smtClean="0"/>
+              <a:t>&gt;.unity</a:t>
+            </a:r>
+          </a:p>
+          <a:p>
+            <a:r>
+              <a:rPr lang="en-AU" dirty="0" err="1" smtClean="0"/>
+              <a:t>Application.LoadLevel</a:t>
+            </a:r>
+            <a:endParaRPr lang="en-AU" dirty="0" smtClean="0"/>
+          </a:p>
+          <a:p>
+            <a:r>
+              <a:rPr lang="en-AU" dirty="0" err="1" smtClean="0"/>
+              <a:t>Application.LoadLevelAdditive</a:t>
+            </a:r>
+            <a:endParaRPr lang="en-AU" dirty="0" smtClean="0"/>
+          </a:p>
+          <a:p>
+            <a:r>
+              <a:rPr lang="en-AU" dirty="0" smtClean="0"/>
+              <a:t>[Pro] Asynchronous Loading</a:t>
+            </a:r>
           </a:p>
         </p:txBody>
       </p:sp>
     </p:spTree>
     <p:extLst>
       <p:ext uri="{BB962C8B-B14F-4D97-AF65-F5344CB8AC3E}">
-        <p14:creationId xmlns:p14="http://schemas.microsoft.com/office/powerpoint/2010/main" val="2508853452"/>
+        <p14:creationId xmlns:p14="http://schemas.microsoft.com/office/powerpoint/2010/main" val="3223928873"/>
       </p:ext>
     </p:extLst>
   </p:cSld>
@@ -5344,7 +5394,7 @@
       </p:grpSpPr>
       <p:sp>
         <p:nvSpPr>
-          <p:cNvPr id="2" name="Title 1"/>
+          <p:cNvPr id="4" name="Title 3"/>
           <p:cNvSpPr>
             <a:spLocks noGrp="1"/>
           </p:cNvSpPr>
@@ -5359,7 +5409,15 @@
           <a:p>
             <a:r>
               <a:rPr lang="en-AU" dirty="0" smtClean="0"/>
-              <a:t>Prefabs</a:t>
+              <a:t>Putting </a:t>
+            </a:r>
+            <a:r>
+              <a:rPr lang="en-AU" dirty="0"/>
+              <a:t>I</a:t>
+            </a:r>
+            <a:r>
+              <a:rPr lang="en-AU" dirty="0" smtClean="0"/>
+              <a:t>t Together</a:t>
             </a:r>
             <a:endParaRPr lang="en-AU" dirty="0"/>
           </a:p>
@@ -5367,56 +5425,27 @@
       </p:sp>
       <p:sp>
         <p:nvSpPr>
-          <p:cNvPr id="3" name="Content Placeholder 2"/>
-          <p:cNvSpPr>
-            <a:spLocks noGrp="1"/>
-          </p:cNvSpPr>
-          <p:nvPr>
-            <p:ph idx="1"/>
-          </p:nvPr>
-        </p:nvSpPr>
-        <p:spPr/>
-        <p:txBody>
-          <a:bodyPr/>
-          <a:lstStyle/>
-          <a:p>
-            <a:r>
-              <a:rPr lang="en-AU" dirty="0" smtClean="0"/>
-              <a:t>Save </a:t>
-            </a:r>
-            <a:r>
-              <a:rPr lang="en-AU" dirty="0" err="1" smtClean="0"/>
-              <a:t>GameObjects</a:t>
-            </a:r>
-            <a:r>
-              <a:rPr lang="en-AU" dirty="0" smtClean="0"/>
-              <a:t> as templates for quick creation at Runtime</a:t>
-            </a:r>
-          </a:p>
-          <a:p>
-            <a:r>
-              <a:rPr lang="en-AU" dirty="0" smtClean="0"/>
-              <a:t>Re-use object designs</a:t>
-            </a:r>
-            <a:endParaRPr lang="en-AU" dirty="0"/>
-          </a:p>
-          <a:p>
-            <a:r>
-              <a:rPr lang="en-AU" dirty="0" smtClean="0"/>
-              <a:t>Drag object to Project view </a:t>
-            </a:r>
-            <a:r>
-              <a:rPr lang="en-AU" smtClean="0"/>
-              <a:t>to create</a:t>
-            </a:r>
-            <a:endParaRPr lang="en-AU" dirty="0" smtClean="0"/>
+          <p:cNvPr id="5" name="Text Placeholder 4"/>
+          <p:cNvSpPr>
+            <a:spLocks noGrp="1"/>
+          </p:cNvSpPr>
+          <p:nvPr>
+            <p:ph type="body" idx="1"/>
+          </p:nvPr>
+        </p:nvSpPr>
+        <p:spPr/>
+        <p:txBody>
+          <a:bodyPr/>
+          <a:lstStyle/>
+          <a:p>
+            <a:endParaRPr lang="en-AU"/>
           </a:p>
         </p:txBody>
       </p:sp>
     </p:spTree>
     <p:extLst>
       <p:ext uri="{BB962C8B-B14F-4D97-AF65-F5344CB8AC3E}">
-        <p14:creationId xmlns:p14="http://schemas.microsoft.com/office/powerpoint/2010/main" val="346306987"/>
+        <p14:creationId xmlns:p14="http://schemas.microsoft.com/office/powerpoint/2010/main" val="2508853452"/>
       </p:ext>
     </p:extLst>
   </p:cSld>
@@ -5460,7 +5489,7 @@
           <a:p>
             <a:r>
               <a:rPr lang="en-AU" dirty="0" smtClean="0"/>
-              <a:t>Assets</a:t>
+              <a:t>Prefabs</a:t>
             </a:r>
             <a:endParaRPr lang="en-AU" dirty="0"/>
           </a:p>
@@ -5483,45 +5512,41 @@
           <a:p>
             <a:r>
               <a:rPr lang="en-AU" dirty="0" smtClean="0"/>
-              <a:t>Unity handles many formats</a:t>
-            </a:r>
-          </a:p>
-          <a:p>
-            <a:r>
-              <a:rPr lang="en-AU" dirty="0" smtClean="0"/>
-              <a:t>Images</a:t>
-            </a:r>
-          </a:p>
-          <a:p>
-            <a:r>
-              <a:rPr lang="en-AU" dirty="0" smtClean="0"/>
-              <a:t>Models</a:t>
-            </a:r>
-          </a:p>
-          <a:p>
-            <a:r>
-              <a:rPr lang="en-AU" dirty="0" smtClean="0"/>
-              <a:t>Audio</a:t>
-            </a:r>
-          </a:p>
-          <a:p>
-            <a:r>
-              <a:rPr lang="en-AU" dirty="0" smtClean="0"/>
-              <a:t>Place in project folder and boom</a:t>
-            </a:r>
-          </a:p>
-          <a:p>
-            <a:r>
-              <a:rPr lang="en-AU" dirty="0" smtClean="0"/>
-              <a:t>Configure in editor depending on file type</a:t>
-            </a:r>
+              <a:t>Save </a:t>
+            </a:r>
+            <a:r>
+              <a:rPr lang="en-AU" dirty="0" err="1" smtClean="0"/>
+              <a:t>GameObjects</a:t>
+            </a:r>
+            <a:r>
+              <a:rPr lang="en-AU" dirty="0" smtClean="0"/>
+              <a:t> as templates for quick creation at Runtime</a:t>
+            </a:r>
+          </a:p>
+          <a:p>
+            <a:r>
+              <a:rPr lang="en-AU" dirty="0" smtClean="0"/>
+              <a:t>Re-use object designs</a:t>
+            </a:r>
+            <a:endParaRPr lang="en-AU" dirty="0"/>
+          </a:p>
+          <a:p>
+            <a:r>
+              <a:rPr lang="en-AU" dirty="0" smtClean="0"/>
+              <a:t>Drag object to Project view </a:t>
+            </a:r>
+            <a:r>
+              <a:rPr lang="en-AU" smtClean="0"/>
+              <a:t>to create</a:t>
+            </a:r>
+            <a:endParaRPr lang="en-AU" dirty="0" smtClean="0"/>
           </a:p>
         </p:txBody>
       </p:sp>
     </p:spTree>
     <p:extLst>
       <p:ext uri="{BB962C8B-B14F-4D97-AF65-F5344CB8AC3E}">
-        <p14:creationId xmlns:p14="http://schemas.microsoft.com/office/powerpoint/2010/main" val="1645592049"/>
+        <p14:creationId xmlns:p14="http://schemas.microsoft.com/office/powerpoint/2010/main" val="346306987"/>
       </p:ext>
     </p:extLst>
   </p:cSld>
@@ -5550,7 +5575,7 @@
       </p:grpSpPr>
       <p:sp>
         <p:nvSpPr>
-          <p:cNvPr id="4" name="Title 3"/>
+          <p:cNvPr id="2" name="Title 1"/>
           <p:cNvSpPr>
             <a:spLocks noGrp="1"/>
           </p:cNvSpPr>
@@ -5565,7 +5590,7 @@
           <a:p>
             <a:r>
               <a:rPr lang="en-AU" dirty="0" smtClean="0"/>
-              <a:t>Sub-Systems</a:t>
+              <a:t>Assets</a:t>
             </a:r>
             <a:endParaRPr lang="en-AU" dirty="0"/>
           </a:p>
@@ -5573,31 +5598,60 @@
       </p:sp>
       <p:sp>
         <p:nvSpPr>
-          <p:cNvPr id="5" name="Text Placeholder 4"/>
-          <p:cNvSpPr>
-            <a:spLocks noGrp="1"/>
-          </p:cNvSpPr>
-          <p:nvPr>
-            <p:ph type="body" idx="1"/>
-          </p:nvPr>
-        </p:nvSpPr>
-        <p:spPr/>
-        <p:txBody>
-          <a:bodyPr/>
-          <a:lstStyle/>
-          <a:p>
-            <a:r>
-              <a:rPr lang="en-AU" dirty="0" smtClean="0"/>
-              <a:t>What goes into a game?</a:t>
-            </a:r>
-            <a:endParaRPr lang="en-AU" dirty="0"/>
+          <p:cNvPr id="3" name="Content Placeholder 2"/>
+          <p:cNvSpPr>
+            <a:spLocks noGrp="1"/>
+          </p:cNvSpPr>
+          <p:nvPr>
+            <p:ph idx="1"/>
+          </p:nvPr>
+        </p:nvSpPr>
+        <p:spPr/>
+        <p:txBody>
+          <a:bodyPr/>
+          <a:lstStyle/>
+          <a:p>
+            <a:r>
+              <a:rPr lang="en-AU" dirty="0" smtClean="0"/>
+              <a:t>Unity handles many formats</a:t>
+            </a:r>
+          </a:p>
+          <a:p>
+            <a:r>
+              <a:rPr lang="en-AU" dirty="0" smtClean="0"/>
+              <a:t>Images</a:t>
+            </a:r>
+          </a:p>
+          <a:p>
+            <a:r>
+              <a:rPr lang="en-AU" dirty="0" smtClean="0"/>
+              <a:t>Models</a:t>
+            </a:r>
+          </a:p>
+          <a:p>
+            <a:r>
+              <a:rPr lang="en-AU" dirty="0" smtClean="0"/>
+              <a:t>Audio</a:t>
+            </a:r>
+          </a:p>
+          <a:p>
+            <a:r>
+              <a:rPr lang="en-AU" dirty="0" smtClean="0"/>
+              <a:t>Place in project folder and boom</a:t>
+            </a:r>
+          </a:p>
+          <a:p>
+            <a:r>
+              <a:rPr lang="en-AU" dirty="0" smtClean="0"/>
+              <a:t>Configure in editor depending on file type</a:t>
+            </a:r>
           </a:p>
         </p:txBody>
       </p:sp>
     </p:spTree>
     <p:extLst>
       <p:ext uri="{BB962C8B-B14F-4D97-AF65-F5344CB8AC3E}">
-        <p14:creationId xmlns:p14="http://schemas.microsoft.com/office/powerpoint/2010/main" val="2720192471"/>
+        <p14:creationId xmlns:p14="http://schemas.microsoft.com/office/powerpoint/2010/main" val="1645592049"/>
       </p:ext>
     </p:extLst>
   </p:cSld>
@@ -5779,7 +5833,7 @@
       </p:grpSpPr>
       <p:sp>
         <p:nvSpPr>
-          <p:cNvPr id="2" name="Title 1"/>
+          <p:cNvPr id="4" name="Title 3"/>
           <p:cNvSpPr>
             <a:spLocks noGrp="1"/>
           </p:cNvSpPr>
@@ -5794,7 +5848,7 @@
           <a:p>
             <a:r>
               <a:rPr lang="en-AU" dirty="0" smtClean="0"/>
-              <a:t>3D Rendering</a:t>
+              <a:t>Sub-Systems</a:t>
             </a:r>
             <a:endParaRPr lang="en-AU" dirty="0"/>
           </a:p>
@@ -5802,93 +5856,31 @@
       </p:sp>
       <p:sp>
         <p:nvSpPr>
-          <p:cNvPr id="3" name="Content Placeholder 2"/>
-          <p:cNvSpPr>
-            <a:spLocks noGrp="1"/>
-          </p:cNvSpPr>
-          <p:nvPr>
-            <p:ph idx="1"/>
-          </p:nvPr>
-        </p:nvSpPr>
-        <p:spPr/>
-        <p:txBody>
-          <a:bodyPr/>
-          <a:lstStyle/>
-          <a:p>
-            <a:r>
-              <a:rPr lang="en-AU" dirty="0" smtClean="0"/>
-              <a:t>Mesh Filter</a:t>
-            </a:r>
-          </a:p>
-          <a:p>
-            <a:pPr lvl="1"/>
-            <a:r>
-              <a:rPr lang="en-AU" dirty="0" smtClean="0"/>
-              <a:t>The Mesh Data</a:t>
-            </a:r>
-          </a:p>
-          <a:p>
-            <a:r>
-              <a:rPr lang="en-AU" dirty="0" smtClean="0"/>
-              <a:t>Material</a:t>
-            </a:r>
-          </a:p>
-          <a:p>
-            <a:pPr lvl="1"/>
-            <a:r>
-              <a:rPr lang="en-AU" dirty="0" smtClean="0"/>
-              <a:t>What the mesh looks like (</a:t>
-            </a:r>
-            <a:r>
-              <a:rPr lang="en-AU" dirty="0" err="1" smtClean="0"/>
-              <a:t>Shader</a:t>
-            </a:r>
-            <a:r>
-              <a:rPr lang="en-AU" dirty="0" smtClean="0"/>
-              <a:t> + Texture(s))</a:t>
-            </a:r>
-          </a:p>
-          <a:p>
-            <a:r>
-              <a:rPr lang="en-AU" dirty="0" smtClean="0"/>
-              <a:t>Mesh Renderer</a:t>
-            </a:r>
-          </a:p>
-          <a:p>
-            <a:pPr lvl="1"/>
-            <a:r>
-              <a:rPr lang="en-AU" dirty="0" smtClean="0"/>
-              <a:t>Binds Filter + Material and Draws</a:t>
-            </a:r>
-          </a:p>
-          <a:p>
-            <a:r>
-              <a:rPr lang="en-AU" dirty="0" smtClean="0"/>
-              <a:t>Unity generates a prefab from an imported model</a:t>
-            </a:r>
-          </a:p>
-          <a:p>
-            <a:r>
-              <a:rPr lang="en-AU" dirty="0" smtClean="0"/>
-              <a:t>Animator</a:t>
-            </a:r>
-          </a:p>
-          <a:p>
-            <a:pPr lvl="1"/>
-            <a:r>
-              <a:rPr lang="en-AU" dirty="0" smtClean="0"/>
-              <a:t>Not covered</a:t>
-            </a:r>
-          </a:p>
-          <a:p>
-            <a:endParaRPr lang="en-AU" dirty="0" smtClean="0"/>
+          <p:cNvPr id="5" name="Text Placeholder 4"/>
+          <p:cNvSpPr>
+            <a:spLocks noGrp="1"/>
+          </p:cNvSpPr>
+          <p:nvPr>
+            <p:ph type="body" idx="1"/>
+          </p:nvPr>
+        </p:nvSpPr>
+        <p:spPr/>
+        <p:txBody>
+          <a:bodyPr/>
+          <a:lstStyle/>
+          <a:p>
+            <a:r>
+              <a:rPr lang="en-AU" dirty="0" smtClean="0"/>
+              <a:t>What goes into a game?</a:t>
+            </a:r>
+            <a:endParaRPr lang="en-AU" dirty="0"/>
           </a:p>
         </p:txBody>
       </p:sp>
     </p:spTree>
     <p:extLst>
       <p:ext uri="{BB962C8B-B14F-4D97-AF65-F5344CB8AC3E}">
-        <p14:creationId xmlns:p14="http://schemas.microsoft.com/office/powerpoint/2010/main" val="2580776966"/>
+        <p14:creationId xmlns:p14="http://schemas.microsoft.com/office/powerpoint/2010/main" val="2720192471"/>
       </p:ext>
     </p:extLst>
   </p:cSld>
@@ -5932,7 +5924,7 @@
           <a:p>
             <a:r>
               <a:rPr lang="en-AU" dirty="0" smtClean="0"/>
-              <a:t>Input</a:t>
+              <a:t>3D Rendering</a:t>
             </a:r>
             <a:endParaRPr lang="en-AU" dirty="0"/>
           </a:p>
@@ -5955,57 +5947,78 @@
           <a:p>
             <a:r>
               <a:rPr lang="en-AU" dirty="0" smtClean="0"/>
-              <a:t>Hardcoded</a:t>
+              <a:t>Mesh Filter</a:t>
             </a:r>
           </a:p>
           <a:p>
             <a:pPr lvl="1"/>
             <a:r>
               <a:rPr lang="en-AU" dirty="0" smtClean="0"/>
-              <a:t>Check individual keys in code</a:t>
+              <a:t>The Mesh Data</a:t>
+            </a:r>
+          </a:p>
+          <a:p>
+            <a:r>
+              <a:rPr lang="en-AU" dirty="0" smtClean="0"/>
+              <a:t>Material</a:t>
             </a:r>
           </a:p>
           <a:p>
             <a:pPr lvl="1"/>
             <a:r>
               <a:rPr lang="en-AU" dirty="0" smtClean="0"/>
-              <a:t>You handle configuration or multiple input types</a:t>
-            </a:r>
-          </a:p>
-          <a:p>
-            <a:r>
-              <a:rPr lang="en-AU" dirty="0" smtClean="0"/>
-              <a:t>Configurable</a:t>
+              <a:t>What the mesh looks like (</a:t>
+            </a:r>
+            <a:r>
+              <a:rPr lang="en-AU" dirty="0" err="1" smtClean="0"/>
+              <a:t>Shader</a:t>
+            </a:r>
+            <a:r>
+              <a:rPr lang="en-AU" dirty="0" smtClean="0"/>
+              <a:t> + Texture(s))</a:t>
+            </a:r>
+          </a:p>
+          <a:p>
+            <a:r>
+              <a:rPr lang="en-AU" dirty="0" smtClean="0"/>
+              <a:t>Mesh Renderer</a:t>
             </a:r>
           </a:p>
           <a:p>
             <a:pPr lvl="1"/>
             <a:r>
               <a:rPr lang="en-AU" dirty="0" smtClean="0"/>
-              <a:t>Check if a named input has been triggered</a:t>
+              <a:t>Binds Filter + Material and Draws</a:t>
+            </a:r>
+          </a:p>
+          <a:p>
+            <a:r>
+              <a:rPr lang="en-AU" dirty="0" smtClean="0"/>
+              <a:t>Unity generates a prefab from an imported model</a:t>
+            </a:r>
+          </a:p>
+          <a:p>
+            <a:r>
+              <a:rPr lang="en-AU" dirty="0" smtClean="0"/>
+              <a:t>Animator</a:t>
             </a:r>
           </a:p>
           <a:p>
             <a:pPr lvl="1"/>
             <a:r>
               <a:rPr lang="en-AU" dirty="0" smtClean="0"/>
-              <a:t>Define these inputs in the Unity Editor</a:t>
-            </a:r>
-          </a:p>
-          <a:p>
-            <a:pPr lvl="1"/>
-            <a:r>
-              <a:rPr lang="en-AU" dirty="0" smtClean="0"/>
-              <a:t>Allows for multiple input types</a:t>
-            </a:r>
-            <a:endParaRPr lang="en-AU" dirty="0"/>
+              <a:t>Not covered</a:t>
+            </a:r>
+          </a:p>
+          <a:p>
+            <a:endParaRPr lang="en-AU" dirty="0" smtClean="0"/>
           </a:p>
         </p:txBody>
       </p:sp>
     </p:spTree>
     <p:extLst>
       <p:ext uri="{BB962C8B-B14F-4D97-AF65-F5344CB8AC3E}">
-        <p14:creationId xmlns:p14="http://schemas.microsoft.com/office/powerpoint/2010/main" val="908806141"/>
+        <p14:creationId xmlns:p14="http://schemas.microsoft.com/office/powerpoint/2010/main" val="2580776966"/>
       </p:ext>
     </p:extLst>
   </p:cSld>
@@ -6049,7 +6062,7 @@
           <a:p>
             <a:r>
               <a:rPr lang="en-AU" dirty="0" smtClean="0"/>
-              <a:t>Input - Hardcoded</a:t>
+              <a:t>Input</a:t>
             </a:r>
             <a:endParaRPr lang="en-AU" dirty="0"/>
           </a:p>
@@ -6071,118 +6084,58 @@
           <a:lstStyle/>
           <a:p>
             <a:r>
-              <a:rPr lang="en-AU" dirty="0" err="1" smtClean="0"/>
-              <a:t>Input.GetKey</a:t>
-            </a:r>
-            <a:r>
-              <a:rPr lang="en-AU" dirty="0" smtClean="0"/>
-              <a:t>()</a:t>
+              <a:rPr lang="en-AU" dirty="0" smtClean="0"/>
+              <a:t>Hardcoded</a:t>
             </a:r>
           </a:p>
           <a:p>
             <a:pPr lvl="1"/>
             <a:r>
-              <a:rPr lang="en-AU" dirty="0" err="1" smtClean="0"/>
-              <a:t>GetKeyDown</a:t>
-            </a:r>
-            <a:r>
-              <a:rPr lang="en-AU" dirty="0" smtClean="0"/>
-              <a:t>/Up()</a:t>
+              <a:rPr lang="en-AU" dirty="0" smtClean="0"/>
+              <a:t>Check individual keys in code</a:t>
+            </a:r>
+          </a:p>
+          <a:p>
+            <a:pPr lvl="1"/>
+            <a:r>
+              <a:rPr lang="en-AU" dirty="0" smtClean="0"/>
+              <a:t>You handle configuration or multiple input types</a:t>
+            </a:r>
+          </a:p>
+          <a:p>
+            <a:r>
+              <a:rPr lang="en-AU" dirty="0" smtClean="0"/>
+              <a:t>Configurable</a:t>
+            </a:r>
+          </a:p>
+          <a:p>
+            <a:pPr lvl="1"/>
+            <a:r>
+              <a:rPr lang="en-AU" dirty="0" smtClean="0"/>
+              <a:t>Check if a named input has been triggered</a:t>
+            </a:r>
+          </a:p>
+          <a:p>
+            <a:pPr lvl="1"/>
+            <a:r>
+              <a:rPr lang="en-AU" dirty="0" smtClean="0"/>
+              <a:t>Define these inputs in the Unity Editor</a:t>
+            </a:r>
+          </a:p>
+          <a:p>
+            <a:pPr lvl="1"/>
+            <a:r>
+              <a:rPr lang="en-AU" dirty="0" smtClean="0"/>
+              <a:t>Allows for multiple input types</a:t>
             </a:r>
             <a:endParaRPr lang="en-AU" dirty="0"/>
-          </a:p>
-          <a:p>
-            <a:r>
-              <a:rPr lang="en-AU" dirty="0" err="1" smtClean="0"/>
-              <a:t>Input.GetMouseButton</a:t>
-            </a:r>
-            <a:r>
-              <a:rPr lang="en-AU" dirty="0" smtClean="0"/>
-              <a:t>()</a:t>
-            </a:r>
-          </a:p>
-          <a:p>
-            <a:pPr lvl="1"/>
-            <a:r>
-              <a:rPr lang="en-AU" dirty="0" err="1" smtClean="0"/>
-              <a:t>GetMouseButtonDown</a:t>
-            </a:r>
-            <a:r>
-              <a:rPr lang="en-AU" dirty="0" smtClean="0"/>
-              <a:t>/Up()</a:t>
-            </a:r>
-          </a:p>
-          <a:p>
-            <a:r>
-              <a:rPr lang="en-AU" dirty="0" err="1" smtClean="0"/>
-              <a:t>Input.mousePosition</a:t>
-            </a:r>
-            <a:endParaRPr lang="en-AU" dirty="0" smtClean="0"/>
-          </a:p>
-          <a:p>
-            <a:r>
-              <a:rPr lang="en-AU" dirty="0" err="1" smtClean="0"/>
-              <a:t>Input.GetTouch</a:t>
-            </a:r>
-            <a:r>
-              <a:rPr lang="en-AU" dirty="0" smtClean="0"/>
-              <a:t>()</a:t>
-            </a:r>
-          </a:p>
-          <a:p>
-            <a:pPr lvl="1"/>
-            <a:r>
-              <a:rPr lang="en-AU" dirty="0" err="1" smtClean="0"/>
-              <a:t>Input.touchCount</a:t>
-            </a:r>
-            <a:endParaRPr lang="en-AU" dirty="0" smtClean="0"/>
-          </a:p>
-          <a:p>
-            <a:r>
-              <a:rPr lang="en-AU" dirty="0" err="1" smtClean="0"/>
-              <a:t>deviceOrientation</a:t>
-            </a:r>
-            <a:r>
-              <a:rPr lang="en-AU" dirty="0" smtClean="0"/>
-              <a:t>, gyro, compass, acceleration</a:t>
-            </a:r>
-          </a:p>
-          <a:p>
-            <a:pPr marL="0" indent="0">
-              <a:buNone/>
-            </a:pPr>
-            <a:r>
-              <a:rPr lang="en-AU" sz="1800" dirty="0">
-                <a:hlinkClick r:id="rId2"/>
-              </a:rPr>
-              <a:t>http://</a:t>
-            </a:r>
-            <a:r>
-              <a:rPr lang="en-AU" sz="1800" dirty="0" smtClean="0">
-                <a:hlinkClick r:id="rId2"/>
-              </a:rPr>
-              <a:t>docs.unity3d.com/Documentation/ScriptReference/</a:t>
-            </a:r>
-            <a:r>
-              <a:rPr lang="en-AU" sz="1800" dirty="0" smtClean="0">
-                <a:solidFill>
-                  <a:srgbClr val="FFFFFF"/>
-                </a:solidFill>
-                <a:hlinkClick r:id="rId2"/>
-              </a:rPr>
-              <a:t>Input.html</a:t>
-            </a:r>
-            <a:r>
-              <a:rPr lang="en-AU" sz="1800" dirty="0" smtClean="0"/>
-              <a:t> </a:t>
-            </a:r>
           </a:p>
         </p:txBody>
       </p:sp>
     </p:spTree>
     <p:extLst>
       <p:ext uri="{BB962C8B-B14F-4D97-AF65-F5344CB8AC3E}">
-        <p14:creationId xmlns:p14="http://schemas.microsoft.com/office/powerpoint/2010/main" val="1130396208"/>
+        <p14:creationId xmlns:p14="http://schemas.microsoft.com/office/powerpoint/2010/main" val="908806141"/>
       </p:ext>
     </p:extLst>
   </p:cSld>
@@ -6226,7 +6179,7 @@
           <a:p>
             <a:r>
               <a:rPr lang="en-AU" dirty="0" smtClean="0"/>
-              <a:t>Input - Configurable</a:t>
+              <a:t>Input - Hardcoded</a:t>
             </a:r>
             <a:endParaRPr lang="en-AU" dirty="0"/>
           </a:p>
@@ -6234,72 +6187,132 @@
       </p:sp>
       <p:sp>
         <p:nvSpPr>
-          <p:cNvPr id="6" name="Content Placeholder 5"/>
-          <p:cNvSpPr>
-            <a:spLocks noGrp="1"/>
-          </p:cNvSpPr>
-          <p:nvPr>
-            <p:ph sz="half" idx="1"/>
-          </p:nvPr>
-        </p:nvSpPr>
-        <p:spPr/>
-        <p:txBody>
-          <a:bodyPr/>
-          <a:lstStyle/>
-          <a:p>
-            <a:r>
-              <a:rPr lang="en-AU" dirty="0" smtClean="0"/>
-              <a:t>“Joystick” Axis or Button</a:t>
-            </a:r>
-          </a:p>
-          <a:p>
-            <a:r>
-              <a:rPr lang="en-AU" dirty="0" smtClean="0"/>
-              <a:t>Cleaner Code</a:t>
-            </a:r>
-          </a:p>
-          <a:p>
-            <a:r>
-              <a:rPr lang="en-AU" dirty="0" smtClean="0"/>
-              <a:t>Positive/Negative “Directions”</a:t>
-            </a:r>
-          </a:p>
-          <a:p>
-            <a:r>
-              <a:rPr lang="en-AU" dirty="0" smtClean="0"/>
-              <a:t>Primary/Secondary Options</a:t>
+          <p:cNvPr id="3" name="Content Placeholder 2"/>
+          <p:cNvSpPr>
+            <a:spLocks noGrp="1"/>
+          </p:cNvSpPr>
+          <p:nvPr>
+            <p:ph idx="1"/>
+          </p:nvPr>
+        </p:nvSpPr>
+        <p:spPr/>
+        <p:txBody>
+          <a:bodyPr/>
+          <a:lstStyle/>
+          <a:p>
+            <a:r>
+              <a:rPr lang="en-AU" dirty="0" err="1" smtClean="0"/>
+              <a:t>Input.GetKey</a:t>
+            </a:r>
+            <a:r>
+              <a:rPr lang="en-AU" dirty="0" smtClean="0"/>
+              <a:t>()</a:t>
+            </a:r>
+          </a:p>
+          <a:p>
+            <a:pPr lvl="1"/>
+            <a:r>
+              <a:rPr lang="en-AU" dirty="0" err="1" smtClean="0"/>
+              <a:t>GetKeyDown</a:t>
+            </a:r>
+            <a:r>
+              <a:rPr lang="en-AU" dirty="0" smtClean="0"/>
+              <a:t>/Up()</a:t>
             </a:r>
             <a:endParaRPr lang="en-AU" dirty="0"/>
           </a:p>
-        </p:txBody>
-      </p:sp>
-      <p:sp>
-        <p:nvSpPr>
-          <p:cNvPr id="7" name="Content Placeholder 6"/>
-          <p:cNvSpPr>
-            <a:spLocks noGrp="1"/>
-          </p:cNvSpPr>
-          <p:nvPr>
-            <p:ph sz="half" idx="2"/>
-          </p:nvPr>
-        </p:nvSpPr>
-        <p:spPr/>
-        <p:txBody>
-          <a:bodyPr/>
-          <a:lstStyle/>
-          <a:p>
-            <a:r>
-              <a:rPr lang="en-AU" dirty="0" smtClean="0"/>
-              <a:t>IMAGE OF INPUT EDITOR IN UNITY GOES HERE</a:t>
-            </a:r>
-            <a:endParaRPr lang="en-AU" dirty="0"/>
+          <a:p>
+            <a:r>
+              <a:rPr lang="en-AU" dirty="0" err="1" smtClean="0"/>
+              <a:t>Input.GetMouseButton</a:t>
+            </a:r>
+            <a:r>
+              <a:rPr lang="en-AU" dirty="0" smtClean="0"/>
+              <a:t>()</a:t>
+            </a:r>
+          </a:p>
+          <a:p>
+            <a:pPr lvl="1"/>
+            <a:r>
+              <a:rPr lang="en-AU" dirty="0" err="1" smtClean="0"/>
+              <a:t>GetMouseButtonDown</a:t>
+            </a:r>
+            <a:r>
+              <a:rPr lang="en-AU" dirty="0" smtClean="0"/>
+              <a:t>/Up()</a:t>
+            </a:r>
+          </a:p>
+          <a:p>
+            <a:r>
+              <a:rPr lang="en-AU" dirty="0" err="1" smtClean="0"/>
+              <a:t>Input.mousePosition</a:t>
+            </a:r>
+            <a:endParaRPr lang="en-AU" dirty="0" smtClean="0"/>
+          </a:p>
+          <a:p>
+            <a:r>
+              <a:rPr lang="en-AU" dirty="0" err="1" smtClean="0"/>
+              <a:t>Input.GetTouch</a:t>
+            </a:r>
+            <a:r>
+              <a:rPr lang="en-AU" dirty="0" smtClean="0"/>
+              <a:t>()</a:t>
+            </a:r>
+          </a:p>
+          <a:p>
+            <a:pPr lvl="1"/>
+            <a:r>
+              <a:rPr lang="en-AU" dirty="0" err="1" smtClean="0"/>
+              <a:t>Input.touchCount</a:t>
+            </a:r>
+            <a:endParaRPr lang="en-AU" dirty="0" smtClean="0"/>
+          </a:p>
+          <a:p>
+            <a:r>
+              <a:rPr lang="en-AU" dirty="0" err="1" smtClean="0"/>
+              <a:t>deviceOrientation</a:t>
+            </a:r>
+            <a:r>
+              <a:rPr lang="en-AU" dirty="0" smtClean="0"/>
+              <a:t>, gyro, compass, acceleration</a:t>
+            </a:r>
+          </a:p>
+          <a:p>
+            <a:pPr marL="0" indent="0">
+              <a:buNone/>
+            </a:pPr>
+            <a:r>
+              <a:rPr lang="en-AU" sz="1800" dirty="0">
+                <a:hlinkClick r:id="rId2"/>
+              </a:rPr>
+              <a:t>http://</a:t>
+            </a:r>
+            <a:r>
+              <a:rPr lang="en-AU" sz="1800" dirty="0" smtClean="0">
+                <a:hlinkClick r:id="rId2"/>
+              </a:rPr>
+              <a:t>docs.unity3d.com/Documentation/ScriptReference/</a:t>
+            </a:r>
+            <a:r>
+              <a:rPr lang="en-AU" sz="1800" dirty="0" smtClean="0">
+                <a:solidFill>
+                  <a:srgbClr val="FFFFFF"/>
+                </a:solidFill>
+                <a:hlinkClick r:id="rId2"/>
+              </a:rPr>
+              <a:t>Input.html</a:t>
+            </a:r>
+            <a:r>
+              <a:rPr lang="en-AU" sz="1800" dirty="0" smtClean="0"/>
+              <a:t> </a:t>
+            </a:r>
           </a:p>
         </p:txBody>
       </p:sp>
     </p:spTree>
     <p:extLst>
       <p:ext uri="{BB962C8B-B14F-4D97-AF65-F5344CB8AC3E}">
-        <p14:creationId xmlns:p14="http://schemas.microsoft.com/office/powerpoint/2010/main" val="4052783222"/>
+        <p14:creationId xmlns:p14="http://schemas.microsoft.com/office/powerpoint/2010/main" val="1130396208"/>
       </p:ext>
     </p:extLst>
   </p:cSld>
@@ -6351,48 +6364,64 @@
       </p:sp>
       <p:sp>
         <p:nvSpPr>
-          <p:cNvPr id="3" name="Content Placeholder 2"/>
-          <p:cNvSpPr>
-            <a:spLocks noGrp="1"/>
-          </p:cNvSpPr>
-          <p:nvPr>
-            <p:ph idx="1"/>
-          </p:nvPr>
-        </p:nvSpPr>
-        <p:spPr/>
-        <p:txBody>
-          <a:bodyPr/>
-          <a:lstStyle/>
-          <a:p>
-            <a:r>
-              <a:rPr lang="en-AU" dirty="0" err="1" smtClean="0"/>
-              <a:t>Input.GetAxis</a:t>
-            </a:r>
-            <a:r>
-              <a:rPr lang="en-AU" dirty="0" smtClean="0"/>
-              <a:t>(string name)</a:t>
-            </a:r>
-          </a:p>
-          <a:p>
-            <a:r>
-              <a:rPr lang="en-AU" dirty="0" err="1" smtClean="0"/>
-              <a:t>Input.GetButton</a:t>
-            </a:r>
-            <a:r>
-              <a:rPr lang="en-AU" dirty="0" smtClean="0"/>
-              <a:t>(string name)</a:t>
-            </a:r>
-          </a:p>
-          <a:p>
+          <p:cNvPr id="6" name="Content Placeholder 5"/>
+          <p:cNvSpPr>
+            <a:spLocks noGrp="1"/>
+          </p:cNvSpPr>
+          <p:nvPr>
+            <p:ph sz="half" idx="1"/>
+          </p:nvPr>
+        </p:nvSpPr>
+        <p:spPr/>
+        <p:txBody>
+          <a:bodyPr/>
+          <a:lstStyle/>
+          <a:p>
+            <a:r>
+              <a:rPr lang="en-AU" dirty="0" smtClean="0"/>
+              <a:t>“Joystick” Axis or Button</a:t>
+            </a:r>
+          </a:p>
+          <a:p>
+            <a:r>
+              <a:rPr lang="en-AU" dirty="0" smtClean="0"/>
+              <a:t>Cleaner Code</a:t>
+            </a:r>
+          </a:p>
+          <a:p>
+            <a:r>
+              <a:rPr lang="en-AU" dirty="0" smtClean="0"/>
+              <a:t>Positive/Negative “Directions”</a:t>
+            </a:r>
+          </a:p>
+          <a:p>
+            <a:r>
+              <a:rPr lang="en-AU" dirty="0" smtClean="0"/>
+              <a:t>Primary/Secondary Options</a:t>
+            </a:r>
             <a:endParaRPr lang="en-AU" dirty="0"/>
           </a:p>
-          <a:p>
-            <a:r>
-              <a:rPr lang="en-AU" dirty="0" smtClean="0"/>
-              <a:t>FULL CODE SAMPLE HERE</a:t>
-            </a:r>
-          </a:p>
-          <a:p>
+        </p:txBody>
+      </p:sp>
+      <p:sp>
+        <p:nvSpPr>
+          <p:cNvPr id="7" name="Content Placeholder 6"/>
+          <p:cNvSpPr>
+            <a:spLocks noGrp="1"/>
+          </p:cNvSpPr>
+          <p:nvPr>
+            <p:ph sz="half" idx="2"/>
+          </p:nvPr>
+        </p:nvSpPr>
+        <p:spPr/>
+        <p:txBody>
+          <a:bodyPr/>
+          <a:lstStyle/>
+          <a:p>
+            <a:r>
+              <a:rPr lang="en-AU" dirty="0" smtClean="0"/>
+              <a:t>IMAGE OF INPUT EDITOR IN UNITY GOES HERE</a:t>
+            </a:r>
             <a:endParaRPr lang="en-AU" dirty="0"/>
           </a:p>
         </p:txBody>
@@ -6400,7 +6429,7 @@
     </p:spTree>
     <p:extLst>
       <p:ext uri="{BB962C8B-B14F-4D97-AF65-F5344CB8AC3E}">
-        <p14:creationId xmlns:p14="http://schemas.microsoft.com/office/powerpoint/2010/main" val="2007838317"/>
+        <p14:creationId xmlns:p14="http://schemas.microsoft.com/office/powerpoint/2010/main" val="4052783222"/>
       </p:ext>
     </p:extLst>
   </p:cSld>
@@ -6444,7 +6473,7 @@
           <a:p>
             <a:r>
               <a:rPr lang="en-AU" dirty="0" smtClean="0"/>
-              <a:t>Physics</a:t>
+              <a:t>Input - Configurable</a:t>
             </a:r>
             <a:endParaRPr lang="en-AU" dirty="0"/>
           </a:p>
@@ -6466,64 +6495,42 @@
           <a:lstStyle/>
           <a:p>
             <a:r>
-              <a:rPr lang="en-AU" dirty="0" smtClean="0"/>
-              <a:t>3D &amp; 2D </a:t>
-            </a:r>
+              <a:rPr lang="en-AU" dirty="0" err="1" smtClean="0"/>
+              <a:t>Input.GetAxis</a:t>
+            </a:r>
+            <a:r>
+              <a:rPr lang="en-AU" dirty="0" smtClean="0"/>
+              <a:t>(string name)</a:t>
+            </a:r>
+          </a:p>
+          <a:p>
+            <a:r>
+              <a:rPr lang="en-AU" dirty="0" err="1" smtClean="0"/>
+              <a:t>Input.GetButton</a:t>
+            </a:r>
+            <a:r>
+              <a:rPr lang="en-AU" dirty="0" smtClean="0"/>
+              <a:t>(string name)</a:t>
+            </a:r>
+          </a:p>
+          <a:p>
             <a:endParaRPr lang="en-AU" dirty="0"/>
           </a:p>
           <a:p>
             <a:r>
               <a:rPr lang="en-AU" dirty="0" smtClean="0"/>
-              <a:t>Rigid Body + Colliders</a:t>
-            </a:r>
-          </a:p>
-          <a:p>
-            <a:r>
-              <a:rPr lang="en-AU" dirty="0" smtClean="0"/>
-              <a:t>Many different collider shapes</a:t>
+              <a:t>FULL CODE SAMPLE HERE</a:t>
             </a:r>
           </a:p>
           <a:p>
             <a:endParaRPr lang="en-AU" dirty="0"/>
-          </a:p>
-          <a:p>
-            <a:r>
-              <a:rPr lang="en-AU" dirty="0" smtClean="0"/>
-              <a:t>Add Rigid Body &amp; Collider to </a:t>
-            </a:r>
-            <a:r>
-              <a:rPr lang="en-AU" dirty="0" err="1" smtClean="0"/>
-              <a:t>GameObject</a:t>
-            </a:r>
-            <a:r>
-              <a:rPr lang="en-AU" dirty="0" smtClean="0"/>
-              <a:t>, set parameters</a:t>
-            </a:r>
-          </a:p>
-          <a:p>
-            <a:r>
-              <a:rPr lang="en-AU" dirty="0" smtClean="0"/>
-              <a:t>Gravity Setting in Player Physics Settings</a:t>
-            </a:r>
-          </a:p>
-          <a:p>
-            <a:r>
-              <a:rPr lang="en-AU" dirty="0" smtClean="0"/>
-              <a:t>Everything “works”</a:t>
-            </a:r>
-          </a:p>
-          <a:p>
-            <a:r>
-              <a:rPr lang="en-AU" dirty="0" smtClean="0"/>
-              <a:t>Can provide custom collision handling</a:t>
-            </a:r>
           </a:p>
         </p:txBody>
       </p:sp>
     </p:spTree>
     <p:extLst>
       <p:ext uri="{BB962C8B-B14F-4D97-AF65-F5344CB8AC3E}">
-        <p14:creationId xmlns:p14="http://schemas.microsoft.com/office/powerpoint/2010/main" val="67478454"/>
+        <p14:creationId xmlns:p14="http://schemas.microsoft.com/office/powerpoint/2010/main" val="2007838317"/>
       </p:ext>
     </p:extLst>
   </p:cSld>
@@ -6567,7 +6574,7 @@
           <a:p>
             <a:r>
               <a:rPr lang="en-AU" dirty="0" smtClean="0"/>
-              <a:t>Let’s Make a Game</a:t>
+              <a:t>Physics</a:t>
             </a:r>
             <a:endParaRPr lang="en-AU" dirty="0"/>
           </a:p>
@@ -6575,31 +6582,78 @@
       </p:sp>
       <p:sp>
         <p:nvSpPr>
-          <p:cNvPr id="4" name="Text Placeholder 3"/>
-          <p:cNvSpPr>
-            <a:spLocks noGrp="1"/>
-          </p:cNvSpPr>
-          <p:nvPr>
-            <p:ph type="body" idx="1"/>
-          </p:nvPr>
-        </p:nvSpPr>
-        <p:spPr/>
-        <p:txBody>
-          <a:bodyPr/>
-          <a:lstStyle/>
-          <a:p>
-            <a:r>
-              <a:rPr lang="en-AU" dirty="0" smtClean="0"/>
-              <a:t>Breakout</a:t>
+          <p:cNvPr id="3" name="Content Placeholder 2"/>
+          <p:cNvSpPr>
+            <a:spLocks noGrp="1"/>
+          </p:cNvSpPr>
+          <p:nvPr>
+            <p:ph idx="1"/>
+          </p:nvPr>
+        </p:nvSpPr>
+        <p:spPr/>
+        <p:txBody>
+          <a:bodyPr/>
+          <a:lstStyle/>
+          <a:p>
+            <a:r>
+              <a:rPr lang="en-AU" dirty="0" smtClean="0"/>
+              <a:t>3D &amp; 2D </a:t>
             </a:r>
             <a:endParaRPr lang="en-AU" dirty="0"/>
+          </a:p>
+          <a:p>
+            <a:r>
+              <a:rPr lang="en-AU" dirty="0" smtClean="0"/>
+              <a:t>Rigid Body + Colliders</a:t>
+            </a:r>
+          </a:p>
+          <a:p>
+            <a:r>
+              <a:rPr lang="en-AU" dirty="0" smtClean="0"/>
+              <a:t>Many different collider shapes</a:t>
+            </a:r>
+          </a:p>
+          <a:p>
+            <a:endParaRPr lang="en-AU" dirty="0"/>
+          </a:p>
+          <a:p>
+            <a:r>
+              <a:rPr lang="en-AU" dirty="0" smtClean="0"/>
+              <a:t>Add Rigid Body &amp; Collider to </a:t>
+            </a:r>
+            <a:r>
+              <a:rPr lang="en-AU" dirty="0" err="1" smtClean="0"/>
+              <a:t>GameObject</a:t>
+            </a:r>
+            <a:r>
+              <a:rPr lang="en-AU" dirty="0" smtClean="0"/>
+              <a:t>, set parameters</a:t>
+            </a:r>
+          </a:p>
+          <a:p>
+            <a:r>
+              <a:rPr lang="en-AU" dirty="0" smtClean="0"/>
+              <a:t>Gravity Setting in Player Physics Settings</a:t>
+            </a:r>
+          </a:p>
+          <a:p>
+            <a:r>
+              <a:rPr lang="en-AU" dirty="0" smtClean="0"/>
+              <a:t>Everything “works”</a:t>
+            </a:r>
+          </a:p>
+          <a:p>
+            <a:r>
+              <a:rPr lang="en-AU" dirty="0" smtClean="0"/>
+              <a:t>Can provide custom collision handling</a:t>
+            </a:r>
           </a:p>
         </p:txBody>
       </p:sp>
     </p:spTree>
     <p:extLst>
       <p:ext uri="{BB962C8B-B14F-4D97-AF65-F5344CB8AC3E}">
-        <p14:creationId xmlns:p14="http://schemas.microsoft.com/office/powerpoint/2010/main" val="783920217"/>
+        <p14:creationId xmlns:p14="http://schemas.microsoft.com/office/powerpoint/2010/main" val="67478454"/>
       </p:ext>
     </p:extLst>
   </p:cSld>
@@ -6643,7 +6697,7 @@
           <a:p>
             <a:r>
               <a:rPr lang="en-AU" dirty="0" smtClean="0"/>
-              <a:t>The Windows Store</a:t>
+              <a:t>Collision</a:t>
             </a:r>
             <a:endParaRPr lang="en-AU" dirty="0"/>
           </a:p>
@@ -6651,22 +6705,59 @@
       </p:sp>
       <p:sp>
         <p:nvSpPr>
-          <p:cNvPr id="3" name="Text Placeholder 2"/>
-          <p:cNvSpPr>
-            <a:spLocks noGrp="1"/>
-          </p:cNvSpPr>
-          <p:nvPr>
-            <p:ph type="body" idx="1"/>
-          </p:nvPr>
-        </p:nvSpPr>
-        <p:spPr/>
-        <p:txBody>
-          <a:bodyPr/>
-          <a:lstStyle/>
-          <a:p>
-            <a:r>
-              <a:rPr lang="en-AU" dirty="0" smtClean="0"/>
-              <a:t>Building and Certification</a:t>
+          <p:cNvPr id="3" name="Content Placeholder 2"/>
+          <p:cNvSpPr>
+            <a:spLocks noGrp="1"/>
+          </p:cNvSpPr>
+          <p:nvPr>
+            <p:ph idx="1"/>
+          </p:nvPr>
+        </p:nvSpPr>
+        <p:spPr/>
+        <p:txBody>
+          <a:bodyPr/>
+          <a:lstStyle/>
+          <a:p>
+            <a:r>
+              <a:rPr lang="en-AU" dirty="0" smtClean="0"/>
+              <a:t>Collider + </a:t>
+            </a:r>
+            <a:r>
+              <a:rPr lang="en-AU" dirty="0" err="1" smtClean="0"/>
+              <a:t>RigidBody</a:t>
+            </a:r>
+            <a:endParaRPr lang="en-AU" dirty="0" smtClean="0"/>
+          </a:p>
+          <a:p>
+            <a:r>
+              <a:rPr lang="en-AU" dirty="0" err="1" smtClean="0"/>
+              <a:t>MonoBehaviour</a:t>
+            </a:r>
+            <a:r>
+              <a:rPr lang="en-AU" dirty="0" smtClean="0"/>
+              <a:t> for custom response</a:t>
+            </a:r>
+          </a:p>
+          <a:p>
+            <a:pPr lvl="1"/>
+            <a:r>
+              <a:rPr lang="en-AU" dirty="0" err="1" smtClean="0"/>
+              <a:t>OnCollisionEnter</a:t>
+            </a:r>
+            <a:r>
+              <a:rPr lang="en-AU" dirty="0" smtClean="0"/>
+              <a:t>()</a:t>
+            </a:r>
+          </a:p>
+          <a:p>
+            <a:pPr lvl="1"/>
+            <a:r>
+              <a:rPr lang="en-AU" dirty="0" err="1" smtClean="0"/>
+              <a:t>OnCollisionExit</a:t>
+            </a:r>
+            <a:r>
+              <a:rPr lang="en-AU" dirty="0" smtClean="0"/>
+              <a:t>()</a:t>
             </a:r>
             <a:endParaRPr lang="en-AU" dirty="0"/>
           </a:p>
@@ -6675,7 +6766,7 @@
     </p:spTree>
     <p:extLst>
       <p:ext uri="{BB962C8B-B14F-4D97-AF65-F5344CB8AC3E}">
-        <p14:creationId xmlns:p14="http://schemas.microsoft.com/office/powerpoint/2010/main" val="86343519"/>
+        <p14:creationId xmlns:p14="http://schemas.microsoft.com/office/powerpoint/2010/main" val="1950597253"/>
       </p:ext>
     </p:extLst>
   </p:cSld>
@@ -6704,7 +6795,7 @@
       </p:grpSpPr>
       <p:sp>
         <p:nvSpPr>
-          <p:cNvPr id="4" name="Title 3"/>
+          <p:cNvPr id="2" name="Title 1"/>
           <p:cNvSpPr>
             <a:spLocks noGrp="1"/>
           </p:cNvSpPr>
@@ -6719,7 +6810,7 @@
           <a:p>
             <a:r>
               <a:rPr lang="en-AU" dirty="0" smtClean="0"/>
-              <a:t>XAML</a:t>
+              <a:t>Let’s Make a Game</a:t>
             </a:r>
             <a:endParaRPr lang="en-AU" dirty="0"/>
           </a:p>
@@ -6727,46 +6818,22 @@
       </p:sp>
       <p:sp>
         <p:nvSpPr>
-          <p:cNvPr id="5" name="Content Placeholder 4"/>
-          <p:cNvSpPr>
-            <a:spLocks noGrp="1"/>
-          </p:cNvSpPr>
-          <p:nvPr>
-            <p:ph idx="1"/>
-          </p:nvPr>
-        </p:nvSpPr>
-        <p:spPr/>
-        <p:txBody>
-          <a:bodyPr/>
-          <a:lstStyle/>
-          <a:p>
-            <a:r>
-              <a:rPr lang="en-AU" dirty="0" smtClean="0"/>
-              <a:t>XML based UI definition</a:t>
-            </a:r>
-          </a:p>
-          <a:p>
-            <a:r>
-              <a:rPr lang="en-AU" dirty="0" smtClean="0"/>
-              <a:t>Used for WPF/Silverlight, Windows 8, WP8</a:t>
-            </a:r>
-          </a:p>
-          <a:p>
-            <a:r>
-              <a:rPr lang="en-AU" dirty="0" smtClean="0"/>
-              <a:t>Can be edited visually in Visual Studio or Expression Blend</a:t>
-            </a:r>
-          </a:p>
-          <a:p>
-            <a:r>
-              <a:rPr lang="en-AU" dirty="0" smtClean="0"/>
-              <a:t>Can be used for Video Playback, Extended Splash or ignored</a:t>
-            </a:r>
-          </a:p>
-          <a:p>
-            <a:r>
-              <a:rPr lang="en-AU" dirty="0" smtClean="0"/>
-              <a:t>Unity generates the base XAML required</a:t>
+          <p:cNvPr id="4" name="Text Placeholder 3"/>
+          <p:cNvSpPr>
+            <a:spLocks noGrp="1"/>
+          </p:cNvSpPr>
+          <p:nvPr>
+            <p:ph type="body" idx="1"/>
+          </p:nvPr>
+        </p:nvSpPr>
+        <p:spPr/>
+        <p:txBody>
+          <a:bodyPr/>
+          <a:lstStyle/>
+          <a:p>
+            <a:r>
+              <a:rPr lang="en-AU" smtClean="0"/>
+              <a:t>Demo Part 1</a:t>
             </a:r>
             <a:endParaRPr lang="en-AU" dirty="0"/>
           </a:p>
@@ -6775,7 +6842,7 @@
     </p:spTree>
     <p:extLst>
       <p:ext uri="{BB962C8B-B14F-4D97-AF65-F5344CB8AC3E}">
-        <p14:creationId xmlns:p14="http://schemas.microsoft.com/office/powerpoint/2010/main" val="3121308789"/>
+        <p14:creationId xmlns:p14="http://schemas.microsoft.com/office/powerpoint/2010/main" val="783920217"/>
       </p:ext>
     </p:extLst>
   </p:cSld>
@@ -6818,12 +6885,8 @@
           <a:lstStyle/>
           <a:p>
             <a:r>
-              <a:rPr lang="en-AU" dirty="0" err="1" smtClean="0"/>
-              <a:t>WinRT</a:t>
-            </a:r>
-            <a:r>
-              <a:rPr lang="en-AU" dirty="0" smtClean="0"/>
-              <a:t> and Compiling for the Store</a:t>
+              <a:rPr lang="en-AU" dirty="0" smtClean="0"/>
+              <a:t>The Windows Store</a:t>
             </a:r>
             <a:endParaRPr lang="en-AU" dirty="0"/>
           </a:p>
@@ -6831,55 +6894,22 @@
       </p:sp>
       <p:sp>
         <p:nvSpPr>
-          <p:cNvPr id="3" name="Content Placeholder 2"/>
-          <p:cNvSpPr>
-            <a:spLocks noGrp="1"/>
-          </p:cNvSpPr>
-          <p:nvPr>
-            <p:ph idx="1"/>
-          </p:nvPr>
-        </p:nvSpPr>
-        <p:spPr/>
-        <p:txBody>
-          <a:bodyPr/>
-          <a:lstStyle/>
-          <a:p>
-            <a:r>
-              <a:rPr lang="en-AU" dirty="0" smtClean="0"/>
-              <a:t>Build Settings &gt; Windows Store Apps</a:t>
-            </a:r>
-          </a:p>
-          <a:p>
-            <a:r>
-              <a:rPr lang="en-AU" dirty="0" smtClean="0"/>
-              <a:t>SDK: 8.1</a:t>
-            </a:r>
-          </a:p>
-          <a:p>
-            <a:r>
-              <a:rPr lang="en-AU" dirty="0" smtClean="0"/>
-              <a:t>Type: XAML C#</a:t>
-            </a:r>
-          </a:p>
-          <a:p>
-            <a:r>
-              <a:rPr lang="en-AU" dirty="0" smtClean="0"/>
-              <a:t>Click Build, select destination for output solution</a:t>
-            </a:r>
-          </a:p>
-          <a:p>
-            <a:endParaRPr lang="en-AU" dirty="0"/>
-          </a:p>
-          <a:p>
-            <a:r>
-              <a:rPr lang="en-AU" dirty="0" smtClean="0"/>
-              <a:t>Generates a Visual Studio 2013 Solution (2012 for an SDK 8.0 build)</a:t>
-            </a:r>
-          </a:p>
-          <a:p>
-            <a:r>
-              <a:rPr lang="en-AU" dirty="0" smtClean="0"/>
-              <a:t>Open and press F5 to run and test locally</a:t>
+          <p:cNvPr id="3" name="Text Placeholder 2"/>
+          <p:cNvSpPr>
+            <a:spLocks noGrp="1"/>
+          </p:cNvSpPr>
+          <p:nvPr>
+            <p:ph type="body" idx="1"/>
+          </p:nvPr>
+        </p:nvSpPr>
+        <p:spPr/>
+        <p:txBody>
+          <a:bodyPr/>
+          <a:lstStyle/>
+          <a:p>
+            <a:r>
+              <a:rPr lang="en-AU" dirty="0" smtClean="0"/>
+              <a:t>Building and Certification</a:t>
             </a:r>
             <a:endParaRPr lang="en-AU" dirty="0"/>
           </a:p>
@@ -6888,7 +6918,7 @@
     </p:spTree>
     <p:extLst>
       <p:ext uri="{BB962C8B-B14F-4D97-AF65-F5344CB8AC3E}">
-        <p14:creationId xmlns:p14="http://schemas.microsoft.com/office/powerpoint/2010/main" val="1811821516"/>
+        <p14:creationId xmlns:p14="http://schemas.microsoft.com/office/powerpoint/2010/main" val="86343519"/>
       </p:ext>
     </p:extLst>
   </p:cSld>
@@ -7037,7 +7067,7 @@
       </p:grpSpPr>
       <p:sp>
         <p:nvSpPr>
-          <p:cNvPr id="2" name="Title 1"/>
+          <p:cNvPr id="4" name="Title 3"/>
           <p:cNvSpPr>
             <a:spLocks noGrp="1"/>
           </p:cNvSpPr>
@@ -7052,11 +7082,7 @@
           <a:p>
             <a:r>
               <a:rPr lang="en-AU" dirty="0" smtClean="0"/>
-              <a:t>Debugging Scripts with </a:t>
-            </a:r>
-            <a:r>
-              <a:rPr lang="en-AU" dirty="0" err="1" smtClean="0"/>
-              <a:t>WinRT</a:t>
+              <a:t>XAML</a:t>
             </a:r>
             <a:endParaRPr lang="en-AU" dirty="0"/>
           </a:p>
@@ -7064,7 +7090,7 @@
       </p:sp>
       <p:sp>
         <p:nvSpPr>
-          <p:cNvPr id="3" name="Content Placeholder 2"/>
+          <p:cNvPr id="5" name="Content Placeholder 4"/>
           <p:cNvSpPr>
             <a:spLocks noGrp="1"/>
           </p:cNvSpPr>
@@ -7079,98 +7105,31 @@
           <a:p>
             <a:r>
               <a:rPr lang="en-AU" dirty="0" smtClean="0"/>
-              <a:t>Unity uses </a:t>
-            </a:r>
-            <a:r>
-              <a:rPr lang="en-AU" dirty="0" err="1" smtClean="0"/>
-              <a:t>WinRT</a:t>
-            </a:r>
-            <a:r>
-              <a:rPr lang="en-AU" dirty="0"/>
-              <a:t> </a:t>
-            </a:r>
-            <a:r>
-              <a:rPr lang="en-AU" dirty="0" smtClean="0"/>
-              <a:t>instead of Mono for Windows 8</a:t>
-            </a:r>
-          </a:p>
-          <a:p>
-            <a:r>
-              <a:rPr lang="en-AU" dirty="0" smtClean="0"/>
-              <a:t>Unity:</a:t>
-            </a:r>
-          </a:p>
-          <a:p>
-            <a:pPr lvl="1"/>
-            <a:r>
-              <a:rPr lang="en-AU" dirty="0" smtClean="0"/>
-              <a:t>Edit &gt; Sync </a:t>
-            </a:r>
-            <a:r>
-              <a:rPr lang="en-AU" dirty="0" err="1" smtClean="0"/>
-              <a:t>Monodevelop</a:t>
-            </a:r>
-            <a:r>
-              <a:rPr lang="en-AU" dirty="0" smtClean="0"/>
-              <a:t> Project(s)</a:t>
-            </a:r>
-          </a:p>
-          <a:p>
-            <a:pPr lvl="1"/>
-            <a:r>
-              <a:rPr lang="en-AU" dirty="0" smtClean="0"/>
-              <a:t>Close </a:t>
-            </a:r>
-            <a:r>
-              <a:rPr lang="en-AU" dirty="0" err="1" smtClean="0"/>
-              <a:t>MonoDevelop</a:t>
-            </a:r>
-            <a:r>
-              <a:rPr lang="en-AU" dirty="0" smtClean="0"/>
-              <a:t> or Visual Studio</a:t>
-            </a:r>
-          </a:p>
-          <a:p>
-            <a:r>
-              <a:rPr lang="en-AU" dirty="0" smtClean="0"/>
-              <a:t>Visual Studio (Built Solution):</a:t>
-            </a:r>
-          </a:p>
-          <a:p>
-            <a:pPr lvl="1"/>
-            <a:r>
-              <a:rPr lang="en-AU" dirty="0" smtClean="0"/>
-              <a:t>Add Existing Project &gt; Select the generated .</a:t>
-            </a:r>
-            <a:r>
-              <a:rPr lang="en-AU" dirty="0" err="1" smtClean="0"/>
-              <a:t>csproj</a:t>
-            </a:r>
-            <a:r>
-              <a:rPr lang="en-AU" dirty="0" smtClean="0"/>
-              <a:t> file</a:t>
-            </a:r>
-          </a:p>
-          <a:p>
-            <a:pPr lvl="2"/>
-            <a:r>
-              <a:rPr lang="en-AU" dirty="0" err="1"/>
-              <a:t>f</a:t>
-            </a:r>
-            <a:r>
-              <a:rPr lang="en-AU" dirty="0" err="1" smtClean="0"/>
-              <a:t>irstpass</a:t>
-            </a:r>
-            <a:r>
-              <a:rPr lang="en-AU" dirty="0" smtClean="0"/>
-              <a:t> = plugins folder</a:t>
-            </a:r>
-          </a:p>
-          <a:p>
-            <a:pPr lvl="1"/>
-            <a:r>
-              <a:rPr lang="en-AU" dirty="0" smtClean="0"/>
-              <a:t>F5/Debug</a:t>
+              <a:t>XML based UI definition</a:t>
+            </a:r>
+          </a:p>
+          <a:p>
+            <a:r>
+              <a:rPr lang="en-AU" dirty="0" smtClean="0"/>
+              <a:t>Used for WPF/Silverlight, Windows 8, WP8</a:t>
+            </a:r>
+          </a:p>
+          <a:p>
+            <a:r>
+              <a:rPr lang="en-AU" dirty="0" smtClean="0"/>
+              <a:t>Can be edited visually in Visual Studio or Expression Blend</a:t>
+            </a:r>
+          </a:p>
+          <a:p>
+            <a:r>
+              <a:rPr lang="en-AU" dirty="0" smtClean="0"/>
+              <a:t>Can be used for Video Playback, Extended Splash or ignored</a:t>
+            </a:r>
+          </a:p>
+          <a:p>
+            <a:r>
+              <a:rPr lang="en-AU" dirty="0" smtClean="0"/>
+              <a:t>Unity generates the base XAML required</a:t>
             </a:r>
             <a:endParaRPr lang="en-AU" dirty="0"/>
           </a:p>
@@ -7179,7 +7138,7 @@
     </p:spTree>
     <p:extLst>
       <p:ext uri="{BB962C8B-B14F-4D97-AF65-F5344CB8AC3E}">
-        <p14:creationId xmlns:p14="http://schemas.microsoft.com/office/powerpoint/2010/main" val="2619712675"/>
+        <p14:creationId xmlns:p14="http://schemas.microsoft.com/office/powerpoint/2010/main" val="3121308789"/>
       </p:ext>
     </p:extLst>
   </p:cSld>
@@ -7223,7 +7182,11 @@
           <a:p>
             <a:r>
               <a:rPr lang="en-AU" dirty="0" err="1" smtClean="0"/>
-              <a:t>UnityEngine.WSA</a:t>
+              <a:t>WinRT</a:t>
+            </a:r>
+            <a:r>
+              <a:rPr lang="en-AU" dirty="0" smtClean="0"/>
+              <a:t> and Compiling for the Store</a:t>
             </a:r>
             <a:endParaRPr lang="en-AU" dirty="0"/>
           </a:p>
@@ -7246,33 +7209,49 @@
           <a:p>
             <a:r>
               <a:rPr lang="en-AU" dirty="0" smtClean="0"/>
-              <a:t>Namespace for Windows Store App integration points</a:t>
-            </a:r>
-          </a:p>
-          <a:p>
-            <a:r>
-              <a:rPr lang="en-AU" dirty="0" smtClean="0"/>
-              <a:t>More being added all the time by Unity</a:t>
-            </a:r>
-          </a:p>
-          <a:p>
-            <a:r>
-              <a:rPr lang="en-AU" dirty="0" smtClean="0"/>
-              <a:t>Can use this or your own plugin</a:t>
-            </a:r>
-          </a:p>
-          <a:p>
-            <a:r>
-              <a:rPr lang="en-AU" dirty="0" smtClean="0"/>
-              <a:t>LIST INTERESTING CLASSES HERE</a:t>
-            </a:r>
+              <a:t>Build Settings &gt; Windows Store Apps</a:t>
+            </a:r>
+          </a:p>
+          <a:p>
+            <a:r>
+              <a:rPr lang="en-AU" dirty="0" smtClean="0"/>
+              <a:t>SDK: 8.1</a:t>
+            </a:r>
+          </a:p>
+          <a:p>
+            <a:r>
+              <a:rPr lang="en-AU" dirty="0" smtClean="0"/>
+              <a:t>Type: XAML C#</a:t>
+            </a:r>
+          </a:p>
+          <a:p>
+            <a:r>
+              <a:rPr lang="en-AU" dirty="0" smtClean="0"/>
+              <a:t>Click Build, select destination for output solution</a:t>
+            </a:r>
+          </a:p>
+          <a:p>
+            <a:endParaRPr lang="en-AU" dirty="0"/>
+          </a:p>
+          <a:p>
+            <a:r>
+              <a:rPr lang="en-AU" dirty="0" smtClean="0"/>
+              <a:t>Generates a Visual Studio 2013 Solution (2012 for an SDK 8.0 build)</a:t>
+            </a:r>
+          </a:p>
+          <a:p>
+            <a:r>
+              <a:rPr lang="en-AU" dirty="0" smtClean="0"/>
+              <a:t>Open and press F5 to run and test locally</a:t>
+            </a:r>
+            <a:endParaRPr lang="en-AU" dirty="0"/>
           </a:p>
         </p:txBody>
       </p:sp>
     </p:spTree>
     <p:extLst>
       <p:ext uri="{BB962C8B-B14F-4D97-AF65-F5344CB8AC3E}">
-        <p14:creationId xmlns:p14="http://schemas.microsoft.com/office/powerpoint/2010/main" val="357982477"/>
+        <p14:creationId xmlns:p14="http://schemas.microsoft.com/office/powerpoint/2010/main" val="1811821516"/>
       </p:ext>
     </p:extLst>
   </p:cSld>
@@ -7316,7 +7295,11 @@
           <a:p>
             <a:r>
               <a:rPr lang="en-AU" dirty="0" smtClean="0"/>
-              <a:t>Cert – Privacy and Settings</a:t>
+              <a:t>Debugging Scripts with </a:t>
+            </a:r>
+            <a:r>
+              <a:rPr lang="en-AU" dirty="0" err="1" smtClean="0"/>
+              <a:t>WinRT</a:t>
             </a:r>
             <a:endParaRPr lang="en-AU" dirty="0"/>
           </a:p>
@@ -7339,55 +7322,107 @@
           <a:p>
             <a:r>
               <a:rPr lang="en-AU" dirty="0" smtClean="0"/>
-              <a:t>When you need a Privacy Policy:</a:t>
+              <a:t>Unity uses </a:t>
+            </a:r>
+            <a:r>
+              <a:rPr lang="en-AU" dirty="0" err="1" smtClean="0"/>
+              <a:t>WinRT</a:t>
+            </a:r>
+            <a:r>
+              <a:rPr lang="en-AU" dirty="0"/>
+              <a:t> </a:t>
+            </a:r>
+            <a:r>
+              <a:rPr lang="en-AU" dirty="0" smtClean="0"/>
+              <a:t>instead of Mono for Windows 8</a:t>
+            </a:r>
+          </a:p>
+          <a:p>
+            <a:r>
+              <a:rPr lang="en-AU" dirty="0" smtClean="0"/>
+              <a:t>Unity:</a:t>
             </a:r>
           </a:p>
           <a:p>
             <a:pPr lvl="1"/>
             <a:r>
               <a:rPr lang="en-AU" dirty="0" smtClean="0"/>
-              <a:t>When you collect personal information</a:t>
+              <a:t>Edit &gt; Sync </a:t>
+            </a:r>
+            <a:r>
+              <a:rPr lang="en-AU" dirty="0" err="1" smtClean="0"/>
+              <a:t>Monodevelop</a:t>
+            </a:r>
+            <a:r>
+              <a:rPr lang="en-AU" dirty="0" smtClean="0"/>
+              <a:t> Project(s)</a:t>
             </a:r>
           </a:p>
           <a:p>
             <a:pPr lvl="1"/>
             <a:r>
               <a:rPr lang="en-AU" dirty="0" smtClean="0"/>
-              <a:t>When you connect to the internet</a:t>
+              <a:t>Close </a:t>
+            </a:r>
+            <a:r>
+              <a:rPr lang="en-AU" dirty="0" err="1" smtClean="0"/>
+              <a:t>MonoDevelop</a:t>
+            </a:r>
+            <a:r>
+              <a:rPr lang="en-AU" dirty="0" smtClean="0"/>
+              <a:t> or Visual Studio</a:t>
+            </a:r>
+          </a:p>
+          <a:p>
+            <a:r>
+              <a:rPr lang="en-AU" dirty="0" smtClean="0"/>
+              <a:t>Visual Studio (Built Solution):</a:t>
+            </a:r>
+          </a:p>
+          <a:p>
+            <a:pPr lvl="1"/>
+            <a:r>
+              <a:rPr lang="en-AU" dirty="0" smtClean="0"/>
+              <a:t>Add Existing Project &gt; Select the generated .</a:t>
+            </a:r>
+            <a:r>
+              <a:rPr lang="en-AU" dirty="0" err="1" smtClean="0"/>
+              <a:t>csproj</a:t>
+            </a:r>
+            <a:r>
+              <a:rPr lang="en-AU" dirty="0" smtClean="0"/>
+              <a:t> file</a:t>
             </a:r>
           </a:p>
           <a:p>
             <a:pPr lvl="2"/>
             <a:r>
-              <a:rPr lang="en-AU" dirty="0" smtClean="0"/>
-              <a:t>IP Addresses are considered personally identifiable</a:t>
+              <a:rPr lang="en-AU" dirty="0" err="1"/>
+              <a:t>f</a:t>
+            </a:r>
+            <a:r>
+              <a:rPr lang="en-AU" dirty="0" err="1" smtClean="0"/>
+              <a:t>irstpass</a:t>
+            </a:r>
+            <a:r>
+              <a:rPr lang="en-AU" dirty="0" smtClean="0"/>
+              <a:t> = plugins folder</a:t>
+            </a:r>
+          </a:p>
+          <a:p>
+            <a:pPr lvl="1"/>
+            <a:r>
+              <a:rPr lang="en-AU" dirty="0" smtClean="0"/>
+              <a:t>F5/Debug</a:t>
             </a:r>
             <a:endParaRPr lang="en-AU" dirty="0"/>
-          </a:p>
-          <a:p>
-            <a:r>
-              <a:rPr lang="en-AU" dirty="0" smtClean="0"/>
-              <a:t>Place this online at a URL that does not change</a:t>
-            </a:r>
-          </a:p>
-          <a:p>
-            <a:r>
-              <a:rPr lang="en-AU" dirty="0" smtClean="0"/>
-              <a:t>Add link to the store dashboard</a:t>
-            </a:r>
-          </a:p>
-          <a:p>
-            <a:r>
-              <a:rPr lang="en-AU" dirty="0" smtClean="0"/>
-              <a:t>Add link to app settings</a:t>
-            </a:r>
           </a:p>
         </p:txBody>
       </p:sp>
     </p:spTree>
     <p:extLst>
       <p:ext uri="{BB962C8B-B14F-4D97-AF65-F5344CB8AC3E}">
-        <p14:creationId xmlns:p14="http://schemas.microsoft.com/office/powerpoint/2010/main" val="1562890118"/>
+        <p14:creationId xmlns:p14="http://schemas.microsoft.com/office/powerpoint/2010/main" val="2619712675"/>
       </p:ext>
     </p:extLst>
   </p:cSld>
@@ -7430,10 +7465,10 @@
           <a:lstStyle/>
           <a:p>
             <a:r>
-              <a:rPr lang="en-US" dirty="0" smtClean="0"/>
-              <a:t>App Settings</a:t>
-            </a:r>
-            <a:endParaRPr lang="en-US" dirty="0"/>
+              <a:rPr lang="en-AU" dirty="0" err="1" smtClean="0"/>
+              <a:t>UnityEngine.WSA</a:t>
+            </a:r>
+            <a:endParaRPr lang="en-AU" dirty="0"/>
           </a:p>
         </p:txBody>
       </p:sp>
@@ -7453,17 +7488,34 @@
           <a:lstStyle/>
           <a:p>
             <a:r>
-              <a:rPr lang="en-US" dirty="0" smtClean="0"/>
-              <a:t>CODE SAMPLE HERE</a:t>
-            </a:r>
-            <a:endParaRPr lang="en-US" dirty="0"/>
+              <a:rPr lang="en-AU" dirty="0" smtClean="0"/>
+              <a:t>Namespace for Windows Store App integration points</a:t>
+            </a:r>
+          </a:p>
+          <a:p>
+            <a:r>
+              <a:rPr lang="en-AU" dirty="0" smtClean="0"/>
+              <a:t>More being added all the time by Unity</a:t>
+            </a:r>
+          </a:p>
+          <a:p>
+            <a:r>
+              <a:rPr lang="en-AU" dirty="0" smtClean="0"/>
+              <a:t>Can use this or your own plugin</a:t>
+            </a:r>
+          </a:p>
+          <a:p>
+            <a:r>
+              <a:rPr lang="en-AU" dirty="0" smtClean="0"/>
+              <a:t>LIST INTERESTING CLASSES HERE</a:t>
+            </a:r>
           </a:p>
         </p:txBody>
       </p:sp>
     </p:spTree>
     <p:extLst>
       <p:ext uri="{BB962C8B-B14F-4D97-AF65-F5344CB8AC3E}">
-        <p14:creationId xmlns:p14="http://schemas.microsoft.com/office/powerpoint/2010/main" val="3745320194"/>
+        <p14:creationId xmlns:p14="http://schemas.microsoft.com/office/powerpoint/2010/main" val="357982477"/>
       </p:ext>
     </p:extLst>
   </p:cSld>
@@ -7507,7 +7559,7 @@
           <a:p>
             <a:r>
               <a:rPr lang="en-AU" dirty="0" smtClean="0"/>
-              <a:t>Cert – Required Assets</a:t>
+              <a:t>Cert – Privacy and Settings</a:t>
             </a:r>
             <a:endParaRPr lang="en-AU" dirty="0"/>
           </a:p>
@@ -7530,44 +7582,55 @@
           <a:p>
             <a:r>
               <a:rPr lang="en-AU" dirty="0" smtClean="0"/>
-              <a:t>Icons</a:t>
+              <a:t>When you need a Privacy Policy:</a:t>
             </a:r>
           </a:p>
           <a:p>
             <a:pPr lvl="1"/>
             <a:r>
               <a:rPr lang="en-AU" dirty="0" smtClean="0"/>
-              <a:t>Store Icon</a:t>
+              <a:t>When you collect personal information</a:t>
             </a:r>
           </a:p>
           <a:p>
             <a:pPr lvl="1"/>
             <a:r>
               <a:rPr lang="en-AU" dirty="0" smtClean="0"/>
-              <a:t>Medium Tile</a:t>
-            </a:r>
-          </a:p>
-          <a:p>
-            <a:pPr lvl="1"/>
-            <a:r>
-              <a:rPr lang="en-AU" dirty="0" smtClean="0"/>
-              <a:t>Small Tile</a:t>
+              <a:t>When you connect to the internet</a:t>
+            </a:r>
+          </a:p>
+          <a:p>
+            <a:pPr lvl="2"/>
+            <a:r>
+              <a:rPr lang="en-AU" dirty="0" smtClean="0"/>
+              <a:t>IP Addresses are considered personally identifiable</a:t>
             </a:r>
             <a:endParaRPr lang="en-AU" dirty="0"/>
           </a:p>
           <a:p>
             <a:r>
               <a:rPr lang="en-AU" dirty="0" smtClean="0"/>
-              <a:t>Splash Screen</a:t>
-            </a:r>
-            <a:endParaRPr lang="en-AU" dirty="0"/>
+              <a:t>Place this online at a URL that does not change</a:t>
+            </a:r>
+          </a:p>
+          <a:p>
+            <a:r>
+              <a:rPr lang="en-AU" dirty="0" smtClean="0"/>
+              <a:t>Add link to the store dashboard</a:t>
+            </a:r>
+          </a:p>
+          <a:p>
+            <a:r>
+              <a:rPr lang="en-AU" dirty="0" smtClean="0"/>
+              <a:t>Add link to app settings</a:t>
+            </a:r>
           </a:p>
         </p:txBody>
       </p:sp>
     </p:spTree>
     <p:extLst>
       <p:ext uri="{BB962C8B-B14F-4D97-AF65-F5344CB8AC3E}">
-        <p14:creationId xmlns:p14="http://schemas.microsoft.com/office/powerpoint/2010/main" val="2438723005"/>
+        <p14:creationId xmlns:p14="http://schemas.microsoft.com/office/powerpoint/2010/main" val="1562890118"/>
       </p:ext>
     </p:extLst>
   </p:cSld>
@@ -7596,6 +7659,186 @@
       </p:grpSpPr>
       <p:sp>
         <p:nvSpPr>
+          <p:cNvPr id="2" name="Title 1"/>
+          <p:cNvSpPr>
+            <a:spLocks noGrp="1"/>
+          </p:cNvSpPr>
+          <p:nvPr>
+            <p:ph type="title"/>
+          </p:nvPr>
+        </p:nvSpPr>
+        <p:spPr/>
+        <p:txBody>
+          <a:bodyPr/>
+          <a:lstStyle/>
+          <a:p>
+            <a:r>
+              <a:rPr lang="en-US" dirty="0" smtClean="0"/>
+              <a:t>App Settings</a:t>
+            </a:r>
+            <a:endParaRPr lang="en-US" dirty="0"/>
+          </a:p>
+        </p:txBody>
+      </p:sp>
+      <p:sp>
+        <p:nvSpPr>
+          <p:cNvPr id="3" name="Content Placeholder 2"/>
+          <p:cNvSpPr>
+            <a:spLocks noGrp="1"/>
+          </p:cNvSpPr>
+          <p:nvPr>
+            <p:ph idx="1"/>
+          </p:nvPr>
+        </p:nvSpPr>
+        <p:spPr/>
+        <p:txBody>
+          <a:bodyPr/>
+          <a:lstStyle/>
+          <a:p>
+            <a:r>
+              <a:rPr lang="en-US" dirty="0" smtClean="0"/>
+              <a:t>CODE SAMPLE HERE</a:t>
+            </a:r>
+            <a:endParaRPr lang="en-US" dirty="0"/>
+          </a:p>
+        </p:txBody>
+      </p:sp>
+    </p:spTree>
+    <p:extLst>
+      <p:ext uri="{BB962C8B-B14F-4D97-AF65-F5344CB8AC3E}">
+        <p14:creationId xmlns:p14="http://schemas.microsoft.com/office/powerpoint/2010/main" val="3745320194"/>
+      </p:ext>
+    </p:extLst>
+  </p:cSld>
+  <p:clrMapOvr>
+    <a:masterClrMapping/>
+  </p:clrMapOvr>
+</p:sld>
+</file>
+
+<file path=ppt/slides/slide36.xml><?xml version="1.0" encoding="utf-8"?>
+<p:sld xmlns:a="http://schemas.openxmlformats.org/drawingml/2006/main" xmlns:r="http://schemas.openxmlformats.org/officeDocument/2006/relationships" xmlns:p="http://schemas.openxmlformats.org/presentationml/2006/main">
+  <p:cSld>
+    <p:spTree>
+      <p:nvGrpSpPr>
+        <p:cNvPr id="1" name=""/>
+        <p:cNvGrpSpPr/>
+        <p:nvPr/>
+      </p:nvGrpSpPr>
+      <p:grpSpPr>
+        <a:xfrm>
+          <a:off x="0" y="0"/>
+          <a:ext cx="0" cy="0"/>
+          <a:chOff x="0" y="0"/>
+          <a:chExt cx="0" cy="0"/>
+        </a:xfrm>
+      </p:grpSpPr>
+      <p:sp>
+        <p:nvSpPr>
+          <p:cNvPr id="2" name="Title 1"/>
+          <p:cNvSpPr>
+            <a:spLocks noGrp="1"/>
+          </p:cNvSpPr>
+          <p:nvPr>
+            <p:ph type="title"/>
+          </p:nvPr>
+        </p:nvSpPr>
+        <p:spPr/>
+        <p:txBody>
+          <a:bodyPr/>
+          <a:lstStyle/>
+          <a:p>
+            <a:r>
+              <a:rPr lang="en-AU" dirty="0" smtClean="0"/>
+              <a:t>Cert – Required Assets</a:t>
+            </a:r>
+            <a:endParaRPr lang="en-AU" dirty="0"/>
+          </a:p>
+        </p:txBody>
+      </p:sp>
+      <p:sp>
+        <p:nvSpPr>
+          <p:cNvPr id="3" name="Content Placeholder 2"/>
+          <p:cNvSpPr>
+            <a:spLocks noGrp="1"/>
+          </p:cNvSpPr>
+          <p:nvPr>
+            <p:ph idx="1"/>
+          </p:nvPr>
+        </p:nvSpPr>
+        <p:spPr/>
+        <p:txBody>
+          <a:bodyPr/>
+          <a:lstStyle/>
+          <a:p>
+            <a:r>
+              <a:rPr lang="en-AU" dirty="0" smtClean="0"/>
+              <a:t>Icons</a:t>
+            </a:r>
+          </a:p>
+          <a:p>
+            <a:pPr lvl="1"/>
+            <a:r>
+              <a:rPr lang="en-AU" dirty="0" smtClean="0"/>
+              <a:t>Store Icon</a:t>
+            </a:r>
+          </a:p>
+          <a:p>
+            <a:pPr lvl="1"/>
+            <a:r>
+              <a:rPr lang="en-AU" dirty="0" smtClean="0"/>
+              <a:t>Medium Tile</a:t>
+            </a:r>
+          </a:p>
+          <a:p>
+            <a:pPr lvl="1"/>
+            <a:r>
+              <a:rPr lang="en-AU" dirty="0" smtClean="0"/>
+              <a:t>Small Tile</a:t>
+            </a:r>
+            <a:endParaRPr lang="en-AU" dirty="0"/>
+          </a:p>
+          <a:p>
+            <a:r>
+              <a:rPr lang="en-AU" dirty="0" smtClean="0"/>
+              <a:t>Splash Screen</a:t>
+            </a:r>
+            <a:endParaRPr lang="en-AU" dirty="0"/>
+          </a:p>
+        </p:txBody>
+      </p:sp>
+    </p:spTree>
+    <p:extLst>
+      <p:ext uri="{BB962C8B-B14F-4D97-AF65-F5344CB8AC3E}">
+        <p14:creationId xmlns:p14="http://schemas.microsoft.com/office/powerpoint/2010/main" val="2438723005"/>
+      </p:ext>
+    </p:extLst>
+  </p:cSld>
+  <p:clrMapOvr>
+    <a:masterClrMapping/>
+  </p:clrMapOvr>
+</p:sld>
+</file>
+
+<file path=ppt/slides/slide37.xml><?xml version="1.0" encoding="utf-8"?>
+<p:sld xmlns:a="http://schemas.openxmlformats.org/drawingml/2006/main" xmlns:r="http://schemas.openxmlformats.org/officeDocument/2006/relationships" xmlns:p="http://schemas.openxmlformats.org/presentationml/2006/main">
+  <p:cSld>
+    <p:spTree>
+      <p:nvGrpSpPr>
+        <p:cNvPr id="1" name=""/>
+        <p:cNvGrpSpPr/>
+        <p:nvPr/>
+      </p:nvGrpSpPr>
+      <p:grpSpPr>
+        <a:xfrm>
+          <a:off x="0" y="0"/>
+          <a:ext cx="0" cy="0"/>
+          <a:chOff x="0" y="0"/>
+          <a:chExt cx="0" cy="0"/>
+        </a:xfrm>
+      </p:grpSpPr>
+      <p:sp>
+        <p:nvSpPr>
           <p:cNvPr id="4" name="Title 3"/>
           <p:cNvSpPr>
             <a:spLocks noGrp="1"/>
@@ -7634,7 +7877,7 @@
           <a:p>
             <a:r>
               <a:rPr lang="en-AU" dirty="0" smtClean="0"/>
-              <a:t>Breakout – Part 2</a:t>
+              <a:t>Demo Part 2</a:t>
             </a:r>
             <a:endParaRPr lang="en-AU" dirty="0"/>
           </a:p>
@@ -7653,7 +7896,7 @@
 </p:sld>
 </file>
 
-<file path=ppt/slides/slide36.xml><?xml version="1.0" encoding="utf-8"?>
+<file path=ppt/slides/slide38.xml><?xml version="1.0" encoding="utf-8"?>
 <p:sld xmlns:a="http://schemas.openxmlformats.org/drawingml/2006/main" xmlns:r="http://schemas.openxmlformats.org/officeDocument/2006/relationships" xmlns:p="http://schemas.openxmlformats.org/presentationml/2006/main">
   <p:cSld>
     <p:spTree>
@@ -8679,7 +8922,7 @@
   <a:extraClrSchemeLst/>
   <a:extLst>
     <a:ext uri="{05A4C25C-085E-4340-85A3-A5531E510DB2}">
-      <thm15:themeFamily xmlns="" xmlns:thm15="http://schemas.microsoft.com/office/thememl/2012/main" name="Office Theme" id="{62F939B6-93AF-4DB8-9C6B-D6C7DFDC589F}" vid="{4A3C46E8-61CC-4603-A589-7422A47A8E4A}"/>
+      <thm15:themeFamily xmlns:thm15="http://schemas.microsoft.com/office/thememl/2012/main" name="Office Theme" id="{62F939B6-93AF-4DB8-9C6B-D6C7DFDC589F}" vid="{4A3C46E8-61CC-4603-A589-7422A47A8E4A}"/>
     </a:ext>
   </a:extLst>
 </a:theme>
@@ -8940,7 +9183,7 @@
   <a:extraClrSchemeLst/>
   <a:extLst>
     <a:ext uri="{05A4C25C-085E-4340-85A3-A5531E510DB2}">
-      <thm15:themeFamily xmlns="" xmlns:thm15="http://schemas.microsoft.com/office/thememl/2012/main" name="Office Theme" id="{62F939B6-93AF-4DB8-9C6B-D6C7DFDC589F}" vid="{4A3C46E8-61CC-4603-A589-7422A47A8E4A}"/>
+      <thm15:themeFamily xmlns:thm15="http://schemas.microsoft.com/office/thememl/2012/main" name="Office Theme" id="{62F939B6-93AF-4DB8-9C6B-D6C7DFDC589F}" vid="{4A3C46E8-61CC-4603-A589-7422A47A8E4A}"/>
     </a:ext>
   </a:extLst>
 </a:theme>

</xml_diff>

<commit_message>
Added a note about Unity C# Projects
</commit_message>
<xml_diff>
--- a/ST_Unity_101.pptx
+++ b/ST_Unity_101.pptx
@@ -5,7 +5,7 @@
     <p:sldMasterId id="2147483648" r:id="rId1"/>
   </p:sldMasterIdLst>
   <p:notesMasterIdLst>
-    <p:notesMasterId r:id="rId40"/>
+    <p:notesMasterId r:id="rId41"/>
   </p:notesMasterIdLst>
   <p:sldIdLst>
     <p:sldId id="256" r:id="rId2"/>
@@ -40,12 +40,13 @@
     <p:sldId id="282" r:id="rId31"/>
     <p:sldId id="283" r:id="rId32"/>
     <p:sldId id="284" r:id="rId33"/>
-    <p:sldId id="287" r:id="rId34"/>
-    <p:sldId id="285" r:id="rId35"/>
-    <p:sldId id="292" r:id="rId36"/>
-    <p:sldId id="286" r:id="rId37"/>
-    <p:sldId id="288" r:id="rId38"/>
-    <p:sldId id="291" r:id="rId39"/>
+    <p:sldId id="295" r:id="rId34"/>
+    <p:sldId id="287" r:id="rId35"/>
+    <p:sldId id="285" r:id="rId36"/>
+    <p:sldId id="292" r:id="rId37"/>
+    <p:sldId id="286" r:id="rId38"/>
+    <p:sldId id="288" r:id="rId39"/>
+    <p:sldId id="291" r:id="rId40"/>
   </p:sldIdLst>
   <p:sldSz cx="12192000" cy="6858000"/>
   <p:notesSz cx="6858000" cy="9144000"/>
@@ -205,6 +206,7 @@
             <p14:sldId id="282"/>
             <p14:sldId id="283"/>
             <p14:sldId id="284"/>
+            <p14:sldId id="295"/>
             <p14:sldId id="287"/>
             <p14:sldId id="285"/>
             <p14:sldId id="292"/>
@@ -806,7 +808,7 @@
           <a:p>
             <a:fld id="{814B4410-C701-44AF-9574-9C423ED2E94B}" type="slidenum">
               <a:rPr lang="en-AU" smtClean="0"/>
-              <a:t>33</a:t>
+              <a:t>34</a:t>
             </a:fld>
             <a:endParaRPr lang="en-AU"/>
           </a:p>
@@ -7564,116 +7566,101 @@
           <a:lstStyle/>
           <a:p>
             <a:r>
+              <a:rPr lang="en-AU" dirty="0" smtClean="0"/>
+              <a:t>Editing Scripts Without Rebuilding</a:t>
+            </a:r>
+            <a:endParaRPr lang="en-AU" dirty="0"/>
+          </a:p>
+        </p:txBody>
+      </p:sp>
+      <p:sp>
+        <p:nvSpPr>
+          <p:cNvPr id="3" name="Content Placeholder 2"/>
+          <p:cNvSpPr>
+            <a:spLocks noGrp="1"/>
+          </p:cNvSpPr>
+          <p:nvPr>
+            <p:ph idx="1"/>
+          </p:nvPr>
+        </p:nvSpPr>
+        <p:spPr/>
+        <p:txBody>
+          <a:bodyPr/>
+          <a:lstStyle/>
+          <a:p>
+            <a:r>
+              <a:rPr lang="en-AU" dirty="0" smtClean="0"/>
+              <a:t>Windows Store Apps only</a:t>
+            </a:r>
+          </a:p>
+          <a:p>
+            <a:r>
+              <a:rPr lang="en-AU" dirty="0" smtClean="0"/>
+              <a:t>When building, select Unity C# Projects</a:t>
+            </a:r>
+          </a:p>
+          <a:p>
+            <a:r>
+              <a:rPr lang="en-AU" dirty="0" smtClean="0"/>
+              <a:t>Output solution has script projects</a:t>
+            </a:r>
+          </a:p>
+          <a:p>
+            <a:r>
+              <a:rPr lang="en-AU" dirty="0" smtClean="0"/>
+              <a:t>Edit</a:t>
+            </a:r>
+            <a:r>
+              <a:rPr lang="en-AU" smtClean="0"/>
+              <a:t>, F5, Profit</a:t>
+            </a:r>
+            <a:endParaRPr lang="en-AU" dirty="0" smtClean="0"/>
+          </a:p>
+          <a:p>
+            <a:endParaRPr lang="en-AU" dirty="0"/>
+          </a:p>
+          <a:p>
+            <a:r>
+              <a:rPr lang="en-AU" dirty="0" smtClean="0"/>
+              <a:t>Caveat:</a:t>
+            </a:r>
+          </a:p>
+          <a:p>
+            <a:pPr lvl="1"/>
+            <a:r>
+              <a:rPr lang="en-AU" dirty="0" smtClean="0"/>
+              <a:t>Do not change any serialized properties</a:t>
+            </a:r>
+          </a:p>
+          <a:p>
+            <a:pPr lvl="2"/>
+            <a:r>
+              <a:rPr lang="en-AU" dirty="0" smtClean="0"/>
+              <a:t>Public</a:t>
+            </a:r>
+          </a:p>
+          <a:p>
+            <a:pPr lvl="2"/>
+            <a:r>
+              <a:rPr lang="en-AU" dirty="0" smtClean="0"/>
+              <a:t>[</a:t>
+            </a:r>
+            <a:r>
               <a:rPr lang="en-AU" dirty="0" err="1" smtClean="0"/>
-              <a:t>UnityEngine.WSA</a:t>
+              <a:t>Serializable</a:t>
+            </a:r>
+            <a:r>
+              <a:rPr lang="en-AU" dirty="0" smtClean="0"/>
+              <a:t>]</a:t>
             </a:r>
             <a:endParaRPr lang="en-AU" dirty="0"/>
-          </a:p>
-        </p:txBody>
-      </p:sp>
-      <p:sp>
-        <p:nvSpPr>
-          <p:cNvPr id="3" name="Content Placeholder 2"/>
-          <p:cNvSpPr>
-            <a:spLocks noGrp="1"/>
-          </p:cNvSpPr>
-          <p:nvPr>
-            <p:ph idx="1"/>
-          </p:nvPr>
-        </p:nvSpPr>
-        <p:spPr/>
-        <p:txBody>
-          <a:bodyPr>
-            <a:normAutofit lnSpcReduction="10000"/>
-          </a:bodyPr>
-          <a:lstStyle/>
-          <a:p>
-            <a:r>
-              <a:rPr lang="en-AU" dirty="0" smtClean="0"/>
-              <a:t>Namespace for Windows Store App integration points</a:t>
-            </a:r>
-          </a:p>
-          <a:p>
-            <a:r>
-              <a:rPr lang="en-AU" dirty="0" smtClean="0"/>
-              <a:t>More being added all the time by Unity</a:t>
-            </a:r>
-          </a:p>
-          <a:p>
-            <a:r>
-              <a:rPr lang="en-AU" dirty="0" smtClean="0"/>
-              <a:t>Can use this or your own </a:t>
-            </a:r>
-            <a:r>
-              <a:rPr lang="en-AU" dirty="0" smtClean="0"/>
-              <a:t>plugin</a:t>
-            </a:r>
-          </a:p>
-          <a:p>
-            <a:pPr lvl="1"/>
-            <a:r>
-              <a:rPr lang="en-AU" dirty="0" err="1" smtClean="0"/>
-              <a:t>UnityEngine.WSA.Tile</a:t>
-            </a:r>
-            <a:endParaRPr lang="en-AU" dirty="0" smtClean="0"/>
-          </a:p>
-          <a:p>
-            <a:pPr lvl="1"/>
-            <a:r>
-              <a:rPr lang="en-AU" dirty="0" err="1" smtClean="0"/>
-              <a:t>UnityEngine.WSA.SecondaryTile</a:t>
-            </a:r>
-            <a:endParaRPr lang="en-AU" dirty="0" smtClean="0"/>
-          </a:p>
-          <a:p>
-            <a:pPr lvl="1"/>
-            <a:r>
-              <a:rPr lang="en-AU" dirty="0" err="1" smtClean="0"/>
-              <a:t>UnityEngine.WSA.Toast</a:t>
-            </a:r>
-            <a:endParaRPr lang="en-AU" dirty="0" smtClean="0"/>
-          </a:p>
-          <a:p>
-            <a:pPr lvl="1"/>
-            <a:endParaRPr lang="en-AU" dirty="0"/>
-          </a:p>
-          <a:p>
-            <a:r>
-              <a:rPr lang="en-AU" dirty="0" err="1" smtClean="0"/>
-              <a:t>UnityEngine.Windows.LicenseInformation</a:t>
-            </a:r>
-            <a:endParaRPr lang="en-AU" dirty="0" smtClean="0"/>
-          </a:p>
-          <a:p>
-            <a:pPr lvl="1"/>
-            <a:r>
-              <a:rPr lang="en-AU" dirty="0" smtClean="0"/>
-              <a:t>.</a:t>
-            </a:r>
-            <a:r>
-              <a:rPr lang="en-AU" dirty="0" err="1" smtClean="0"/>
-              <a:t>IsOnAppTrial</a:t>
-            </a:r>
-            <a:endParaRPr lang="en-AU" dirty="0" smtClean="0"/>
-          </a:p>
-          <a:p>
-            <a:pPr lvl="1"/>
-            <a:r>
-              <a:rPr lang="en-AU" dirty="0" err="1" smtClean="0"/>
-              <a:t>PurchaseApp</a:t>
-            </a:r>
-            <a:r>
-              <a:rPr lang="en-AU" dirty="0" smtClean="0"/>
-              <a:t>()</a:t>
-            </a:r>
-            <a:endParaRPr lang="en-AU" dirty="0" smtClean="0"/>
           </a:p>
         </p:txBody>
       </p:sp>
     </p:spTree>
     <p:extLst>
       <p:ext uri="{BB962C8B-B14F-4D97-AF65-F5344CB8AC3E}">
-        <p14:creationId xmlns:p14="http://schemas.microsoft.com/office/powerpoint/2010/main" val="357982477"/>
+        <p14:creationId xmlns:p14="http://schemas.microsoft.com/office/powerpoint/2010/main" val="3332073422"/>
       </p:ext>
     </p:extLst>
   </p:cSld>
@@ -7716,8 +7703,8 @@
           <a:lstStyle/>
           <a:p>
             <a:r>
-              <a:rPr lang="en-AU" dirty="0" smtClean="0"/>
-              <a:t>Cert – Privacy and Settings</a:t>
+              <a:rPr lang="en-AU" dirty="0" err="1" smtClean="0"/>
+              <a:t>UnityEngine.WSA</a:t>
             </a:r>
             <a:endParaRPr lang="en-AU" dirty="0"/>
           </a:p>
@@ -7735,60 +7722,97 @@
         </p:nvSpPr>
         <p:spPr/>
         <p:txBody>
-          <a:bodyPr/>
-          <a:lstStyle/>
-          <a:p>
-            <a:r>
-              <a:rPr lang="en-AU" dirty="0" smtClean="0"/>
-              <a:t>When you need a Privacy Policy:</a:t>
+          <a:bodyPr>
+            <a:normAutofit lnSpcReduction="10000"/>
+          </a:bodyPr>
+          <a:lstStyle/>
+          <a:p>
+            <a:r>
+              <a:rPr lang="en-AU" dirty="0" smtClean="0"/>
+              <a:t>Namespace for Windows Store App integration points</a:t>
+            </a:r>
+          </a:p>
+          <a:p>
+            <a:r>
+              <a:rPr lang="en-AU" dirty="0" smtClean="0"/>
+              <a:t>More being added all the time by Unity</a:t>
+            </a:r>
+          </a:p>
+          <a:p>
+            <a:r>
+              <a:rPr lang="en-AU" dirty="0" smtClean="0"/>
+              <a:t>Can use this or your own </a:t>
+            </a:r>
+            <a:r>
+              <a:rPr lang="en-AU" dirty="0" smtClean="0"/>
+              <a:t>plugin</a:t>
             </a:r>
           </a:p>
           <a:p>
             <a:pPr lvl="1"/>
             <a:r>
-              <a:rPr lang="en-AU" dirty="0" smtClean="0"/>
-              <a:t>When you collect personal information</a:t>
-            </a:r>
+              <a:rPr lang="en-AU" dirty="0" err="1" smtClean="0"/>
+              <a:t>UnityEngine.WSA.Tile</a:t>
+            </a:r>
+            <a:endParaRPr lang="en-AU" dirty="0" smtClean="0"/>
           </a:p>
           <a:p>
             <a:pPr lvl="1"/>
             <a:r>
-              <a:rPr lang="en-AU" dirty="0" smtClean="0"/>
-              <a:t>When you connect to the internet</a:t>
-            </a:r>
-          </a:p>
-          <a:p>
-            <a:pPr lvl="2"/>
-            <a:r>
-              <a:rPr lang="en-AU" dirty="0" smtClean="0"/>
-              <a:t>IP Addresses are considered personally identifiable</a:t>
-            </a:r>
+              <a:rPr lang="en-AU" dirty="0" err="1" smtClean="0"/>
+              <a:t>UnityEngine.WSA.SecondaryTile</a:t>
+            </a:r>
+            <a:endParaRPr lang="en-AU" dirty="0" smtClean="0"/>
+          </a:p>
+          <a:p>
+            <a:pPr lvl="1"/>
+            <a:r>
+              <a:rPr lang="en-AU" dirty="0" err="1" smtClean="0"/>
+              <a:t>UnityEngine.WSA.Toast</a:t>
+            </a:r>
+            <a:endParaRPr lang="en-AU" dirty="0" smtClean="0"/>
+          </a:p>
+          <a:p>
+            <a:pPr lvl="1"/>
             <a:endParaRPr lang="en-AU" dirty="0"/>
           </a:p>
           <a:p>
             <a:r>
-              <a:rPr lang="en-AU" dirty="0" smtClean="0"/>
-              <a:t>Place this online at a URL that does not change</a:t>
-            </a:r>
-          </a:p>
-          <a:p>
-            <a:r>
-              <a:rPr lang="en-AU" dirty="0" smtClean="0"/>
-              <a:t>Add link to the store dashboard</a:t>
-            </a:r>
-          </a:p>
-          <a:p>
-            <a:r>
-              <a:rPr lang="en-AU" dirty="0" smtClean="0"/>
-              <a:t>Add link to app settings</a:t>
-            </a:r>
+              <a:rPr lang="en-AU" dirty="0" err="1" smtClean="0"/>
+              <a:t>UnityEngine.Windows.LicenseInformation</a:t>
+            </a:r>
+            <a:endParaRPr lang="en-AU" dirty="0" smtClean="0"/>
+          </a:p>
+          <a:p>
+            <a:pPr lvl="1"/>
+            <a:r>
+              <a:rPr lang="en-AU" dirty="0" smtClean="0"/>
+              <a:t>.</a:t>
+            </a:r>
+            <a:r>
+              <a:rPr lang="en-AU" dirty="0" err="1" smtClean="0"/>
+              <a:t>IsOnAppTrial</a:t>
+            </a:r>
+            <a:endParaRPr lang="en-AU" dirty="0" smtClean="0"/>
+          </a:p>
+          <a:p>
+            <a:pPr lvl="1"/>
+            <a:r>
+              <a:rPr lang="en-AU" dirty="0" err="1" smtClean="0"/>
+              <a:t>PurchaseApp</a:t>
+            </a:r>
+            <a:r>
+              <a:rPr lang="en-AU" dirty="0" smtClean="0"/>
+              <a:t>()</a:t>
+            </a:r>
+            <a:endParaRPr lang="en-AU" dirty="0" smtClean="0"/>
           </a:p>
         </p:txBody>
       </p:sp>
     </p:spTree>
     <p:extLst>
       <p:ext uri="{BB962C8B-B14F-4D97-AF65-F5344CB8AC3E}">
-        <p14:creationId xmlns:p14="http://schemas.microsoft.com/office/powerpoint/2010/main" val="1562890118"/>
+        <p14:creationId xmlns:p14="http://schemas.microsoft.com/office/powerpoint/2010/main" val="357982477"/>
       </p:ext>
     </p:extLst>
   </p:cSld>
@@ -7831,10 +7855,10 @@
           <a:lstStyle/>
           <a:p>
             <a:r>
-              <a:rPr lang="en-US" dirty="0" smtClean="0"/>
-              <a:t>App Settings</a:t>
-            </a:r>
-            <a:endParaRPr lang="en-US" dirty="0"/>
+              <a:rPr lang="en-AU" dirty="0" smtClean="0"/>
+              <a:t>Cert – Privacy and Settings</a:t>
+            </a:r>
+            <a:endParaRPr lang="en-AU" dirty="0"/>
           </a:p>
         </p:txBody>
       </p:sp>
@@ -7854,17 +7878,56 @@
           <a:lstStyle/>
           <a:p>
             <a:r>
-              <a:rPr lang="en-US" dirty="0" smtClean="0"/>
-              <a:t>CODE SAMPLE HERE</a:t>
-            </a:r>
-            <a:endParaRPr lang="en-US" dirty="0"/>
+              <a:rPr lang="en-AU" dirty="0" smtClean="0"/>
+              <a:t>When you need a Privacy Policy:</a:t>
+            </a:r>
+          </a:p>
+          <a:p>
+            <a:pPr lvl="1"/>
+            <a:r>
+              <a:rPr lang="en-AU" dirty="0" smtClean="0"/>
+              <a:t>When you collect personal information</a:t>
+            </a:r>
+          </a:p>
+          <a:p>
+            <a:pPr lvl="1"/>
+            <a:r>
+              <a:rPr lang="en-AU" dirty="0" smtClean="0"/>
+              <a:t>When you connect to the internet</a:t>
+            </a:r>
+          </a:p>
+          <a:p>
+            <a:pPr lvl="2"/>
+            <a:r>
+              <a:rPr lang="en-AU" dirty="0" smtClean="0"/>
+              <a:t>IP Addresses are considered personally identifiable</a:t>
+            </a:r>
+            <a:endParaRPr lang="en-AU" dirty="0"/>
+          </a:p>
+          <a:p>
+            <a:r>
+              <a:rPr lang="en-AU" dirty="0" smtClean="0"/>
+              <a:t>Place this online at a URL that does not change</a:t>
+            </a:r>
+          </a:p>
+          <a:p>
+            <a:r>
+              <a:rPr lang="en-AU" dirty="0" smtClean="0"/>
+              <a:t>Add link to the store dashboard</a:t>
+            </a:r>
+          </a:p>
+          <a:p>
+            <a:r>
+              <a:rPr lang="en-AU" dirty="0" smtClean="0"/>
+              <a:t>Add link to app settings</a:t>
+            </a:r>
           </a:p>
         </p:txBody>
       </p:sp>
     </p:spTree>
     <p:extLst>
       <p:ext uri="{BB962C8B-B14F-4D97-AF65-F5344CB8AC3E}">
-        <p14:creationId xmlns:p14="http://schemas.microsoft.com/office/powerpoint/2010/main" val="3745320194"/>
+        <p14:creationId xmlns:p14="http://schemas.microsoft.com/office/powerpoint/2010/main" val="1562890118"/>
       </p:ext>
     </p:extLst>
   </p:cSld>
@@ -7907,14 +7970,10 @@
           <a:lstStyle/>
           <a:p>
             <a:r>
-              <a:rPr lang="en-AU" dirty="0" smtClean="0"/>
-              <a:t>Cert – </a:t>
-            </a:r>
-            <a:r>
-              <a:rPr lang="en-AU" dirty="0" smtClean="0"/>
-              <a:t>Icons</a:t>
-            </a:r>
-            <a:endParaRPr lang="en-AU" dirty="0"/>
+              <a:rPr lang="en-US" dirty="0" smtClean="0"/>
+              <a:t>App Settings</a:t>
+            </a:r>
+            <a:endParaRPr lang="en-US" dirty="0"/>
           </a:p>
         </p:txBody>
       </p:sp>
@@ -7934,91 +7993,17 @@
           <a:lstStyle/>
           <a:p>
             <a:r>
-              <a:rPr lang="en-AU" dirty="0" smtClean="0"/>
-              <a:t>Icons</a:t>
-            </a:r>
-          </a:p>
-          <a:p>
-            <a:pPr lvl="1"/>
-            <a:r>
-              <a:rPr lang="en-AU" dirty="0" smtClean="0"/>
-              <a:t>Store </a:t>
-            </a:r>
-            <a:r>
-              <a:rPr lang="en-AU" dirty="0" smtClean="0"/>
-              <a:t>Icon (50x50)</a:t>
-            </a:r>
-            <a:endParaRPr lang="en-AU" dirty="0" smtClean="0"/>
-          </a:p>
-          <a:p>
-            <a:pPr lvl="1"/>
-            <a:r>
-              <a:rPr lang="en-AU" dirty="0" smtClean="0"/>
-              <a:t>Medium </a:t>
-            </a:r>
-            <a:r>
-              <a:rPr lang="en-AU" dirty="0" smtClean="0"/>
-              <a:t>Tile (150x150)</a:t>
-            </a:r>
-            <a:endParaRPr lang="en-AU" dirty="0" smtClean="0"/>
-          </a:p>
-          <a:p>
-            <a:pPr lvl="1"/>
-            <a:r>
-              <a:rPr lang="en-AU" dirty="0" smtClean="0"/>
-              <a:t>Small </a:t>
-            </a:r>
-            <a:r>
-              <a:rPr lang="en-AU" dirty="0" smtClean="0"/>
-              <a:t>Tile (70x70)</a:t>
-            </a:r>
-          </a:p>
-          <a:p>
-            <a:pPr lvl="1"/>
-            <a:r>
-              <a:rPr lang="en-AU" dirty="0" smtClean="0"/>
-              <a:t>Wide (310x150)</a:t>
-            </a:r>
-          </a:p>
-          <a:p>
-            <a:pPr lvl="1"/>
-            <a:r>
-              <a:rPr lang="en-AU" dirty="0" smtClean="0"/>
-              <a:t>Large (310x310)</a:t>
-            </a:r>
-          </a:p>
-          <a:p>
-            <a:pPr lvl="1"/>
-            <a:r>
-              <a:rPr lang="en-AU" dirty="0" smtClean="0"/>
-              <a:t>Square (30x30)</a:t>
-            </a:r>
-            <a:endParaRPr lang="en-AU" dirty="0"/>
-          </a:p>
-          <a:p>
-            <a:r>
-              <a:rPr lang="en-AU" dirty="0" smtClean="0"/>
-              <a:t>Splash </a:t>
-            </a:r>
-            <a:r>
-              <a:rPr lang="en-AU" dirty="0" smtClean="0"/>
-              <a:t>Screen (620x300)</a:t>
-            </a:r>
-          </a:p>
-          <a:p>
-            <a:pPr lvl="1"/>
-            <a:r>
-              <a:rPr lang="en-AU" dirty="0" smtClean="0"/>
-              <a:t>Rest of screen is filled with a specified colour</a:t>
-            </a:r>
-            <a:endParaRPr lang="en-AU" dirty="0"/>
+              <a:rPr lang="en-US" dirty="0" smtClean="0"/>
+              <a:t>CODE SAMPLE HERE</a:t>
+            </a:r>
+            <a:endParaRPr lang="en-US" dirty="0"/>
           </a:p>
         </p:txBody>
       </p:sp>
     </p:spTree>
     <p:extLst>
       <p:ext uri="{BB962C8B-B14F-4D97-AF65-F5344CB8AC3E}">
-        <p14:creationId xmlns:p14="http://schemas.microsoft.com/office/powerpoint/2010/main" val="2438723005"/>
+        <p14:creationId xmlns:p14="http://schemas.microsoft.com/office/powerpoint/2010/main" val="3745320194"/>
       </p:ext>
     </p:extLst>
   </p:cSld>
@@ -8047,6 +8032,160 @@
       </p:grpSpPr>
       <p:sp>
         <p:nvSpPr>
+          <p:cNvPr id="2" name="Title 1"/>
+          <p:cNvSpPr>
+            <a:spLocks noGrp="1"/>
+          </p:cNvSpPr>
+          <p:nvPr>
+            <p:ph type="title"/>
+          </p:nvPr>
+        </p:nvSpPr>
+        <p:spPr/>
+        <p:txBody>
+          <a:bodyPr/>
+          <a:lstStyle/>
+          <a:p>
+            <a:r>
+              <a:rPr lang="en-AU" dirty="0" smtClean="0"/>
+              <a:t>Cert – </a:t>
+            </a:r>
+            <a:r>
+              <a:rPr lang="en-AU" dirty="0" smtClean="0"/>
+              <a:t>Icons</a:t>
+            </a:r>
+            <a:endParaRPr lang="en-AU" dirty="0"/>
+          </a:p>
+        </p:txBody>
+      </p:sp>
+      <p:sp>
+        <p:nvSpPr>
+          <p:cNvPr id="3" name="Content Placeholder 2"/>
+          <p:cNvSpPr>
+            <a:spLocks noGrp="1"/>
+          </p:cNvSpPr>
+          <p:nvPr>
+            <p:ph idx="1"/>
+          </p:nvPr>
+        </p:nvSpPr>
+        <p:spPr/>
+        <p:txBody>
+          <a:bodyPr/>
+          <a:lstStyle/>
+          <a:p>
+            <a:r>
+              <a:rPr lang="en-AU" dirty="0" smtClean="0"/>
+              <a:t>Icons</a:t>
+            </a:r>
+          </a:p>
+          <a:p>
+            <a:pPr lvl="1"/>
+            <a:r>
+              <a:rPr lang="en-AU" dirty="0" smtClean="0"/>
+              <a:t>Store </a:t>
+            </a:r>
+            <a:r>
+              <a:rPr lang="en-AU" dirty="0" smtClean="0"/>
+              <a:t>Icon (50x50)</a:t>
+            </a:r>
+            <a:endParaRPr lang="en-AU" dirty="0" smtClean="0"/>
+          </a:p>
+          <a:p>
+            <a:pPr lvl="1"/>
+            <a:r>
+              <a:rPr lang="en-AU" dirty="0" smtClean="0"/>
+              <a:t>Medium </a:t>
+            </a:r>
+            <a:r>
+              <a:rPr lang="en-AU" dirty="0" smtClean="0"/>
+              <a:t>Tile (150x150)</a:t>
+            </a:r>
+            <a:endParaRPr lang="en-AU" dirty="0" smtClean="0"/>
+          </a:p>
+          <a:p>
+            <a:pPr lvl="1"/>
+            <a:r>
+              <a:rPr lang="en-AU" dirty="0" smtClean="0"/>
+              <a:t>Small </a:t>
+            </a:r>
+            <a:r>
+              <a:rPr lang="en-AU" dirty="0" smtClean="0"/>
+              <a:t>Tile (70x70)</a:t>
+            </a:r>
+          </a:p>
+          <a:p>
+            <a:pPr lvl="1"/>
+            <a:r>
+              <a:rPr lang="en-AU" dirty="0" smtClean="0"/>
+              <a:t>Wide (310x150)</a:t>
+            </a:r>
+          </a:p>
+          <a:p>
+            <a:pPr lvl="1"/>
+            <a:r>
+              <a:rPr lang="en-AU" dirty="0" smtClean="0"/>
+              <a:t>Large (310x310)</a:t>
+            </a:r>
+          </a:p>
+          <a:p>
+            <a:pPr lvl="1"/>
+            <a:r>
+              <a:rPr lang="en-AU" dirty="0" smtClean="0"/>
+              <a:t>Square (30x30)</a:t>
+            </a:r>
+            <a:endParaRPr lang="en-AU" dirty="0"/>
+          </a:p>
+          <a:p>
+            <a:r>
+              <a:rPr lang="en-AU" dirty="0" smtClean="0"/>
+              <a:t>Splash </a:t>
+            </a:r>
+            <a:r>
+              <a:rPr lang="en-AU" dirty="0" smtClean="0"/>
+              <a:t>Screen (620x300)</a:t>
+            </a:r>
+          </a:p>
+          <a:p>
+            <a:pPr lvl="1"/>
+            <a:r>
+              <a:rPr lang="en-AU" dirty="0" smtClean="0"/>
+              <a:t>Rest of screen is filled with a specified colour</a:t>
+            </a:r>
+            <a:endParaRPr lang="en-AU" dirty="0"/>
+          </a:p>
+        </p:txBody>
+      </p:sp>
+    </p:spTree>
+    <p:extLst>
+      <p:ext uri="{BB962C8B-B14F-4D97-AF65-F5344CB8AC3E}">
+        <p14:creationId xmlns:p14="http://schemas.microsoft.com/office/powerpoint/2010/main" val="2438723005"/>
+      </p:ext>
+    </p:extLst>
+  </p:cSld>
+  <p:clrMapOvr>
+    <a:masterClrMapping/>
+  </p:clrMapOvr>
+</p:sld>
+</file>
+
+<file path=ppt/slides/slide38.xml><?xml version="1.0" encoding="utf-8"?>
+<p:sld xmlns:a="http://schemas.openxmlformats.org/drawingml/2006/main" xmlns:r="http://schemas.openxmlformats.org/officeDocument/2006/relationships" xmlns:p="http://schemas.openxmlformats.org/presentationml/2006/main">
+  <p:cSld>
+    <p:spTree>
+      <p:nvGrpSpPr>
+        <p:cNvPr id="1" name=""/>
+        <p:cNvGrpSpPr/>
+        <p:nvPr/>
+      </p:nvGrpSpPr>
+      <p:grpSpPr>
+        <a:xfrm>
+          <a:off x="0" y="0"/>
+          <a:ext cx="0" cy="0"/>
+          <a:chOff x="0" y="0"/>
+          <a:chExt cx="0" cy="0"/>
+        </a:xfrm>
+      </p:grpSpPr>
+      <p:sp>
+        <p:nvSpPr>
           <p:cNvPr id="4" name="Title 3"/>
           <p:cNvSpPr>
             <a:spLocks noGrp="1"/>
@@ -8104,7 +8243,7 @@
 </p:sld>
 </file>
 
-<file path=ppt/slides/slide38.xml><?xml version="1.0" encoding="utf-8"?>
+<file path=ppt/slides/slide39.xml><?xml version="1.0" encoding="utf-8"?>
 <p:sld xmlns:a="http://schemas.openxmlformats.org/drawingml/2006/main" xmlns:r="http://schemas.openxmlformats.org/officeDocument/2006/relationships" xmlns:p="http://schemas.openxmlformats.org/presentationml/2006/main">
   <p:cSld>
     <p:spTree>

</xml_diff>

<commit_message>
Build instructions and folder anatomy
</commit_message>
<xml_diff>
--- a/ST_Unity_101.pptx
+++ b/ST_Unity_101.pptx
@@ -5,7 +5,7 @@
     <p:sldMasterId id="2147483648" r:id="rId1"/>
   </p:sldMasterIdLst>
   <p:notesMasterIdLst>
-    <p:notesMasterId r:id="rId41"/>
+    <p:notesMasterId r:id="rId45"/>
   </p:notesMasterIdLst>
   <p:sldIdLst>
     <p:sldId id="256" r:id="rId2"/>
@@ -36,17 +36,21 @@
     <p:sldId id="280" r:id="rId27"/>
     <p:sldId id="294" r:id="rId28"/>
     <p:sldId id="268" r:id="rId29"/>
-    <p:sldId id="281" r:id="rId30"/>
-    <p:sldId id="282" r:id="rId31"/>
-    <p:sldId id="283" r:id="rId32"/>
-    <p:sldId id="284" r:id="rId33"/>
-    <p:sldId id="295" r:id="rId34"/>
-    <p:sldId id="287" r:id="rId35"/>
-    <p:sldId id="285" r:id="rId36"/>
-    <p:sldId id="292" r:id="rId37"/>
-    <p:sldId id="286" r:id="rId38"/>
-    <p:sldId id="288" r:id="rId39"/>
-    <p:sldId id="291" r:id="rId40"/>
+    <p:sldId id="296" r:id="rId30"/>
+    <p:sldId id="281" r:id="rId31"/>
+    <p:sldId id="282" r:id="rId32"/>
+    <p:sldId id="283" r:id="rId33"/>
+    <p:sldId id="298" r:id="rId34"/>
+    <p:sldId id="299" r:id="rId35"/>
+    <p:sldId id="284" r:id="rId36"/>
+    <p:sldId id="295" r:id="rId37"/>
+    <p:sldId id="287" r:id="rId38"/>
+    <p:sldId id="285" r:id="rId39"/>
+    <p:sldId id="292" r:id="rId40"/>
+    <p:sldId id="286" r:id="rId41"/>
+    <p:sldId id="297" r:id="rId42"/>
+    <p:sldId id="288" r:id="rId43"/>
+    <p:sldId id="291" r:id="rId44"/>
   </p:sldIdLst>
   <p:sldSz cx="12192000" cy="6858000"/>
   <p:notesSz cx="6858000" cy="9144000"/>
@@ -200,17 +204,25 @@
             <p14:sldId id="268"/>
           </p14:sldIdLst>
         </p14:section>
+        <p14:section name="Asset Store" id="{0943070C-6626-4867-8F89-71597D9FA84D}">
+          <p14:sldIdLst>
+            <p14:sldId id="296"/>
+          </p14:sldIdLst>
+        </p14:section>
         <p14:section name="Windows Store" id="{CBC1A5D8-8810-4DAF-B6DA-FB980527046C}">
           <p14:sldIdLst>
             <p14:sldId id="281"/>
             <p14:sldId id="282"/>
             <p14:sldId id="283"/>
+            <p14:sldId id="298"/>
+            <p14:sldId id="299"/>
             <p14:sldId id="284"/>
             <p14:sldId id="295"/>
             <p14:sldId id="287"/>
             <p14:sldId id="285"/>
             <p14:sldId id="292"/>
             <p14:sldId id="286"/>
+            <p14:sldId id="297"/>
           </p14:sldIdLst>
         </p14:section>
         <p14:section name="Demo - Breakout (+WinStore)" id="{7A304B9A-F9EC-4AEC-99A9-3184F06484EF}">
@@ -325,7 +337,7 @@
           <a:p>
             <a:fld id="{A724FAEC-7584-44B3-B386-6ADB31723F26}" type="datetimeFigureOut">
               <a:rPr lang="en-AU" smtClean="0"/>
-              <a:t>9/06/2014</a:t>
+              <a:t>11/06/2014</a:t>
             </a:fld>
             <a:endParaRPr lang="en-AU"/>
           </a:p>
@@ -781,11 +793,281 @@
           <a:p>
             <a:r>
               <a:rPr lang="en-AU" dirty="0" smtClean="0"/>
-              <a:t>Look</a:t>
+              <a:t>Talk</a:t>
             </a:r>
             <a:r>
               <a:rPr lang="en-AU" baseline="0" dirty="0" smtClean="0"/>
-              <a:t> into things like resizing and other hooks that can be used, hint at things for sharing and other APIs that won’t be covered in detail</a:t>
+              <a:t> about the asset store, feel free to suggest useful plugins. Demonstrate the asset store in client or at http://assetstore.unity3d.com</a:t>
+            </a:r>
+            <a:endParaRPr lang="en-AU" dirty="0"/>
+          </a:p>
+        </p:txBody>
+      </p:sp>
+      <p:sp>
+        <p:nvSpPr>
+          <p:cNvPr id="4" name="Slide Number Placeholder 3"/>
+          <p:cNvSpPr>
+            <a:spLocks noGrp="1"/>
+          </p:cNvSpPr>
+          <p:nvPr>
+            <p:ph type="sldNum" sz="quarter" idx="10"/>
+          </p:nvPr>
+        </p:nvSpPr>
+        <p:spPr/>
+        <p:txBody>
+          <a:bodyPr/>
+          <a:lstStyle/>
+          <a:p>
+            <a:fld id="{814B4410-C701-44AF-9574-9C423ED2E94B}" type="slidenum">
+              <a:rPr lang="en-AU" smtClean="0"/>
+              <a:t>29</a:t>
+            </a:fld>
+            <a:endParaRPr lang="en-AU"/>
+          </a:p>
+        </p:txBody>
+      </p:sp>
+    </p:spTree>
+    <p:extLst>
+      <p:ext uri="{BB962C8B-B14F-4D97-AF65-F5344CB8AC3E}">
+        <p14:creationId xmlns:p14="http://schemas.microsoft.com/office/powerpoint/2010/main" val="2657638288"/>
+      </p:ext>
+    </p:extLst>
+  </p:cSld>
+  <p:clrMapOvr>
+    <a:masterClrMapping/>
+  </p:clrMapOvr>
+</p:notes>
+</file>
+
+<file path=ppt/notesSlides/notesSlide11.xml><?xml version="1.0" encoding="utf-8"?>
+<p:notes xmlns:a="http://schemas.openxmlformats.org/drawingml/2006/main" xmlns:r="http://schemas.openxmlformats.org/officeDocument/2006/relationships" xmlns:p="http://schemas.openxmlformats.org/presentationml/2006/main">
+  <p:cSld>
+    <p:spTree>
+      <p:nvGrpSpPr>
+        <p:cNvPr id="1" name=""/>
+        <p:cNvGrpSpPr/>
+        <p:nvPr/>
+      </p:nvGrpSpPr>
+      <p:grpSpPr>
+        <a:xfrm>
+          <a:off x="0" y="0"/>
+          <a:ext cx="0" cy="0"/>
+          <a:chOff x="0" y="0"/>
+          <a:chExt cx="0" cy="0"/>
+        </a:xfrm>
+      </p:grpSpPr>
+      <p:sp>
+        <p:nvSpPr>
+          <p:cNvPr id="2" name="Slide Image Placeholder 1"/>
+          <p:cNvSpPr>
+            <a:spLocks noGrp="1" noRot="1" noChangeAspect="1"/>
+          </p:cNvSpPr>
+          <p:nvPr>
+            <p:ph type="sldImg"/>
+          </p:nvPr>
+        </p:nvSpPr>
+        <p:spPr/>
+      </p:sp>
+      <p:sp>
+        <p:nvSpPr>
+          <p:cNvPr id="3" name="Notes Placeholder 2"/>
+          <p:cNvSpPr>
+            <a:spLocks noGrp="1"/>
+          </p:cNvSpPr>
+          <p:nvPr>
+            <p:ph type="body" idx="1"/>
+          </p:nvPr>
+        </p:nvSpPr>
+        <p:spPr/>
+        <p:txBody>
+          <a:bodyPr/>
+          <a:lstStyle/>
+          <a:p>
+            <a:r>
+              <a:rPr lang="en-AU" dirty="0" smtClean="0"/>
+              <a:t>Explain the different</a:t>
+            </a:r>
+            <a:r>
+              <a:rPr lang="en-AU" baseline="0" dirty="0" smtClean="0"/>
+              <a:t> files generated by Unity. Red items indicate which files can be excluded from source control if you wan to commit this solution. These excluded items can be easily re-generated by unity when building over the top of this solution.</a:t>
+            </a:r>
+          </a:p>
+          <a:p>
+            <a:endParaRPr lang="en-AU" baseline="0" dirty="0" smtClean="0"/>
+          </a:p>
+          <a:p>
+            <a:r>
+              <a:rPr lang="en-AU" baseline="0" dirty="0" smtClean="0"/>
+              <a:t>For example, I may make edits to this solution that I want to keep. If I omit these files I save a lot of space in my source repository, and all I need to do to restore them and fix the build is run another build from Unity, over the top of these files. Unity will not overwrite your changes, only the Data, Players and Unprocessed folders.</a:t>
+            </a:r>
+          </a:p>
+          <a:p>
+            <a:endParaRPr lang="en-AU" baseline="0" dirty="0" smtClean="0"/>
+          </a:p>
+          <a:p>
+            <a:r>
+              <a:rPr lang="en-AU" baseline="0" dirty="0" smtClean="0"/>
+              <a:t>Unity generates the .props file, which holds the current location of the Unity executable. This is required to process the code during compile and should be omitted from the repository to allow for Unity installs in different locations. This is required to perform a final build. This is not generated or required if you do NOT tick “Generate C# Projects”, as outlined in “Editing Scripts Without Rebuilding”.</a:t>
+            </a:r>
+            <a:endParaRPr lang="en-AU" dirty="0"/>
+          </a:p>
+        </p:txBody>
+      </p:sp>
+      <p:sp>
+        <p:nvSpPr>
+          <p:cNvPr id="4" name="Slide Number Placeholder 3"/>
+          <p:cNvSpPr>
+            <a:spLocks noGrp="1"/>
+          </p:cNvSpPr>
+          <p:nvPr>
+            <p:ph type="sldNum" sz="quarter" idx="10"/>
+          </p:nvPr>
+        </p:nvSpPr>
+        <p:spPr/>
+        <p:txBody>
+          <a:bodyPr/>
+          <a:lstStyle/>
+          <a:p>
+            <a:fld id="{814B4410-C701-44AF-9574-9C423ED2E94B}" type="slidenum">
+              <a:rPr lang="en-AU" smtClean="0"/>
+              <a:t>33</a:t>
+            </a:fld>
+            <a:endParaRPr lang="en-AU"/>
+          </a:p>
+        </p:txBody>
+      </p:sp>
+    </p:spTree>
+    <p:extLst>
+      <p:ext uri="{BB962C8B-B14F-4D97-AF65-F5344CB8AC3E}">
+        <p14:creationId xmlns:p14="http://schemas.microsoft.com/office/powerpoint/2010/main" val="3616034367"/>
+      </p:ext>
+    </p:extLst>
+  </p:cSld>
+  <p:clrMapOvr>
+    <a:masterClrMapping/>
+  </p:clrMapOvr>
+</p:notes>
+</file>
+
+<file path=ppt/notesSlides/notesSlide12.xml><?xml version="1.0" encoding="utf-8"?>
+<p:notes xmlns:a="http://schemas.openxmlformats.org/drawingml/2006/main" xmlns:r="http://schemas.openxmlformats.org/officeDocument/2006/relationships" xmlns:p="http://schemas.openxmlformats.org/presentationml/2006/main">
+  <p:cSld>
+    <p:spTree>
+      <p:nvGrpSpPr>
+        <p:cNvPr id="1" name=""/>
+        <p:cNvGrpSpPr/>
+        <p:nvPr/>
+      </p:nvGrpSpPr>
+      <p:grpSpPr>
+        <a:xfrm>
+          <a:off x="0" y="0"/>
+          <a:ext cx="0" cy="0"/>
+          <a:chOff x="0" y="0"/>
+          <a:chExt cx="0" cy="0"/>
+        </a:xfrm>
+      </p:grpSpPr>
+      <p:sp>
+        <p:nvSpPr>
+          <p:cNvPr id="2" name="Slide Image Placeholder 1"/>
+          <p:cNvSpPr>
+            <a:spLocks noGrp="1" noRot="1" noChangeAspect="1"/>
+          </p:cNvSpPr>
+          <p:nvPr>
+            <p:ph type="sldImg"/>
+          </p:nvPr>
+        </p:nvSpPr>
+        <p:spPr/>
+      </p:sp>
+      <p:sp>
+        <p:nvSpPr>
+          <p:cNvPr id="3" name="Notes Placeholder 2"/>
+          <p:cNvSpPr>
+            <a:spLocks noGrp="1"/>
+          </p:cNvSpPr>
+          <p:nvPr>
+            <p:ph type="body" idx="1"/>
+          </p:nvPr>
+        </p:nvSpPr>
+        <p:spPr/>
+        <p:txBody>
+          <a:bodyPr/>
+          <a:lstStyle/>
+          <a:p>
+            <a:r>
+              <a:rPr lang="en-AU" dirty="0" smtClean="0"/>
+              <a:t>Explain the different parts of </a:t>
+            </a:r>
+            <a:r>
+              <a:rPr lang="en-AU" dirty="0" err="1" smtClean="0"/>
+              <a:t>MainPage.xaml</a:t>
+            </a:r>
+            <a:r>
+              <a:rPr lang="en-AU" dirty="0" smtClean="0"/>
+              <a:t>, including the </a:t>
+            </a:r>
+            <a:r>
+              <a:rPr lang="en-AU" dirty="0" err="1" smtClean="0"/>
+              <a:t>SwapChainPanel</a:t>
+            </a:r>
+            <a:r>
+              <a:rPr lang="en-AU" dirty="0" smtClean="0"/>
+              <a:t> where Unity displays its visuals, and the extended splash screen.</a:t>
+            </a:r>
+          </a:p>
+          <a:p>
+            <a:endParaRPr lang="en-AU" dirty="0" smtClean="0"/>
+          </a:p>
+          <a:p>
+            <a:r>
+              <a:rPr lang="en-AU" dirty="0" smtClean="0"/>
+              <a:t>A mini overview</a:t>
+            </a:r>
+            <a:r>
+              <a:rPr lang="en-AU" baseline="0" dirty="0" smtClean="0"/>
+              <a:t> of XAML is useful here, including the hierarchy structure it uses for layout (as shown by the grid).</a:t>
+            </a:r>
+          </a:p>
+          <a:p>
+            <a:endParaRPr lang="en-AU" baseline="0" dirty="0" smtClean="0"/>
+          </a:p>
+          <a:p>
+            <a:r>
+              <a:rPr lang="en-AU" baseline="0" dirty="0" smtClean="0"/>
+              <a:t>Indicate that if you want to display videos, you need to make use of the </a:t>
+            </a:r>
+            <a:r>
+              <a:rPr lang="en-AU" baseline="0" dirty="0" err="1" smtClean="0"/>
+              <a:t>MediaElement</a:t>
+            </a:r>
+            <a:r>
+              <a:rPr lang="en-AU" baseline="0" dirty="0" smtClean="0"/>
+              <a:t> control and interface with your game to display/hide and play the video.</a:t>
+            </a:r>
+          </a:p>
+          <a:p>
+            <a:endParaRPr lang="en-AU" baseline="0" dirty="0" smtClean="0"/>
+          </a:p>
+          <a:p>
+            <a:r>
+              <a:rPr lang="en-AU" baseline="0" dirty="0" smtClean="0"/>
+              <a:t>All of the controls here are surfaced in the code behind (</a:t>
+            </a:r>
+            <a:r>
+              <a:rPr lang="en-AU" baseline="0" dirty="0" err="1" smtClean="0"/>
+              <a:t>MainPage.xaml.cs</a:t>
+            </a:r>
+            <a:r>
+              <a:rPr lang="en-AU" baseline="0" dirty="0" smtClean="0"/>
+              <a:t>) using the names defined in the x:Name attributes here.</a:t>
+            </a:r>
+          </a:p>
+          <a:p>
+            <a:endParaRPr lang="en-AU" baseline="0" dirty="0" smtClean="0"/>
+          </a:p>
+          <a:p>
+            <a:r>
+              <a:rPr lang="en-AU" baseline="0" dirty="0" smtClean="0"/>
+              <a:t>Custom UI as well as settings can be defined in XAML and can interact with your game using the code-behind C#.</a:t>
             </a:r>
             <a:endParaRPr lang="en-AU" dirty="0"/>
           </a:p>
@@ -817,7 +1099,292 @@
     </p:spTree>
     <p:extLst>
       <p:ext uri="{BB962C8B-B14F-4D97-AF65-F5344CB8AC3E}">
+        <p14:creationId xmlns:p14="http://schemas.microsoft.com/office/powerpoint/2010/main" val="2749775139"/>
+      </p:ext>
+    </p:extLst>
+  </p:cSld>
+  <p:clrMapOvr>
+    <a:masterClrMapping/>
+  </p:clrMapOvr>
+</p:notes>
+</file>
+
+<file path=ppt/notesSlides/notesSlide13.xml><?xml version="1.0" encoding="utf-8"?>
+<p:notes xmlns:a="http://schemas.openxmlformats.org/drawingml/2006/main" xmlns:r="http://schemas.openxmlformats.org/officeDocument/2006/relationships" xmlns:p="http://schemas.openxmlformats.org/presentationml/2006/main">
+  <p:cSld>
+    <p:spTree>
+      <p:nvGrpSpPr>
+        <p:cNvPr id="1" name=""/>
+        <p:cNvGrpSpPr/>
+        <p:nvPr/>
+      </p:nvGrpSpPr>
+      <p:grpSpPr>
+        <a:xfrm>
+          <a:off x="0" y="0"/>
+          <a:ext cx="0" cy="0"/>
+          <a:chOff x="0" y="0"/>
+          <a:chExt cx="0" cy="0"/>
+        </a:xfrm>
+      </p:grpSpPr>
+      <p:sp>
+        <p:nvSpPr>
+          <p:cNvPr id="2" name="Slide Image Placeholder 1"/>
+          <p:cNvSpPr>
+            <a:spLocks noGrp="1" noRot="1" noChangeAspect="1"/>
+          </p:cNvSpPr>
+          <p:nvPr>
+            <p:ph type="sldImg"/>
+          </p:nvPr>
+        </p:nvSpPr>
+        <p:spPr/>
+      </p:sp>
+      <p:sp>
+        <p:nvSpPr>
+          <p:cNvPr id="3" name="Notes Placeholder 2"/>
+          <p:cNvSpPr>
+            <a:spLocks noGrp="1"/>
+          </p:cNvSpPr>
+          <p:nvPr>
+            <p:ph type="body" idx="1"/>
+          </p:nvPr>
+        </p:nvSpPr>
+        <p:spPr/>
+        <p:txBody>
+          <a:bodyPr/>
+          <a:lstStyle/>
+          <a:p>
+            <a:r>
+              <a:rPr lang="en-AU" dirty="0" smtClean="0"/>
+              <a:t>Look</a:t>
+            </a:r>
+            <a:r>
+              <a:rPr lang="en-AU" baseline="0" dirty="0" smtClean="0"/>
+              <a:t> into things like resizing and other hooks that can be used, hint at things for sharing and other APIs that won’t be covered in detail</a:t>
+            </a:r>
+            <a:endParaRPr lang="en-AU" dirty="0"/>
+          </a:p>
+        </p:txBody>
+      </p:sp>
+      <p:sp>
+        <p:nvSpPr>
+          <p:cNvPr id="4" name="Slide Number Placeholder 3"/>
+          <p:cNvSpPr>
+            <a:spLocks noGrp="1"/>
+          </p:cNvSpPr>
+          <p:nvPr>
+            <p:ph type="sldNum" sz="quarter" idx="10"/>
+          </p:nvPr>
+        </p:nvSpPr>
+        <p:spPr/>
+        <p:txBody>
+          <a:bodyPr/>
+          <a:lstStyle/>
+          <a:p>
+            <a:fld id="{814B4410-C701-44AF-9574-9C423ED2E94B}" type="slidenum">
+              <a:rPr lang="en-AU" smtClean="0"/>
+              <a:t>37</a:t>
+            </a:fld>
+            <a:endParaRPr lang="en-AU"/>
+          </a:p>
+        </p:txBody>
+      </p:sp>
+    </p:spTree>
+    <p:extLst>
+      <p:ext uri="{BB962C8B-B14F-4D97-AF65-F5344CB8AC3E}">
         <p14:creationId xmlns:p14="http://schemas.microsoft.com/office/powerpoint/2010/main" val="346376531"/>
+      </p:ext>
+    </p:extLst>
+  </p:cSld>
+  <p:clrMapOvr>
+    <a:masterClrMapping/>
+  </p:clrMapOvr>
+</p:notes>
+</file>
+
+<file path=ppt/notesSlides/notesSlide14.xml><?xml version="1.0" encoding="utf-8"?>
+<p:notes xmlns:a="http://schemas.openxmlformats.org/drawingml/2006/main" xmlns:r="http://schemas.openxmlformats.org/officeDocument/2006/relationships" xmlns:p="http://schemas.openxmlformats.org/presentationml/2006/main">
+  <p:cSld>
+    <p:spTree>
+      <p:nvGrpSpPr>
+        <p:cNvPr id="1" name=""/>
+        <p:cNvGrpSpPr/>
+        <p:nvPr/>
+      </p:nvGrpSpPr>
+      <p:grpSpPr>
+        <a:xfrm>
+          <a:off x="0" y="0"/>
+          <a:ext cx="0" cy="0"/>
+          <a:chOff x="0" y="0"/>
+          <a:chExt cx="0" cy="0"/>
+        </a:xfrm>
+      </p:grpSpPr>
+      <p:sp>
+        <p:nvSpPr>
+          <p:cNvPr id="2" name="Slide Image Placeholder 1"/>
+          <p:cNvSpPr>
+            <a:spLocks noGrp="1" noRot="1" noChangeAspect="1"/>
+          </p:cNvSpPr>
+          <p:nvPr>
+            <p:ph type="sldImg"/>
+          </p:nvPr>
+        </p:nvSpPr>
+        <p:spPr/>
+      </p:sp>
+      <p:sp>
+        <p:nvSpPr>
+          <p:cNvPr id="3" name="Notes Placeholder 2"/>
+          <p:cNvSpPr>
+            <a:spLocks noGrp="1"/>
+          </p:cNvSpPr>
+          <p:nvPr>
+            <p:ph type="body" idx="1"/>
+          </p:nvPr>
+        </p:nvSpPr>
+        <p:spPr/>
+        <p:txBody>
+          <a:bodyPr/>
+          <a:lstStyle/>
+          <a:p>
+            <a:r>
+              <a:rPr lang="en-AU" dirty="0" smtClean="0"/>
+              <a:t>Note</a:t>
+            </a:r>
+            <a:r>
+              <a:rPr lang="en-AU" baseline="0" dirty="0" smtClean="0"/>
+              <a:t> that macros exist to allow conditional compilation of scripts based on the chosen platform. They are used with the #if directive.</a:t>
+            </a:r>
+          </a:p>
+          <a:p>
+            <a:endParaRPr lang="en-AU" baseline="0" dirty="0" smtClean="0"/>
+          </a:p>
+          <a:p>
+            <a:r>
+              <a:rPr lang="en-AU" baseline="0" dirty="0" smtClean="0"/>
+              <a:t>Make special note of the fact that these platform macros apply as soon as the platform is chosen, so even when running in the editor. The only way to exclude code from running in the editor is to combine with the UNITY_EDITOR macro, for example (UNITY_METRO &amp;&amp; !UNITY_EDITOR) will avoid the code when running in the editor, while just using UNITY_METRO will not. This is important because the editor runs with Mono, while the built Windows 8 application uses Microsoft’s .NET (.NET Core/</a:t>
+            </a:r>
+            <a:r>
+              <a:rPr lang="en-AU" baseline="0" dirty="0" err="1" smtClean="0"/>
+              <a:t>WinRT</a:t>
+            </a:r>
+            <a:r>
+              <a:rPr lang="en-AU" baseline="0" dirty="0" smtClean="0"/>
+              <a:t> specifically).</a:t>
+            </a:r>
+            <a:endParaRPr lang="en-AU" dirty="0"/>
+          </a:p>
+        </p:txBody>
+      </p:sp>
+      <p:sp>
+        <p:nvSpPr>
+          <p:cNvPr id="4" name="Slide Number Placeholder 3"/>
+          <p:cNvSpPr>
+            <a:spLocks noGrp="1"/>
+          </p:cNvSpPr>
+          <p:nvPr>
+            <p:ph type="sldNum" sz="quarter" idx="10"/>
+          </p:nvPr>
+        </p:nvSpPr>
+        <p:spPr/>
+        <p:txBody>
+          <a:bodyPr/>
+          <a:lstStyle/>
+          <a:p>
+            <a:fld id="{814B4410-C701-44AF-9574-9C423ED2E94B}" type="slidenum">
+              <a:rPr lang="en-AU" smtClean="0"/>
+              <a:t>41</a:t>
+            </a:fld>
+            <a:endParaRPr lang="en-AU"/>
+          </a:p>
+        </p:txBody>
+      </p:sp>
+    </p:spTree>
+    <p:extLst>
+      <p:ext uri="{BB962C8B-B14F-4D97-AF65-F5344CB8AC3E}">
+        <p14:creationId xmlns:p14="http://schemas.microsoft.com/office/powerpoint/2010/main" val="3831526137"/>
+      </p:ext>
+    </p:extLst>
+  </p:cSld>
+  <p:clrMapOvr>
+    <a:masterClrMapping/>
+  </p:clrMapOvr>
+</p:notes>
+</file>
+
+<file path=ppt/notesSlides/notesSlide15.xml><?xml version="1.0" encoding="utf-8"?>
+<p:notes xmlns:a="http://schemas.openxmlformats.org/drawingml/2006/main" xmlns:r="http://schemas.openxmlformats.org/officeDocument/2006/relationships" xmlns:p="http://schemas.openxmlformats.org/presentationml/2006/main">
+  <p:cSld>
+    <p:spTree>
+      <p:nvGrpSpPr>
+        <p:cNvPr id="1" name=""/>
+        <p:cNvGrpSpPr/>
+        <p:nvPr/>
+      </p:nvGrpSpPr>
+      <p:grpSpPr>
+        <a:xfrm>
+          <a:off x="0" y="0"/>
+          <a:ext cx="0" cy="0"/>
+          <a:chOff x="0" y="0"/>
+          <a:chExt cx="0" cy="0"/>
+        </a:xfrm>
+      </p:grpSpPr>
+      <p:sp>
+        <p:nvSpPr>
+          <p:cNvPr id="2" name="Slide Image Placeholder 1"/>
+          <p:cNvSpPr>
+            <a:spLocks noGrp="1" noRot="1" noChangeAspect="1"/>
+          </p:cNvSpPr>
+          <p:nvPr>
+            <p:ph type="sldImg"/>
+          </p:nvPr>
+        </p:nvSpPr>
+        <p:spPr/>
+      </p:sp>
+      <p:sp>
+        <p:nvSpPr>
+          <p:cNvPr id="3" name="Notes Placeholder 2"/>
+          <p:cNvSpPr>
+            <a:spLocks noGrp="1"/>
+          </p:cNvSpPr>
+          <p:nvPr>
+            <p:ph type="body" idx="1"/>
+          </p:nvPr>
+        </p:nvSpPr>
+        <p:spPr/>
+        <p:txBody>
+          <a:bodyPr/>
+          <a:lstStyle/>
+          <a:p>
+            <a:endParaRPr lang="en-AU" dirty="0"/>
+          </a:p>
+        </p:txBody>
+      </p:sp>
+      <p:sp>
+        <p:nvSpPr>
+          <p:cNvPr id="4" name="Slide Number Placeholder 3"/>
+          <p:cNvSpPr>
+            <a:spLocks noGrp="1"/>
+          </p:cNvSpPr>
+          <p:nvPr>
+            <p:ph type="sldNum" sz="quarter" idx="10"/>
+          </p:nvPr>
+        </p:nvSpPr>
+        <p:spPr/>
+        <p:txBody>
+          <a:bodyPr/>
+          <a:lstStyle/>
+          <a:p>
+            <a:fld id="{814B4410-C701-44AF-9574-9C423ED2E94B}" type="slidenum">
+              <a:rPr lang="en-AU" smtClean="0"/>
+              <a:t>42</a:t>
+            </a:fld>
+            <a:endParaRPr lang="en-AU"/>
+          </a:p>
+        </p:txBody>
+      </p:sp>
+    </p:spTree>
+    <p:extLst>
+      <p:ext uri="{BB962C8B-B14F-4D97-AF65-F5344CB8AC3E}">
+        <p14:creationId xmlns:p14="http://schemas.microsoft.com/office/powerpoint/2010/main" val="3459258261"/>
       </p:ext>
     </p:extLst>
   </p:cSld>
@@ -1776,7 +2343,7 @@
           <a:p>
             <a:fld id="{C33626A4-D0D9-4927-8F98-739B1D29D8AB}" type="datetimeFigureOut">
               <a:rPr lang="en-AU" smtClean="0"/>
-              <a:t>9/06/2014</a:t>
+              <a:t>11/06/2014</a:t>
             </a:fld>
             <a:endParaRPr lang="en-AU"/>
           </a:p>
@@ -1946,7 +2513,7 @@
           <a:p>
             <a:fld id="{C33626A4-D0D9-4927-8F98-739B1D29D8AB}" type="datetimeFigureOut">
               <a:rPr lang="en-AU" smtClean="0"/>
-              <a:t>9/06/2014</a:t>
+              <a:t>11/06/2014</a:t>
             </a:fld>
             <a:endParaRPr lang="en-AU"/>
           </a:p>
@@ -2126,7 +2693,7 @@
           <a:p>
             <a:fld id="{C33626A4-D0D9-4927-8F98-739B1D29D8AB}" type="datetimeFigureOut">
               <a:rPr lang="en-AU" smtClean="0"/>
-              <a:t>9/06/2014</a:t>
+              <a:t>11/06/2014</a:t>
             </a:fld>
             <a:endParaRPr lang="en-AU"/>
           </a:p>
@@ -2296,7 +2863,7 @@
           <a:p>
             <a:fld id="{C33626A4-D0D9-4927-8F98-739B1D29D8AB}" type="datetimeFigureOut">
               <a:rPr lang="en-AU" smtClean="0"/>
-              <a:t>9/06/2014</a:t>
+              <a:t>11/06/2014</a:t>
             </a:fld>
             <a:endParaRPr lang="en-AU"/>
           </a:p>
@@ -2542,7 +3109,7 @@
           <a:p>
             <a:fld id="{C33626A4-D0D9-4927-8F98-739B1D29D8AB}" type="datetimeFigureOut">
               <a:rPr lang="en-AU" smtClean="0"/>
-              <a:t>9/06/2014</a:t>
+              <a:t>11/06/2014</a:t>
             </a:fld>
             <a:endParaRPr lang="en-AU"/>
           </a:p>
@@ -2774,7 +3341,7 @@
           <a:p>
             <a:fld id="{C33626A4-D0D9-4927-8F98-739B1D29D8AB}" type="datetimeFigureOut">
               <a:rPr lang="en-AU" smtClean="0"/>
-              <a:t>9/06/2014</a:t>
+              <a:t>11/06/2014</a:t>
             </a:fld>
             <a:endParaRPr lang="en-AU"/>
           </a:p>
@@ -3141,7 +3708,7 @@
           <a:p>
             <a:fld id="{C33626A4-D0D9-4927-8F98-739B1D29D8AB}" type="datetimeFigureOut">
               <a:rPr lang="en-AU" smtClean="0"/>
-              <a:t>9/06/2014</a:t>
+              <a:t>11/06/2014</a:t>
             </a:fld>
             <a:endParaRPr lang="en-AU"/>
           </a:p>
@@ -3259,7 +3826,7 @@
           <a:p>
             <a:fld id="{C33626A4-D0D9-4927-8F98-739B1D29D8AB}" type="datetimeFigureOut">
               <a:rPr lang="en-AU" smtClean="0"/>
-              <a:t>9/06/2014</a:t>
+              <a:t>11/06/2014</a:t>
             </a:fld>
             <a:endParaRPr lang="en-AU"/>
           </a:p>
@@ -3354,7 +3921,7 @@
           <a:p>
             <a:fld id="{C33626A4-D0D9-4927-8F98-739B1D29D8AB}" type="datetimeFigureOut">
               <a:rPr lang="en-AU" smtClean="0"/>
-              <a:t>9/06/2014</a:t>
+              <a:t>11/06/2014</a:t>
             </a:fld>
             <a:endParaRPr lang="en-AU"/>
           </a:p>
@@ -3631,7 +4198,7 @@
           <a:p>
             <a:fld id="{C33626A4-D0D9-4927-8F98-739B1D29D8AB}" type="datetimeFigureOut">
               <a:rPr lang="en-AU" smtClean="0"/>
-              <a:t>9/06/2014</a:t>
+              <a:t>11/06/2014</a:t>
             </a:fld>
             <a:endParaRPr lang="en-AU"/>
           </a:p>
@@ -3884,7 +4451,7 @@
           <a:p>
             <a:fld id="{C33626A4-D0D9-4927-8F98-739B1D29D8AB}" type="datetimeFigureOut">
               <a:rPr lang="en-AU" smtClean="0"/>
-              <a:t>9/06/2014</a:t>
+              <a:t>11/06/2014</a:t>
             </a:fld>
             <a:endParaRPr lang="en-AU"/>
           </a:p>
@@ -4100,7 +4667,7 @@
           <a:p>
             <a:fld id="{C33626A4-D0D9-4927-8F98-739B1D29D8AB}" type="datetimeFigureOut">
               <a:rPr lang="en-AU" smtClean="0"/>
-              <a:t>9/06/2014</a:t>
+              <a:t>11/06/2014</a:t>
             </a:fld>
             <a:endParaRPr lang="en-AU"/>
           </a:p>
@@ -5091,8 +5658,9 @@
             </a:r>
             <a:r>
               <a:rPr lang="en-AU" dirty="0" smtClean="0"/>
-              <a:t>&lt;&gt;</a:t>
-            </a:r>
+              <a:t>&lt;T&gt;</a:t>
+            </a:r>
+            <a:endParaRPr lang="en-AU" dirty="0" smtClean="0"/>
           </a:p>
           <a:p>
             <a:r>
@@ -5101,14 +5669,16 @@
             </a:r>
             <a:r>
               <a:rPr lang="en-AU" dirty="0" smtClean="0"/>
-              <a:t>&lt;&gt;</a:t>
-            </a:r>
-          </a:p>
-          <a:p>
-            <a:r>
-              <a:rPr lang="en-AU" dirty="0" smtClean="0"/>
-              <a:t>Added in Editor</a:t>
-            </a:r>
+              <a:t>&lt;T&gt;</a:t>
+            </a:r>
+            <a:endParaRPr lang="en-AU" dirty="0" smtClean="0"/>
+          </a:p>
+          <a:p>
+            <a:r>
+              <a:rPr lang="en-AU" dirty="0" smtClean="0"/>
+              <a:t>Or build in Editor</a:t>
+            </a:r>
+            <a:endParaRPr lang="en-AU" dirty="0" smtClean="0"/>
           </a:p>
           <a:p>
             <a:r>
@@ -5996,13 +6566,8 @@
           <a:p>
             <a:r>
               <a:rPr lang="en-AU" dirty="0" smtClean="0"/>
-              <a:t>Unity generates a prefab from an imported </a:t>
-            </a:r>
-            <a:r>
-              <a:rPr lang="en-AU" dirty="0" smtClean="0"/>
-              <a:t>model</a:t>
-            </a:r>
-            <a:endParaRPr lang="en-AU" dirty="0" smtClean="0"/>
+              <a:t>Unity generates a prefab from an imported model</a:t>
+            </a:r>
           </a:p>
         </p:txBody>
       </p:sp>
@@ -6296,7 +6861,6 @@
               <a:rPr lang="en-AU" sz="1800" dirty="0" smtClean="0"/>
               <a:t>)</a:t>
             </a:r>
-            <a:endParaRPr lang="en-AU" sz="1800" dirty="0" smtClean="0"/>
           </a:p>
         </p:txBody>
       </p:sp>
@@ -6403,14 +6967,14 @@
           <p:nvPr/>
         </p:nvPicPr>
         <p:blipFill rotWithShape="1">
-          <a:blip r:embed="rId2">
+          <a:blip r:embed="rId2" cstate="print">
             <a:extLst>
               <a:ext uri="{28A0092B-C50C-407E-A947-70E740481C1C}">
                 <a14:useLocalDpi xmlns:a14="http://schemas.microsoft.com/office/drawing/2010/main" val="0"/>
               </a:ext>
             </a:extLst>
           </a:blip>
-          <a:srcRect l="77863" t="7154" r="914" b="63469"/>
+          <a:srcRect/>
           <a:stretch/>
         </p:blipFill>
         <p:spPr>
@@ -6507,11 +7071,7 @@
             </a:r>
             <a:r>
               <a:rPr lang="en-AU" dirty="0" smtClean="0"/>
-              <a:t>(string name</a:t>
-            </a:r>
-            <a:r>
-              <a:rPr lang="en-AU" dirty="0" smtClean="0"/>
-              <a:t>)</a:t>
+              <a:t>(string name)</a:t>
             </a:r>
           </a:p>
           <a:p>
@@ -6523,7 +7083,6 @@
               <a:rPr lang="en-AU" dirty="0" smtClean="0"/>
               <a:t>(string name) – Single shot on press</a:t>
             </a:r>
-            <a:endParaRPr lang="en-AU" dirty="0" smtClean="0"/>
           </a:p>
           <a:p>
             <a:endParaRPr lang="en-AU" dirty="0"/>
@@ -6571,7 +7130,6 @@
               <a:rPr lang="en-AU" dirty="0"/>
               <a:t>}</a:t>
             </a:r>
-            <a:endParaRPr lang="en-AU" dirty="0"/>
           </a:p>
         </p:txBody>
       </p:sp>
@@ -6794,8 +7352,9 @@
             </a:r>
             <a:r>
               <a:rPr lang="en-AU" dirty="0" smtClean="0"/>
-              <a:t>()</a:t>
-            </a:r>
+              <a:t>(Collision)</a:t>
+            </a:r>
+            <a:endParaRPr lang="en-AU" dirty="0" smtClean="0"/>
           </a:p>
           <a:p>
             <a:pPr lvl="1"/>
@@ -6805,8 +7364,9 @@
             </a:r>
             <a:r>
               <a:rPr lang="en-AU" dirty="0" smtClean="0"/>
-              <a:t>()</a:t>
-            </a:r>
+              <a:t>(Collision)</a:t>
+            </a:r>
+            <a:endParaRPr lang="en-AU" dirty="0" smtClean="0"/>
           </a:p>
           <a:p>
             <a:pPr marL="0" indent="0">
@@ -6972,7 +7532,7 @@
       </p:grpSpPr>
       <p:sp>
         <p:nvSpPr>
-          <p:cNvPr id="2" name="Title 1"/>
+          <p:cNvPr id="4" name="Title 3"/>
           <p:cNvSpPr>
             <a:spLocks noGrp="1"/>
           </p:cNvSpPr>
@@ -6987,7 +7547,7 @@
           <a:p>
             <a:r>
               <a:rPr lang="en-AU" dirty="0" smtClean="0"/>
-              <a:t>The Windows Store</a:t>
+              <a:t>Asset Store</a:t>
             </a:r>
             <a:endParaRPr lang="en-AU" dirty="0"/>
           </a:p>
@@ -6995,31 +7555,59 @@
       </p:sp>
       <p:sp>
         <p:nvSpPr>
-          <p:cNvPr id="3" name="Text Placeholder 2"/>
-          <p:cNvSpPr>
-            <a:spLocks noGrp="1"/>
-          </p:cNvSpPr>
-          <p:nvPr>
-            <p:ph type="body" idx="1"/>
-          </p:nvPr>
-        </p:nvSpPr>
-        <p:spPr/>
-        <p:txBody>
-          <a:bodyPr/>
-          <a:lstStyle/>
-          <a:p>
-            <a:r>
-              <a:rPr lang="en-AU" dirty="0" smtClean="0"/>
-              <a:t>Building and Certification</a:t>
-            </a:r>
+          <p:cNvPr id="5" name="Content Placeholder 4"/>
+          <p:cNvSpPr>
+            <a:spLocks noGrp="1"/>
+          </p:cNvSpPr>
+          <p:nvPr>
+            <p:ph idx="1"/>
+          </p:nvPr>
+        </p:nvSpPr>
+        <p:spPr/>
+        <p:txBody>
+          <a:bodyPr>
+            <a:normAutofit/>
+          </a:bodyPr>
+          <a:lstStyle/>
+          <a:p>
+            <a:r>
+              <a:rPr lang="en-AU" dirty="0" smtClean="0"/>
+              <a:t>Art, Audio and Code Plugins</a:t>
+            </a:r>
+          </a:p>
+          <a:p>
+            <a:r>
+              <a:rPr lang="en-AU" dirty="0" smtClean="0"/>
+              <a:t>Useful sub-systems and tools</a:t>
+            </a:r>
+          </a:p>
+          <a:p>
+            <a:r>
+              <a:rPr lang="en-AU" dirty="0" smtClean="0"/>
+              <a:t>Purchases tied to Unity account</a:t>
+            </a:r>
+          </a:p>
+          <a:p>
+            <a:r>
+              <a:rPr lang="en-AU" dirty="0" smtClean="0"/>
+              <a:t>Use across multiple projects</a:t>
+            </a:r>
+          </a:p>
+          <a:p>
             <a:endParaRPr lang="en-AU" dirty="0"/>
+          </a:p>
+          <a:p>
+            <a:r>
+              <a:rPr lang="en-AU" dirty="0" smtClean="0"/>
+              <a:t>http://assetstore.unity3d.com </a:t>
+            </a:r>
           </a:p>
         </p:txBody>
       </p:sp>
     </p:spTree>
     <p:extLst>
       <p:ext uri="{BB962C8B-B14F-4D97-AF65-F5344CB8AC3E}">
-        <p14:creationId xmlns:p14="http://schemas.microsoft.com/office/powerpoint/2010/main" val="86343519"/>
+        <p14:creationId xmlns:p14="http://schemas.microsoft.com/office/powerpoint/2010/main" val="3024897609"/>
       </p:ext>
     </p:extLst>
   </p:cSld>
@@ -7168,7 +7756,7 @@
       </p:grpSpPr>
       <p:sp>
         <p:nvSpPr>
-          <p:cNvPr id="4" name="Title 3"/>
+          <p:cNvPr id="2" name="Title 1"/>
           <p:cNvSpPr>
             <a:spLocks noGrp="1"/>
           </p:cNvSpPr>
@@ -7183,7 +7771,7 @@
           <a:p>
             <a:r>
               <a:rPr lang="en-AU" dirty="0" smtClean="0"/>
-              <a:t>XAML</a:t>
+              <a:t>The Windows Store</a:t>
             </a:r>
             <a:endParaRPr lang="en-AU" dirty="0"/>
           </a:p>
@@ -7191,46 +7779,22 @@
       </p:sp>
       <p:sp>
         <p:nvSpPr>
-          <p:cNvPr id="5" name="Content Placeholder 4"/>
-          <p:cNvSpPr>
-            <a:spLocks noGrp="1"/>
-          </p:cNvSpPr>
-          <p:nvPr>
-            <p:ph idx="1"/>
-          </p:nvPr>
-        </p:nvSpPr>
-        <p:spPr/>
-        <p:txBody>
-          <a:bodyPr/>
-          <a:lstStyle/>
-          <a:p>
-            <a:r>
-              <a:rPr lang="en-AU" dirty="0" smtClean="0"/>
-              <a:t>XML based UI definition</a:t>
-            </a:r>
-          </a:p>
-          <a:p>
-            <a:r>
-              <a:rPr lang="en-AU" dirty="0" smtClean="0"/>
-              <a:t>Used for WPF/Silverlight, Windows 8, WP8</a:t>
-            </a:r>
-          </a:p>
-          <a:p>
-            <a:r>
-              <a:rPr lang="en-AU" dirty="0" smtClean="0"/>
-              <a:t>Can be edited visually in Visual Studio or Expression Blend</a:t>
-            </a:r>
-          </a:p>
-          <a:p>
-            <a:r>
-              <a:rPr lang="en-AU" dirty="0" smtClean="0"/>
-              <a:t>Can be used for Video Playback, Extended Splash or ignored</a:t>
-            </a:r>
-          </a:p>
-          <a:p>
-            <a:r>
-              <a:rPr lang="en-AU" dirty="0" smtClean="0"/>
-              <a:t>Unity generates the base XAML required</a:t>
+          <p:cNvPr id="3" name="Text Placeholder 2"/>
+          <p:cNvSpPr>
+            <a:spLocks noGrp="1"/>
+          </p:cNvSpPr>
+          <p:nvPr>
+            <p:ph type="body" idx="1"/>
+          </p:nvPr>
+        </p:nvSpPr>
+        <p:spPr/>
+        <p:txBody>
+          <a:bodyPr/>
+          <a:lstStyle/>
+          <a:p>
+            <a:r>
+              <a:rPr lang="en-AU" dirty="0" smtClean="0"/>
+              <a:t>Building and Certification</a:t>
             </a:r>
             <a:endParaRPr lang="en-AU" dirty="0"/>
           </a:p>
@@ -7239,7 +7803,7 @@
     </p:spTree>
     <p:extLst>
       <p:ext uri="{BB962C8B-B14F-4D97-AF65-F5344CB8AC3E}">
-        <p14:creationId xmlns:p14="http://schemas.microsoft.com/office/powerpoint/2010/main" val="3121308789"/>
+        <p14:creationId xmlns:p14="http://schemas.microsoft.com/office/powerpoint/2010/main" val="86343519"/>
       </p:ext>
     </p:extLst>
   </p:cSld>
@@ -7268,7 +7832,7 @@
       </p:grpSpPr>
       <p:sp>
         <p:nvSpPr>
-          <p:cNvPr id="2" name="Title 1"/>
+          <p:cNvPr id="4" name="Title 3"/>
           <p:cNvSpPr>
             <a:spLocks noGrp="1"/>
           </p:cNvSpPr>
@@ -7282,12 +7846,8 @@
           <a:lstStyle/>
           <a:p>
             <a:r>
-              <a:rPr lang="en-AU" dirty="0" err="1" smtClean="0"/>
-              <a:t>WinRT</a:t>
-            </a:r>
-            <a:r>
-              <a:rPr lang="en-AU" dirty="0" smtClean="0"/>
-              <a:t> and Compiling for the Store</a:t>
+              <a:rPr lang="en-AU" dirty="0" smtClean="0"/>
+              <a:t>XAML</a:t>
             </a:r>
             <a:endParaRPr lang="en-AU" dirty="0"/>
           </a:p>
@@ -7295,7 +7855,7 @@
       </p:sp>
       <p:sp>
         <p:nvSpPr>
-          <p:cNvPr id="3" name="Content Placeholder 2"/>
+          <p:cNvPr id="5" name="Content Placeholder 4"/>
           <p:cNvSpPr>
             <a:spLocks noGrp="1"/>
           </p:cNvSpPr>
@@ -7310,40 +7870,31 @@
           <a:p>
             <a:r>
               <a:rPr lang="en-AU" dirty="0" smtClean="0"/>
-              <a:t>Build Settings &gt; Windows Store Apps</a:t>
-            </a:r>
-          </a:p>
-          <a:p>
-            <a:r>
-              <a:rPr lang="en-AU" dirty="0" smtClean="0"/>
-              <a:t>SDK: 8.1</a:t>
-            </a:r>
-          </a:p>
-          <a:p>
-            <a:r>
-              <a:rPr lang="en-AU" dirty="0" smtClean="0"/>
-              <a:t>Type: XAML C#</a:t>
-            </a:r>
-          </a:p>
-          <a:p>
-            <a:r>
-              <a:rPr lang="en-AU" dirty="0" smtClean="0"/>
-              <a:t>Click Build, select destination for output solution</a:t>
-            </a:r>
-          </a:p>
-          <a:p>
-            <a:endParaRPr lang="en-AU" dirty="0"/>
-          </a:p>
-          <a:p>
-            <a:r>
-              <a:rPr lang="en-AU" dirty="0" smtClean="0"/>
-              <a:t>Generates a Visual Studio 2013 Solution (2012 for an SDK 8.0 build)</a:t>
-            </a:r>
-          </a:p>
-          <a:p>
-            <a:r>
-              <a:rPr lang="en-AU" dirty="0" smtClean="0"/>
-              <a:t>Open and press F5 to run and test locally</a:t>
+              <a:t>XML based UI definition</a:t>
+            </a:r>
+          </a:p>
+          <a:p>
+            <a:r>
+              <a:rPr lang="en-AU" dirty="0" smtClean="0"/>
+              <a:t>Used for WPF/Silverlight, Windows 8, WP8</a:t>
+            </a:r>
+          </a:p>
+          <a:p>
+            <a:r>
+              <a:rPr lang="en-AU" dirty="0" smtClean="0"/>
+              <a:t>Can be edited visually in Visual Studio or Expression Blend</a:t>
+            </a:r>
+          </a:p>
+          <a:p>
+            <a:r>
+              <a:rPr lang="en-AU" dirty="0" smtClean="0"/>
+              <a:t>Can be used for Video Playback, Extended Splash or ignored</a:t>
+            </a:r>
+          </a:p>
+          <a:p>
+            <a:r>
+              <a:rPr lang="en-AU" dirty="0" smtClean="0"/>
+              <a:t>Unity generates the base XAML required</a:t>
             </a:r>
             <a:endParaRPr lang="en-AU" dirty="0"/>
           </a:p>
@@ -7352,7 +7903,7 @@
     </p:spTree>
     <p:extLst>
       <p:ext uri="{BB962C8B-B14F-4D97-AF65-F5344CB8AC3E}">
-        <p14:creationId xmlns:p14="http://schemas.microsoft.com/office/powerpoint/2010/main" val="1811821516"/>
+        <p14:creationId xmlns:p14="http://schemas.microsoft.com/office/powerpoint/2010/main" val="3121308789"/>
       </p:ext>
     </p:extLst>
   </p:cSld>
@@ -7395,13 +7946,13 @@
           <a:lstStyle/>
           <a:p>
             <a:r>
-              <a:rPr lang="en-AU" dirty="0" smtClean="0"/>
-              <a:t>Debugging Scripts with </a:t>
-            </a:r>
-            <a:r>
               <a:rPr lang="en-AU" dirty="0" err="1" smtClean="0"/>
               <a:t>WinRT</a:t>
             </a:r>
+            <a:r>
+              <a:rPr lang="en-AU" dirty="0" smtClean="0"/>
+              <a:t> and Compiling for the Store</a:t>
+            </a:r>
             <a:endParaRPr lang="en-AU" dirty="0"/>
           </a:p>
         </p:txBody>
@@ -7418,112 +7969,66 @@
         </p:nvSpPr>
         <p:spPr/>
         <p:txBody>
-          <a:bodyPr/>
-          <a:lstStyle/>
-          <a:p>
-            <a:r>
-              <a:rPr lang="en-AU" dirty="0" smtClean="0"/>
-              <a:t>Unity uses </a:t>
-            </a:r>
-            <a:r>
-              <a:rPr lang="en-AU" dirty="0" err="1" smtClean="0"/>
-              <a:t>WinRT</a:t>
-            </a:r>
-            <a:r>
-              <a:rPr lang="en-AU" dirty="0"/>
-              <a:t> </a:t>
-            </a:r>
-            <a:r>
-              <a:rPr lang="en-AU" dirty="0" smtClean="0"/>
-              <a:t>instead of Mono for Windows 8</a:t>
-            </a:r>
-          </a:p>
-          <a:p>
-            <a:r>
-              <a:rPr lang="en-AU" dirty="0" smtClean="0"/>
-              <a:t>Unity:</a:t>
-            </a:r>
-          </a:p>
-          <a:p>
-            <a:pPr lvl="1"/>
-            <a:r>
-              <a:rPr lang="en-AU" dirty="0" smtClean="0"/>
-              <a:t>Edit &gt; Sync </a:t>
-            </a:r>
-            <a:r>
-              <a:rPr lang="en-AU" dirty="0" err="1" smtClean="0"/>
-              <a:t>Monodevelop</a:t>
-            </a:r>
-            <a:r>
-              <a:rPr lang="en-AU" dirty="0" smtClean="0"/>
-              <a:t> Project(s)</a:t>
-            </a:r>
-          </a:p>
-          <a:p>
-            <a:pPr lvl="1"/>
-            <a:r>
-              <a:rPr lang="en-AU" dirty="0" smtClean="0"/>
-              <a:t>Close </a:t>
-            </a:r>
-            <a:r>
-              <a:rPr lang="en-AU" dirty="0" err="1" smtClean="0"/>
-              <a:t>MonoDevelop</a:t>
-            </a:r>
-            <a:r>
-              <a:rPr lang="en-AU" dirty="0" smtClean="0"/>
-              <a:t> or Visual Studio</a:t>
-            </a:r>
-          </a:p>
-          <a:p>
-            <a:r>
-              <a:rPr lang="en-AU" dirty="0" smtClean="0"/>
-              <a:t>Visual Studio (Built Solution):</a:t>
-            </a:r>
-          </a:p>
-          <a:p>
-            <a:pPr lvl="1"/>
-            <a:r>
-              <a:rPr lang="en-AU" dirty="0" smtClean="0"/>
-              <a:t>Add Existing Project &gt; Select the generated .</a:t>
-            </a:r>
-            <a:r>
-              <a:rPr lang="en-AU" dirty="0" err="1" smtClean="0"/>
-              <a:t>csproj</a:t>
-            </a:r>
-            <a:r>
-              <a:rPr lang="en-AU" dirty="0" smtClean="0"/>
-              <a:t> file</a:t>
-            </a:r>
-          </a:p>
-          <a:p>
-            <a:pPr lvl="2"/>
-            <a:r>
-              <a:rPr lang="en-AU" dirty="0" err="1"/>
-              <a:t>f</a:t>
-            </a:r>
-            <a:r>
-              <a:rPr lang="en-AU" dirty="0" err="1" smtClean="0"/>
-              <a:t>irstpass</a:t>
-            </a:r>
-            <a:r>
-              <a:rPr lang="en-AU" dirty="0" smtClean="0"/>
-              <a:t> = plugins folder</a:t>
-            </a:r>
-          </a:p>
-          <a:p>
-            <a:pPr lvl="1"/>
-            <a:r>
-              <a:rPr lang="en-AU" dirty="0" smtClean="0"/>
-              <a:t>F5/Debug</a:t>
-            </a:r>
+          <a:bodyPr>
+            <a:normAutofit/>
+          </a:bodyPr>
+          <a:lstStyle/>
+          <a:p>
+            <a:r>
+              <a:rPr lang="en-AU" dirty="0" smtClean="0"/>
+              <a:t>Build Settings &gt; Windows Store Apps</a:t>
+            </a:r>
+          </a:p>
+          <a:p>
+            <a:r>
+              <a:rPr lang="en-AU" dirty="0" smtClean="0"/>
+              <a:t>SDK: 8.1</a:t>
+            </a:r>
+          </a:p>
+          <a:p>
+            <a:r>
+              <a:rPr lang="en-AU" dirty="0" smtClean="0"/>
+              <a:t>Type: XAML C#</a:t>
+            </a:r>
+          </a:p>
+          <a:p>
+            <a:r>
+              <a:rPr lang="en-AU" dirty="0" smtClean="0"/>
+              <a:t>Click Build, select destination for output solution</a:t>
+            </a:r>
+          </a:p>
+          <a:p>
             <a:endParaRPr lang="en-AU" dirty="0"/>
+          </a:p>
+          <a:p>
+            <a:r>
+              <a:rPr lang="en-AU" dirty="0" smtClean="0"/>
+              <a:t>Generates a Visual Studio 2013 Solution (2012 for an SDK 8.0 build)</a:t>
+            </a:r>
+          </a:p>
+          <a:p>
+            <a:r>
+              <a:rPr lang="en-AU" dirty="0" smtClean="0"/>
+              <a:t>Open and press F5 to run and test </a:t>
+            </a:r>
+            <a:r>
+              <a:rPr lang="en-AU" dirty="0" smtClean="0"/>
+              <a:t>locally</a:t>
+            </a:r>
+          </a:p>
+          <a:p>
+            <a:r>
+              <a:rPr lang="en-AU" dirty="0" smtClean="0"/>
+              <a:t>Unity will skip existing files (except asset data files)</a:t>
+            </a:r>
+            <a:endParaRPr lang="en-AU" dirty="0" smtClean="0"/>
           </a:p>
         </p:txBody>
       </p:sp>
     </p:spTree>
     <p:extLst>
       <p:ext uri="{BB962C8B-B14F-4D97-AF65-F5344CB8AC3E}">
-        <p14:creationId xmlns:p14="http://schemas.microsoft.com/office/powerpoint/2010/main" val="2619712675"/>
+        <p14:creationId xmlns:p14="http://schemas.microsoft.com/office/powerpoint/2010/main" val="1811821516"/>
       </p:ext>
     </p:extLst>
   </p:cSld>
@@ -7567,100 +8072,875 @@
           <a:p>
             <a:r>
               <a:rPr lang="en-AU" dirty="0" smtClean="0"/>
-              <a:t>Editing Scripts Without Rebuilding</a:t>
+              <a:t>Anatomy of a Build</a:t>
             </a:r>
             <a:endParaRPr lang="en-AU" dirty="0"/>
           </a:p>
         </p:txBody>
       </p:sp>
-      <p:sp>
-        <p:nvSpPr>
-          <p:cNvPr id="3" name="Content Placeholder 2"/>
-          <p:cNvSpPr>
-            <a:spLocks noGrp="1"/>
-          </p:cNvSpPr>
-          <p:nvPr>
-            <p:ph idx="1"/>
-          </p:nvPr>
-        </p:nvSpPr>
-        <p:spPr/>
-        <p:txBody>
-          <a:bodyPr/>
-          <a:lstStyle/>
-          <a:p>
-            <a:r>
-              <a:rPr lang="en-AU" dirty="0" smtClean="0"/>
-              <a:t>Windows Store Apps only</a:t>
-            </a:r>
-          </a:p>
-          <a:p>
-            <a:r>
-              <a:rPr lang="en-AU" dirty="0" smtClean="0"/>
-              <a:t>When building, select Unity C# Projects</a:t>
-            </a:r>
-          </a:p>
-          <a:p>
-            <a:r>
-              <a:rPr lang="en-AU" dirty="0" smtClean="0"/>
-              <a:t>Output solution has script projects</a:t>
-            </a:r>
-          </a:p>
-          <a:p>
-            <a:r>
-              <a:rPr lang="en-AU" dirty="0" smtClean="0"/>
-              <a:t>Edit</a:t>
-            </a:r>
-            <a:r>
-              <a:rPr lang="en-AU" smtClean="0"/>
-              <a:t>, F5, Profit</a:t>
-            </a:r>
-            <a:endParaRPr lang="en-AU" dirty="0" smtClean="0"/>
-          </a:p>
-          <a:p>
+      <p:pic>
+        <p:nvPicPr>
+          <p:cNvPr id="4" name="Picture 3" descr="Windows81Solution"/>
+          <p:cNvPicPr>
+            <a:picLocks noChangeAspect="1"/>
+          </p:cNvPicPr>
+          <p:nvPr/>
+        </p:nvPicPr>
+        <p:blipFill rotWithShape="1">
+          <a:blip r:embed="rId3" cstate="print">
+            <a:extLst>
+              <a:ext uri="{28A0092B-C50C-407E-A947-70E740481C1C}">
+                <a14:useLocalDpi xmlns:a14="http://schemas.microsoft.com/office/drawing/2010/main" val="0"/>
+              </a:ext>
+            </a:extLst>
+          </a:blip>
+          <a:srcRect/>
+          <a:stretch/>
+        </p:blipFill>
+        <p:spPr>
+          <a:xfrm>
+            <a:off x="3984701" y="3101610"/>
+            <a:ext cx="1367882" cy="862361"/>
+          </a:xfrm>
+          <a:prstGeom prst="rect">
+            <a:avLst/>
+          </a:prstGeom>
+        </p:spPr>
+      </p:pic>
+      <p:pic>
+        <p:nvPicPr>
+          <p:cNvPr id="5" name="Picture 4" descr="UnityDemo"/>
+          <p:cNvPicPr>
+            <a:picLocks noChangeAspect="1"/>
+          </p:cNvPicPr>
+          <p:nvPr/>
+        </p:nvPicPr>
+        <p:blipFill rotWithShape="1">
+          <a:blip r:embed="rId4" cstate="print">
+            <a:extLst>
+              <a:ext uri="{28A0092B-C50C-407E-A947-70E740481C1C}">
+                <a14:useLocalDpi xmlns:a14="http://schemas.microsoft.com/office/drawing/2010/main" val="0"/>
+              </a:ext>
+            </a:extLst>
+          </a:blip>
+          <a:srcRect/>
+          <a:stretch/>
+        </p:blipFill>
+        <p:spPr>
+          <a:xfrm>
+            <a:off x="5713728" y="2239245"/>
+            <a:ext cx="1620645" cy="2430965"/>
+          </a:xfrm>
+          <a:prstGeom prst="rect">
+            <a:avLst/>
+          </a:prstGeom>
+        </p:spPr>
+      </p:pic>
+      <p:sp>
+        <p:nvSpPr>
+          <p:cNvPr id="6" name="TextBox 5"/>
+          <p:cNvSpPr txBox="1"/>
+          <p:nvPr/>
+        </p:nvSpPr>
+        <p:spPr>
+          <a:xfrm>
+            <a:off x="3612993" y="6081132"/>
+            <a:ext cx="4201471" cy="369332"/>
+          </a:xfrm>
+          <a:prstGeom prst="rect">
+            <a:avLst/>
+          </a:prstGeom>
+          <a:noFill/>
+        </p:spPr>
+        <p:txBody>
+          <a:bodyPr wrap="none" rtlCol="0">
+            <a:spAutoFit/>
+          </a:bodyPr>
+          <a:lstStyle/>
+          <a:p>
+            <a:r>
+              <a:rPr lang="en-AU" dirty="0" smtClean="0">
+                <a:solidFill>
+                  <a:srgbClr val="FF0000"/>
+                </a:solidFill>
+              </a:rPr>
+              <a:t>Red = Can be excluded from source control</a:t>
+            </a:r>
+            <a:endParaRPr lang="en-AU" dirty="0">
+              <a:solidFill>
+                <a:srgbClr val="FF0000"/>
+              </a:solidFill>
+            </a:endParaRPr>
+          </a:p>
+        </p:txBody>
+      </p:sp>
+      <p:sp>
+        <p:nvSpPr>
+          <p:cNvPr id="7" name="Left Brace 6"/>
+          <p:cNvSpPr/>
+          <p:nvPr/>
+        </p:nvSpPr>
+        <p:spPr>
+          <a:xfrm>
+            <a:off x="5263376" y="2401229"/>
+            <a:ext cx="386575" cy="2118732"/>
+          </a:xfrm>
+          <a:prstGeom prst="leftBrace">
+            <a:avLst>
+              <a:gd name="adj1" fmla="val 8333"/>
+              <a:gd name="adj2" fmla="val 48947"/>
+            </a:avLst>
+          </a:prstGeom>
+          <a:ln w="12700">
+            <a:solidFill>
+              <a:schemeClr val="accent1"/>
+            </a:solidFill>
+          </a:ln>
+        </p:spPr>
+        <p:style>
+          <a:lnRef idx="1">
+            <a:schemeClr val="accent1"/>
+          </a:lnRef>
+          <a:fillRef idx="0">
+            <a:schemeClr val="accent1"/>
+          </a:fillRef>
+          <a:effectRef idx="0">
+            <a:schemeClr val="accent1"/>
+          </a:effectRef>
+          <a:fontRef idx="minor">
+            <a:schemeClr val="tx1"/>
+          </a:fontRef>
+        </p:style>
+        <p:txBody>
+          <a:bodyPr rtlCol="0" anchor="ctr"/>
+          <a:lstStyle/>
+          <a:p>
+            <a:pPr algn="ctr"/>
+            <a:endParaRPr lang="en-AU"/>
+          </a:p>
+        </p:txBody>
+      </p:sp>
+      <p:cxnSp>
+        <p:nvCxnSpPr>
+          <p:cNvPr id="9" name="Straight Connector 8"/>
+          <p:cNvCxnSpPr>
+            <a:stCxn id="7" idx="1"/>
+          </p:cNvCxnSpPr>
+          <p:nvPr/>
+        </p:nvCxnSpPr>
+        <p:spPr>
+          <a:xfrm flipH="1">
+            <a:off x="4831556" y="3438285"/>
+            <a:ext cx="431820" cy="0"/>
+          </a:xfrm>
+          <a:prstGeom prst="line">
+            <a:avLst/>
+          </a:prstGeom>
+          <a:ln w="12700"/>
+        </p:spPr>
+        <p:style>
+          <a:lnRef idx="1">
+            <a:schemeClr val="accent1"/>
+          </a:lnRef>
+          <a:fillRef idx="0">
+            <a:schemeClr val="accent1"/>
+          </a:fillRef>
+          <a:effectRef idx="0">
+            <a:schemeClr val="accent1"/>
+          </a:effectRef>
+          <a:fontRef idx="minor">
+            <a:schemeClr val="tx1"/>
+          </a:fontRef>
+        </p:style>
+      </p:cxnSp>
+      <p:sp>
+        <p:nvSpPr>
+          <p:cNvPr id="12" name="TextBox 11"/>
+          <p:cNvSpPr txBox="1"/>
+          <p:nvPr/>
+        </p:nvSpPr>
+        <p:spPr>
+          <a:xfrm>
+            <a:off x="7709210" y="2007220"/>
+            <a:ext cx="3249672" cy="2862322"/>
+          </a:xfrm>
+          <a:prstGeom prst="rect">
+            <a:avLst/>
+          </a:prstGeom>
+          <a:noFill/>
+        </p:spPr>
+        <p:txBody>
+          <a:bodyPr wrap="none" rtlCol="0">
+            <a:spAutoFit/>
+          </a:bodyPr>
+          <a:lstStyle/>
+          <a:p>
+            <a:r>
+              <a:rPr lang="en-AU" dirty="0" smtClean="0"/>
+              <a:t>App icons &amp; splash</a:t>
+            </a:r>
+          </a:p>
+          <a:p>
+            <a:r>
+              <a:rPr lang="en-AU" dirty="0" smtClean="0">
+                <a:solidFill>
+                  <a:srgbClr val="FF0000"/>
+                </a:solidFill>
+              </a:rPr>
+              <a:t>Unity generated assets</a:t>
+            </a:r>
+          </a:p>
+          <a:p>
+            <a:r>
+              <a:rPr lang="en-AU" dirty="0" smtClean="0"/>
+              <a:t>Assembly properties</a:t>
+            </a:r>
+          </a:p>
+          <a:p>
+            <a:r>
+              <a:rPr lang="en-AU" dirty="0" smtClean="0">
+                <a:solidFill>
+                  <a:srgbClr val="FF0000"/>
+                </a:solidFill>
+              </a:rPr>
+              <a:t>Processed script assemblies</a:t>
+            </a:r>
+          </a:p>
+          <a:p>
+            <a:r>
+              <a:rPr lang="en-AU" dirty="0" smtClean="0"/>
+              <a:t>Entry point/resume/suspend</a:t>
+            </a:r>
+          </a:p>
+          <a:p>
+            <a:r>
+              <a:rPr lang="en-AU" dirty="0" smtClean="0"/>
+              <a:t>Main XAML UI &amp; game container</a:t>
+            </a:r>
+          </a:p>
+          <a:p>
+            <a:r>
+              <a:rPr lang="en-AU" dirty="0" smtClean="0"/>
+              <a:t>Test signing certificate</a:t>
+            </a:r>
+          </a:p>
+          <a:p>
+            <a:r>
+              <a:rPr lang="en-AU" dirty="0" smtClean="0"/>
+              <a:t>App Manifest</a:t>
+            </a:r>
+          </a:p>
+          <a:p>
+            <a:r>
+              <a:rPr lang="en-AU" dirty="0" smtClean="0"/>
+              <a:t>C# Project File</a:t>
+            </a:r>
+          </a:p>
+          <a:p>
+            <a:r>
+              <a:rPr lang="en-AU" dirty="0" smtClean="0">
+                <a:solidFill>
+                  <a:srgbClr val="FF0000"/>
+                </a:solidFill>
+              </a:rPr>
+              <a:t>Project file settings</a:t>
+            </a:r>
+            <a:endParaRPr lang="en-AU" dirty="0">
+              <a:solidFill>
+                <a:srgbClr val="FF0000"/>
+              </a:solidFill>
+            </a:endParaRPr>
+          </a:p>
+        </p:txBody>
+      </p:sp>
+      <p:sp>
+        <p:nvSpPr>
+          <p:cNvPr id="13" name="TextBox 12"/>
+          <p:cNvSpPr txBox="1"/>
+          <p:nvPr/>
+        </p:nvSpPr>
+        <p:spPr>
+          <a:xfrm>
+            <a:off x="1374994" y="2932625"/>
+            <a:ext cx="2393797" cy="1200329"/>
+          </a:xfrm>
+          <a:prstGeom prst="rect">
+            <a:avLst/>
+          </a:prstGeom>
+          <a:noFill/>
+        </p:spPr>
+        <p:txBody>
+          <a:bodyPr wrap="none" rtlCol="0">
+            <a:spAutoFit/>
+          </a:bodyPr>
+          <a:lstStyle/>
+          <a:p>
+            <a:r>
+              <a:rPr lang="en-AU" dirty="0" smtClean="0">
+                <a:solidFill>
+                  <a:srgbClr val="FF0000"/>
+                </a:solidFill>
+              </a:rPr>
+              <a:t>Unity engine code</a:t>
+            </a:r>
+          </a:p>
+          <a:p>
+            <a:r>
+              <a:rPr lang="en-AU" dirty="0" smtClean="0"/>
+              <a:t>Your project</a:t>
+            </a:r>
+          </a:p>
+          <a:p>
+            <a:r>
+              <a:rPr lang="en-AU" dirty="0" smtClean="0">
+                <a:solidFill>
+                  <a:srgbClr val="FF0000"/>
+                </a:solidFill>
+              </a:rPr>
+              <a:t>Location of Unity Install</a:t>
+            </a:r>
+          </a:p>
+          <a:p>
+            <a:r>
+              <a:rPr lang="en-AU" dirty="0" smtClean="0"/>
+              <a:t>Project solution file</a:t>
+            </a:r>
             <a:endParaRPr lang="en-AU" dirty="0"/>
           </a:p>
-          <a:p>
-            <a:r>
-              <a:rPr lang="en-AU" dirty="0" smtClean="0"/>
-              <a:t>Caveat:</a:t>
-            </a:r>
-          </a:p>
-          <a:p>
-            <a:pPr lvl="1"/>
-            <a:r>
-              <a:rPr lang="en-AU" dirty="0" smtClean="0"/>
-              <a:t>Do not change any serialized properties</a:t>
-            </a:r>
-          </a:p>
-          <a:p>
-            <a:pPr lvl="2"/>
-            <a:r>
-              <a:rPr lang="en-AU" dirty="0" smtClean="0"/>
-              <a:t>Public</a:t>
-            </a:r>
-          </a:p>
-          <a:p>
-            <a:pPr lvl="2"/>
-            <a:r>
-              <a:rPr lang="en-AU" dirty="0" smtClean="0"/>
-              <a:t>[</a:t>
-            </a:r>
-            <a:r>
-              <a:rPr lang="en-AU" dirty="0" err="1" smtClean="0"/>
-              <a:t>Serializable</a:t>
-            </a:r>
-            <a:r>
-              <a:rPr lang="en-AU" dirty="0" smtClean="0"/>
-              <a:t>]</a:t>
-            </a:r>
-            <a:endParaRPr lang="en-AU" dirty="0"/>
-          </a:p>
-        </p:txBody>
-      </p:sp>
+        </p:txBody>
+      </p:sp>
+      <p:cxnSp>
+        <p:nvCxnSpPr>
+          <p:cNvPr id="15" name="Straight Arrow Connector 14"/>
+          <p:cNvCxnSpPr/>
+          <p:nvPr/>
+        </p:nvCxnSpPr>
+        <p:spPr>
+          <a:xfrm flipH="1" flipV="1">
+            <a:off x="3196683" y="3159513"/>
+            <a:ext cx="713678" cy="64700"/>
+          </a:xfrm>
+          <a:prstGeom prst="straightConnector1">
+            <a:avLst/>
+          </a:prstGeom>
+          <a:ln>
+            <a:tailEnd type="triangle"/>
+          </a:ln>
+        </p:spPr>
+        <p:style>
+          <a:lnRef idx="1">
+            <a:schemeClr val="accent1"/>
+          </a:lnRef>
+          <a:fillRef idx="0">
+            <a:schemeClr val="accent1"/>
+          </a:fillRef>
+          <a:effectRef idx="0">
+            <a:schemeClr val="accent1"/>
+          </a:effectRef>
+          <a:fontRef idx="minor">
+            <a:schemeClr val="tx1"/>
+          </a:fontRef>
+        </p:style>
+      </p:cxnSp>
+      <p:cxnSp>
+        <p:nvCxnSpPr>
+          <p:cNvPr id="19" name="Straight Arrow Connector 18"/>
+          <p:cNvCxnSpPr/>
+          <p:nvPr/>
+        </p:nvCxnSpPr>
+        <p:spPr>
+          <a:xfrm flipH="1" flipV="1">
+            <a:off x="2668859" y="3375102"/>
+            <a:ext cx="1241502" cy="7435"/>
+          </a:xfrm>
+          <a:prstGeom prst="straightConnector1">
+            <a:avLst/>
+          </a:prstGeom>
+          <a:ln>
+            <a:tailEnd type="triangle"/>
+          </a:ln>
+        </p:spPr>
+        <p:style>
+          <a:lnRef idx="1">
+            <a:schemeClr val="accent1"/>
+          </a:lnRef>
+          <a:fillRef idx="0">
+            <a:schemeClr val="accent1"/>
+          </a:fillRef>
+          <a:effectRef idx="0">
+            <a:schemeClr val="accent1"/>
+          </a:effectRef>
+          <a:fontRef idx="minor">
+            <a:schemeClr val="tx1"/>
+          </a:fontRef>
+        </p:style>
+      </p:cxnSp>
+      <p:cxnSp>
+        <p:nvCxnSpPr>
+          <p:cNvPr id="23" name="Straight Arrow Connector 22"/>
+          <p:cNvCxnSpPr/>
+          <p:nvPr/>
+        </p:nvCxnSpPr>
+        <p:spPr>
+          <a:xfrm flipH="1">
+            <a:off x="3667125" y="3621881"/>
+            <a:ext cx="243236" cy="47625"/>
+          </a:xfrm>
+          <a:prstGeom prst="straightConnector1">
+            <a:avLst/>
+          </a:prstGeom>
+          <a:ln>
+            <a:tailEnd type="triangle"/>
+          </a:ln>
+        </p:spPr>
+        <p:style>
+          <a:lnRef idx="1">
+            <a:schemeClr val="accent1"/>
+          </a:lnRef>
+          <a:fillRef idx="0">
+            <a:schemeClr val="accent1"/>
+          </a:fillRef>
+          <a:effectRef idx="0">
+            <a:schemeClr val="accent1"/>
+          </a:effectRef>
+          <a:fontRef idx="minor">
+            <a:schemeClr val="tx1"/>
+          </a:fontRef>
+        </p:style>
+      </p:cxnSp>
+      <p:cxnSp>
+        <p:nvCxnSpPr>
+          <p:cNvPr id="25" name="Straight Arrow Connector 24"/>
+          <p:cNvCxnSpPr/>
+          <p:nvPr/>
+        </p:nvCxnSpPr>
+        <p:spPr>
+          <a:xfrm flipH="1">
+            <a:off x="3319463" y="3825014"/>
+            <a:ext cx="601461" cy="138957"/>
+          </a:xfrm>
+          <a:prstGeom prst="straightConnector1">
+            <a:avLst/>
+          </a:prstGeom>
+          <a:ln>
+            <a:tailEnd type="triangle"/>
+          </a:ln>
+        </p:spPr>
+        <p:style>
+          <a:lnRef idx="1">
+            <a:schemeClr val="accent1"/>
+          </a:lnRef>
+          <a:fillRef idx="0">
+            <a:schemeClr val="accent1"/>
+          </a:fillRef>
+          <a:effectRef idx="0">
+            <a:schemeClr val="accent1"/>
+          </a:effectRef>
+          <a:fontRef idx="minor">
+            <a:schemeClr val="tx1"/>
+          </a:fontRef>
+        </p:style>
+      </p:cxnSp>
+      <p:cxnSp>
+        <p:nvCxnSpPr>
+          <p:cNvPr id="27" name="Straight Arrow Connector 26"/>
+          <p:cNvCxnSpPr/>
+          <p:nvPr/>
+        </p:nvCxnSpPr>
+        <p:spPr>
+          <a:xfrm flipV="1">
+            <a:off x="6388894" y="2203105"/>
+            <a:ext cx="1320316" cy="181469"/>
+          </a:xfrm>
+          <a:prstGeom prst="straightConnector1">
+            <a:avLst/>
+          </a:prstGeom>
+          <a:ln>
+            <a:tailEnd type="triangle"/>
+          </a:ln>
+        </p:spPr>
+        <p:style>
+          <a:lnRef idx="1">
+            <a:schemeClr val="accent1"/>
+          </a:lnRef>
+          <a:fillRef idx="0">
+            <a:schemeClr val="accent1"/>
+          </a:fillRef>
+          <a:effectRef idx="0">
+            <a:schemeClr val="accent1"/>
+          </a:effectRef>
+          <a:fontRef idx="minor">
+            <a:schemeClr val="tx1"/>
+          </a:fontRef>
+        </p:style>
+      </p:cxnSp>
+      <p:cxnSp>
+        <p:nvCxnSpPr>
+          <p:cNvPr id="29" name="Straight Arrow Connector 28"/>
+          <p:cNvCxnSpPr/>
+          <p:nvPr/>
+        </p:nvCxnSpPr>
+        <p:spPr>
+          <a:xfrm flipV="1">
+            <a:off x="6305550" y="2466975"/>
+            <a:ext cx="1376363" cy="123825"/>
+          </a:xfrm>
+          <a:prstGeom prst="straightConnector1">
+            <a:avLst/>
+          </a:prstGeom>
+          <a:ln>
+            <a:tailEnd type="triangle"/>
+          </a:ln>
+        </p:spPr>
+        <p:style>
+          <a:lnRef idx="1">
+            <a:schemeClr val="accent1"/>
+          </a:lnRef>
+          <a:fillRef idx="0">
+            <a:schemeClr val="accent1"/>
+          </a:fillRef>
+          <a:effectRef idx="0">
+            <a:schemeClr val="accent1"/>
+          </a:effectRef>
+          <a:fontRef idx="minor">
+            <a:schemeClr val="tx1"/>
+          </a:fontRef>
+        </p:style>
+      </p:cxnSp>
+      <p:cxnSp>
+        <p:nvCxnSpPr>
+          <p:cNvPr id="31" name="Straight Arrow Connector 30"/>
+          <p:cNvCxnSpPr/>
+          <p:nvPr/>
+        </p:nvCxnSpPr>
+        <p:spPr>
+          <a:xfrm flipV="1">
+            <a:off x="6524050" y="2750344"/>
+            <a:ext cx="1185160" cy="21249"/>
+          </a:xfrm>
+          <a:prstGeom prst="straightConnector1">
+            <a:avLst/>
+          </a:prstGeom>
+          <a:ln>
+            <a:tailEnd type="triangle"/>
+          </a:ln>
+        </p:spPr>
+        <p:style>
+          <a:lnRef idx="1">
+            <a:schemeClr val="accent1"/>
+          </a:lnRef>
+          <a:fillRef idx="0">
+            <a:schemeClr val="accent1"/>
+          </a:fillRef>
+          <a:effectRef idx="0">
+            <a:schemeClr val="accent1"/>
+          </a:effectRef>
+          <a:fontRef idx="minor">
+            <a:schemeClr val="tx1"/>
+          </a:fontRef>
+        </p:style>
+      </p:cxnSp>
+      <p:cxnSp>
+        <p:nvCxnSpPr>
+          <p:cNvPr id="33" name="Straight Arrow Connector 32"/>
+          <p:cNvCxnSpPr/>
+          <p:nvPr/>
+        </p:nvCxnSpPr>
+        <p:spPr>
+          <a:xfrm>
+            <a:off x="6629400" y="2979744"/>
+            <a:ext cx="1079810" cy="42062"/>
+          </a:xfrm>
+          <a:prstGeom prst="straightConnector1">
+            <a:avLst/>
+          </a:prstGeom>
+          <a:ln>
+            <a:tailEnd type="triangle"/>
+          </a:ln>
+        </p:spPr>
+        <p:style>
+          <a:lnRef idx="1">
+            <a:schemeClr val="accent1"/>
+          </a:lnRef>
+          <a:fillRef idx="0">
+            <a:schemeClr val="accent1"/>
+          </a:fillRef>
+          <a:effectRef idx="0">
+            <a:schemeClr val="accent1"/>
+          </a:effectRef>
+          <a:fontRef idx="minor">
+            <a:schemeClr val="tx1"/>
+          </a:fontRef>
+        </p:style>
+      </p:cxnSp>
+      <p:cxnSp>
+        <p:nvCxnSpPr>
+          <p:cNvPr id="35" name="Straight Arrow Connector 34"/>
+          <p:cNvCxnSpPr/>
+          <p:nvPr/>
+        </p:nvCxnSpPr>
+        <p:spPr>
+          <a:xfrm>
+            <a:off x="6469856" y="3159513"/>
+            <a:ext cx="1239354" cy="115717"/>
+          </a:xfrm>
+          <a:prstGeom prst="straightConnector1">
+            <a:avLst/>
+          </a:prstGeom>
+          <a:ln>
+            <a:tailEnd type="triangle"/>
+          </a:ln>
+        </p:spPr>
+        <p:style>
+          <a:lnRef idx="1">
+            <a:schemeClr val="accent1"/>
+          </a:lnRef>
+          <a:fillRef idx="0">
+            <a:schemeClr val="accent1"/>
+          </a:fillRef>
+          <a:effectRef idx="0">
+            <a:schemeClr val="accent1"/>
+          </a:effectRef>
+          <a:fontRef idx="minor">
+            <a:schemeClr val="tx1"/>
+          </a:fontRef>
+        </p:style>
+      </p:cxnSp>
+      <p:cxnSp>
+        <p:nvCxnSpPr>
+          <p:cNvPr id="37" name="Straight Arrow Connector 36"/>
+          <p:cNvCxnSpPr/>
+          <p:nvPr/>
+        </p:nvCxnSpPr>
+        <p:spPr>
+          <a:xfrm>
+            <a:off x="6757961" y="3550444"/>
+            <a:ext cx="985864" cy="19298"/>
+          </a:xfrm>
+          <a:prstGeom prst="straightConnector1">
+            <a:avLst/>
+          </a:prstGeom>
+          <a:ln>
+            <a:tailEnd type="triangle"/>
+          </a:ln>
+        </p:spPr>
+        <p:style>
+          <a:lnRef idx="1">
+            <a:schemeClr val="accent1"/>
+          </a:lnRef>
+          <a:fillRef idx="0">
+            <a:schemeClr val="accent1"/>
+          </a:fillRef>
+          <a:effectRef idx="0">
+            <a:schemeClr val="accent1"/>
+          </a:effectRef>
+          <a:fontRef idx="minor">
+            <a:schemeClr val="tx1"/>
+          </a:fontRef>
+        </p:style>
+      </p:cxnSp>
+      <p:cxnSp>
+        <p:nvCxnSpPr>
+          <p:cNvPr id="40" name="Straight Arrow Connector 39"/>
+          <p:cNvCxnSpPr/>
+          <p:nvPr/>
+        </p:nvCxnSpPr>
+        <p:spPr>
+          <a:xfrm flipV="1">
+            <a:off x="6577013" y="3338338"/>
+            <a:ext cx="1104900" cy="36764"/>
+          </a:xfrm>
+          <a:prstGeom prst="straightConnector1">
+            <a:avLst/>
+          </a:prstGeom>
+          <a:ln>
+            <a:tailEnd type="triangle"/>
+          </a:ln>
+        </p:spPr>
+        <p:style>
+          <a:lnRef idx="1">
+            <a:schemeClr val="accent1"/>
+          </a:lnRef>
+          <a:fillRef idx="0">
+            <a:schemeClr val="accent1"/>
+          </a:fillRef>
+          <a:effectRef idx="0">
+            <a:schemeClr val="accent1"/>
+          </a:effectRef>
+          <a:fontRef idx="minor">
+            <a:schemeClr val="tx1"/>
+          </a:fontRef>
+        </p:style>
+      </p:cxnSp>
+      <p:cxnSp>
+        <p:nvCxnSpPr>
+          <p:cNvPr id="42" name="Straight Arrow Connector 41"/>
+          <p:cNvCxnSpPr/>
+          <p:nvPr/>
+        </p:nvCxnSpPr>
+        <p:spPr>
+          <a:xfrm flipV="1">
+            <a:off x="6879431" y="3621881"/>
+            <a:ext cx="829779" cy="134789"/>
+          </a:xfrm>
+          <a:prstGeom prst="straightConnector1">
+            <a:avLst/>
+          </a:prstGeom>
+          <a:ln>
+            <a:tailEnd type="triangle"/>
+          </a:ln>
+        </p:spPr>
+        <p:style>
+          <a:lnRef idx="1">
+            <a:schemeClr val="accent1"/>
+          </a:lnRef>
+          <a:fillRef idx="0">
+            <a:schemeClr val="accent1"/>
+          </a:fillRef>
+          <a:effectRef idx="0">
+            <a:schemeClr val="accent1"/>
+          </a:effectRef>
+          <a:fontRef idx="minor">
+            <a:schemeClr val="tx1"/>
+          </a:fontRef>
+        </p:style>
+      </p:cxnSp>
+      <p:cxnSp>
+        <p:nvCxnSpPr>
+          <p:cNvPr id="44" name="Straight Arrow Connector 43"/>
+          <p:cNvCxnSpPr/>
+          <p:nvPr/>
+        </p:nvCxnSpPr>
+        <p:spPr>
+          <a:xfrm flipV="1">
+            <a:off x="7169305" y="3855389"/>
+            <a:ext cx="574520" cy="82074"/>
+          </a:xfrm>
+          <a:prstGeom prst="straightConnector1">
+            <a:avLst/>
+          </a:prstGeom>
+          <a:ln>
+            <a:tailEnd type="triangle"/>
+          </a:ln>
+        </p:spPr>
+        <p:style>
+          <a:lnRef idx="1">
+            <a:schemeClr val="accent1"/>
+          </a:lnRef>
+          <a:fillRef idx="0">
+            <a:schemeClr val="accent1"/>
+          </a:fillRef>
+          <a:effectRef idx="0">
+            <a:schemeClr val="accent1"/>
+          </a:effectRef>
+          <a:fontRef idx="minor">
+            <a:schemeClr val="tx1"/>
+          </a:fontRef>
+        </p:style>
+      </p:cxnSp>
+      <p:cxnSp>
+        <p:nvCxnSpPr>
+          <p:cNvPr id="46" name="Straight Arrow Connector 45"/>
+          <p:cNvCxnSpPr/>
+          <p:nvPr/>
+        </p:nvCxnSpPr>
+        <p:spPr>
+          <a:xfrm flipV="1">
+            <a:off x="7089533" y="4132954"/>
+            <a:ext cx="654292" cy="10046"/>
+          </a:xfrm>
+          <a:prstGeom prst="straightConnector1">
+            <a:avLst/>
+          </a:prstGeom>
+          <a:ln>
+            <a:tailEnd type="triangle"/>
+          </a:ln>
+        </p:spPr>
+        <p:style>
+          <a:lnRef idx="1">
+            <a:schemeClr val="accent1"/>
+          </a:lnRef>
+          <a:fillRef idx="0">
+            <a:schemeClr val="accent1"/>
+          </a:fillRef>
+          <a:effectRef idx="0">
+            <a:schemeClr val="accent1"/>
+          </a:effectRef>
+          <a:fontRef idx="minor">
+            <a:schemeClr val="tx1"/>
+          </a:fontRef>
+        </p:style>
+      </p:cxnSp>
+      <p:cxnSp>
+        <p:nvCxnSpPr>
+          <p:cNvPr id="48" name="Straight Arrow Connector 47"/>
+          <p:cNvCxnSpPr/>
+          <p:nvPr/>
+        </p:nvCxnSpPr>
+        <p:spPr>
+          <a:xfrm>
+            <a:off x="6903244" y="4332752"/>
+            <a:ext cx="840581" cy="48748"/>
+          </a:xfrm>
+          <a:prstGeom prst="straightConnector1">
+            <a:avLst/>
+          </a:prstGeom>
+          <a:ln>
+            <a:tailEnd type="triangle"/>
+          </a:ln>
+        </p:spPr>
+        <p:style>
+          <a:lnRef idx="1">
+            <a:schemeClr val="accent1"/>
+          </a:lnRef>
+          <a:fillRef idx="0">
+            <a:schemeClr val="accent1"/>
+          </a:fillRef>
+          <a:effectRef idx="0">
+            <a:schemeClr val="accent1"/>
+          </a:effectRef>
+          <a:fontRef idx="minor">
+            <a:schemeClr val="tx1"/>
+          </a:fontRef>
+        </p:style>
+      </p:cxnSp>
+      <p:cxnSp>
+        <p:nvCxnSpPr>
+          <p:cNvPr id="50" name="Straight Arrow Connector 49"/>
+          <p:cNvCxnSpPr/>
+          <p:nvPr/>
+        </p:nvCxnSpPr>
+        <p:spPr>
+          <a:xfrm>
+            <a:off x="7129463" y="4538978"/>
+            <a:ext cx="614362" cy="131232"/>
+          </a:xfrm>
+          <a:prstGeom prst="straightConnector1">
+            <a:avLst/>
+          </a:prstGeom>
+          <a:ln>
+            <a:tailEnd type="triangle"/>
+          </a:ln>
+        </p:spPr>
+        <p:style>
+          <a:lnRef idx="1">
+            <a:schemeClr val="accent1"/>
+          </a:lnRef>
+          <a:fillRef idx="0">
+            <a:schemeClr val="accent1"/>
+          </a:fillRef>
+          <a:effectRef idx="0">
+            <a:schemeClr val="accent1"/>
+          </a:effectRef>
+          <a:fontRef idx="minor">
+            <a:schemeClr val="tx1"/>
+          </a:fontRef>
+        </p:style>
+      </p:cxnSp>
     </p:spTree>
     <p:extLst>
       <p:ext uri="{BB962C8B-B14F-4D97-AF65-F5344CB8AC3E}">
-        <p14:creationId xmlns:p14="http://schemas.microsoft.com/office/powerpoint/2010/main" val="3332073422"/>
+        <p14:creationId xmlns:p14="http://schemas.microsoft.com/office/powerpoint/2010/main" val="729823383"/>
       </p:ext>
     </p:extLst>
   </p:cSld>
@@ -7704,115 +8984,45 @@
           <a:p>
             <a:r>
               <a:rPr lang="en-AU" dirty="0" err="1" smtClean="0"/>
-              <a:t>UnityEngine.WSA</a:t>
+              <a:t>MainPage.xaml</a:t>
             </a:r>
             <a:endParaRPr lang="en-AU" dirty="0"/>
           </a:p>
         </p:txBody>
       </p:sp>
-      <p:sp>
-        <p:nvSpPr>
-          <p:cNvPr id="3" name="Content Placeholder 2"/>
-          <p:cNvSpPr>
-            <a:spLocks noGrp="1"/>
-          </p:cNvSpPr>
-          <p:nvPr>
-            <p:ph idx="1"/>
-          </p:nvPr>
-        </p:nvSpPr>
-        <p:spPr/>
-        <p:txBody>
-          <a:bodyPr>
-            <a:normAutofit lnSpcReduction="10000"/>
-          </a:bodyPr>
-          <a:lstStyle/>
-          <a:p>
-            <a:r>
-              <a:rPr lang="en-AU" dirty="0" smtClean="0"/>
-              <a:t>Namespace for Windows Store App integration points</a:t>
-            </a:r>
-          </a:p>
-          <a:p>
-            <a:r>
-              <a:rPr lang="en-AU" dirty="0" smtClean="0"/>
-              <a:t>More being added all the time by Unity</a:t>
-            </a:r>
-          </a:p>
-          <a:p>
-            <a:r>
-              <a:rPr lang="en-AU" dirty="0" smtClean="0"/>
-              <a:t>Can use this or your own </a:t>
-            </a:r>
-            <a:r>
-              <a:rPr lang="en-AU" dirty="0" smtClean="0"/>
-              <a:t>plugin</a:t>
-            </a:r>
-          </a:p>
-          <a:p>
-            <a:pPr lvl="1"/>
-            <a:r>
-              <a:rPr lang="en-AU" dirty="0" err="1" smtClean="0"/>
-              <a:t>UnityEngine.WSA.Tile</a:t>
-            </a:r>
-            <a:endParaRPr lang="en-AU" dirty="0" smtClean="0"/>
-          </a:p>
-          <a:p>
-            <a:pPr lvl="1"/>
-            <a:r>
-              <a:rPr lang="en-AU" dirty="0" err="1" smtClean="0"/>
-              <a:t>UnityEngine.WSA.SecondaryTile</a:t>
-            </a:r>
-            <a:endParaRPr lang="en-AU" dirty="0" smtClean="0"/>
-          </a:p>
-          <a:p>
-            <a:pPr lvl="1"/>
-            <a:r>
-              <a:rPr lang="en-AU" dirty="0" err="1" smtClean="0"/>
-              <a:t>UnityEngine.WSA.Toast</a:t>
-            </a:r>
-            <a:endParaRPr lang="en-AU" dirty="0" smtClean="0"/>
-          </a:p>
-          <a:p>
-            <a:pPr lvl="1"/>
-            <a:endParaRPr lang="en-AU" dirty="0"/>
-          </a:p>
-          <a:p>
-            <a:r>
-              <a:rPr lang="en-AU" dirty="0" err="1" smtClean="0"/>
-              <a:t>UnityEngine.Windows.LicenseInformation</a:t>
-            </a:r>
-            <a:endParaRPr lang="en-AU" dirty="0" smtClean="0"/>
-          </a:p>
-          <a:p>
-            <a:pPr lvl="1"/>
-            <a:r>
-              <a:rPr lang="en-AU" dirty="0" smtClean="0"/>
-              <a:t>.</a:t>
-            </a:r>
-            <a:r>
-              <a:rPr lang="en-AU" dirty="0" err="1" smtClean="0"/>
-              <a:t>IsOnAppTrial</a:t>
-            </a:r>
-            <a:endParaRPr lang="en-AU" dirty="0" smtClean="0"/>
-          </a:p>
-          <a:p>
-            <a:pPr lvl="1"/>
-            <a:r>
-              <a:rPr lang="en-AU" dirty="0" err="1" smtClean="0"/>
-              <a:t>PurchaseApp</a:t>
-            </a:r>
-            <a:r>
-              <a:rPr lang="en-AU" dirty="0" smtClean="0"/>
-              <a:t>()</a:t>
-            </a:r>
-            <a:endParaRPr lang="en-AU" dirty="0" smtClean="0"/>
-          </a:p>
-        </p:txBody>
-      </p:sp>
+      <p:pic>
+        <p:nvPicPr>
+          <p:cNvPr id="4" name="Picture 3" descr="UnityDemo - Microsoft Visual Studio"/>
+          <p:cNvPicPr>
+            <a:picLocks noChangeAspect="1"/>
+          </p:cNvPicPr>
+          <p:nvPr/>
+        </p:nvPicPr>
+        <p:blipFill rotWithShape="1">
+          <a:blip r:embed="rId3" cstate="print">
+            <a:extLst>
+              <a:ext uri="{28A0092B-C50C-407E-A947-70E740481C1C}">
+                <a14:useLocalDpi xmlns:a14="http://schemas.microsoft.com/office/drawing/2010/main" val="0"/>
+              </a:ext>
+            </a:extLst>
+          </a:blip>
+          <a:srcRect/>
+          <a:stretch/>
+        </p:blipFill>
+        <p:spPr>
+          <a:xfrm>
+            <a:off x="2757772" y="2159794"/>
+            <a:ext cx="6676456" cy="2538412"/>
+          </a:xfrm>
+          <a:prstGeom prst="rect">
+            <a:avLst/>
+          </a:prstGeom>
+        </p:spPr>
+      </p:pic>
     </p:spTree>
     <p:extLst>
       <p:ext uri="{BB962C8B-B14F-4D97-AF65-F5344CB8AC3E}">
-        <p14:creationId xmlns:p14="http://schemas.microsoft.com/office/powerpoint/2010/main" val="357982477"/>
+        <p14:creationId xmlns:p14="http://schemas.microsoft.com/office/powerpoint/2010/main" val="1855270958"/>
       </p:ext>
     </p:extLst>
   </p:cSld>
@@ -7856,7 +9066,11 @@
           <a:p>
             <a:r>
               <a:rPr lang="en-AU" dirty="0" smtClean="0"/>
-              <a:t>Cert – Privacy and Settings</a:t>
+              <a:t>Debugging Scripts with </a:t>
+            </a:r>
+            <a:r>
+              <a:rPr lang="en-AU" dirty="0" err="1" smtClean="0"/>
+              <a:t>WinRT</a:t>
             </a:r>
             <a:endParaRPr lang="en-AU" dirty="0"/>
           </a:p>
@@ -7879,55 +9093,107 @@
           <a:p>
             <a:r>
               <a:rPr lang="en-AU" dirty="0" smtClean="0"/>
-              <a:t>When you need a Privacy Policy:</a:t>
+              <a:t>Unity uses </a:t>
+            </a:r>
+            <a:r>
+              <a:rPr lang="en-AU" dirty="0" err="1" smtClean="0"/>
+              <a:t>WinRT</a:t>
+            </a:r>
+            <a:r>
+              <a:rPr lang="en-AU" dirty="0"/>
+              <a:t> </a:t>
+            </a:r>
+            <a:r>
+              <a:rPr lang="en-AU" dirty="0" smtClean="0"/>
+              <a:t>instead of Mono for Windows 8</a:t>
+            </a:r>
+          </a:p>
+          <a:p>
+            <a:r>
+              <a:rPr lang="en-AU" dirty="0" smtClean="0"/>
+              <a:t>Unity:</a:t>
             </a:r>
           </a:p>
           <a:p>
             <a:pPr lvl="1"/>
             <a:r>
               <a:rPr lang="en-AU" dirty="0" smtClean="0"/>
-              <a:t>When you collect personal information</a:t>
+              <a:t>Edit &gt; Sync </a:t>
+            </a:r>
+            <a:r>
+              <a:rPr lang="en-AU" dirty="0" err="1" smtClean="0"/>
+              <a:t>Monodevelop</a:t>
+            </a:r>
+            <a:r>
+              <a:rPr lang="en-AU" dirty="0" smtClean="0"/>
+              <a:t> Project(s)</a:t>
             </a:r>
           </a:p>
           <a:p>
             <a:pPr lvl="1"/>
             <a:r>
               <a:rPr lang="en-AU" dirty="0" smtClean="0"/>
-              <a:t>When you connect to the internet</a:t>
+              <a:t>Close </a:t>
+            </a:r>
+            <a:r>
+              <a:rPr lang="en-AU" dirty="0" err="1" smtClean="0"/>
+              <a:t>MonoDevelop</a:t>
+            </a:r>
+            <a:r>
+              <a:rPr lang="en-AU" dirty="0" smtClean="0"/>
+              <a:t> or Visual Studio</a:t>
+            </a:r>
+          </a:p>
+          <a:p>
+            <a:r>
+              <a:rPr lang="en-AU" dirty="0" smtClean="0"/>
+              <a:t>Visual Studio (Built Solution):</a:t>
+            </a:r>
+          </a:p>
+          <a:p>
+            <a:pPr lvl="1"/>
+            <a:r>
+              <a:rPr lang="en-AU" dirty="0" smtClean="0"/>
+              <a:t>Add Existing Project &gt; Select the generated .</a:t>
+            </a:r>
+            <a:r>
+              <a:rPr lang="en-AU" dirty="0" err="1" smtClean="0"/>
+              <a:t>csproj</a:t>
+            </a:r>
+            <a:r>
+              <a:rPr lang="en-AU" dirty="0" smtClean="0"/>
+              <a:t> file</a:t>
             </a:r>
           </a:p>
           <a:p>
             <a:pPr lvl="2"/>
             <a:r>
-              <a:rPr lang="en-AU" dirty="0" smtClean="0"/>
-              <a:t>IP Addresses are considered personally identifiable</a:t>
+              <a:rPr lang="en-AU" dirty="0" err="1"/>
+              <a:t>f</a:t>
+            </a:r>
+            <a:r>
+              <a:rPr lang="en-AU" dirty="0" err="1" smtClean="0"/>
+              <a:t>irstpass</a:t>
+            </a:r>
+            <a:r>
+              <a:rPr lang="en-AU" dirty="0" smtClean="0"/>
+              <a:t> = plugins folder</a:t>
+            </a:r>
+          </a:p>
+          <a:p>
+            <a:pPr lvl="1"/>
+            <a:r>
+              <a:rPr lang="en-AU" dirty="0" smtClean="0"/>
+              <a:t>F5/Debug</a:t>
             </a:r>
             <a:endParaRPr lang="en-AU" dirty="0"/>
-          </a:p>
-          <a:p>
-            <a:r>
-              <a:rPr lang="en-AU" dirty="0" smtClean="0"/>
-              <a:t>Place this online at a URL that does not change</a:t>
-            </a:r>
-          </a:p>
-          <a:p>
-            <a:r>
-              <a:rPr lang="en-AU" dirty="0" smtClean="0"/>
-              <a:t>Add link to the store dashboard</a:t>
-            </a:r>
-          </a:p>
-          <a:p>
-            <a:r>
-              <a:rPr lang="en-AU" dirty="0" smtClean="0"/>
-              <a:t>Add link to app settings</a:t>
-            </a:r>
           </a:p>
         </p:txBody>
       </p:sp>
     </p:spTree>
     <p:extLst>
       <p:ext uri="{BB962C8B-B14F-4D97-AF65-F5344CB8AC3E}">
-        <p14:creationId xmlns:p14="http://schemas.microsoft.com/office/powerpoint/2010/main" val="1562890118"/>
+        <p14:creationId xmlns:p14="http://schemas.microsoft.com/office/powerpoint/2010/main" val="2619712675"/>
       </p:ext>
     </p:extLst>
   </p:cSld>
@@ -7970,10 +9236,10 @@
           <a:lstStyle/>
           <a:p>
             <a:r>
-              <a:rPr lang="en-US" dirty="0" smtClean="0"/>
-              <a:t>App Settings</a:t>
-            </a:r>
-            <a:endParaRPr lang="en-US" dirty="0"/>
+              <a:rPr lang="en-AU" dirty="0" smtClean="0"/>
+              <a:t>Editing Scripts Without Rebuilding</a:t>
+            </a:r>
+            <a:endParaRPr lang="en-AU" dirty="0"/>
           </a:p>
         </p:txBody>
       </p:sp>
@@ -7993,17 +9259,78 @@
           <a:lstStyle/>
           <a:p>
             <a:r>
-              <a:rPr lang="en-US" dirty="0" smtClean="0"/>
-              <a:t>CODE SAMPLE HERE</a:t>
-            </a:r>
-            <a:endParaRPr lang="en-US" dirty="0"/>
+              <a:rPr lang="en-AU" dirty="0" smtClean="0"/>
+              <a:t>Windows Store Apps only</a:t>
+            </a:r>
+          </a:p>
+          <a:p>
+            <a:r>
+              <a:rPr lang="en-AU" dirty="0" smtClean="0"/>
+              <a:t>When building, select Unity C# Projects</a:t>
+            </a:r>
+          </a:p>
+          <a:p>
+            <a:r>
+              <a:rPr lang="en-AU" dirty="0" smtClean="0"/>
+              <a:t>Output solution has script projects</a:t>
+            </a:r>
+          </a:p>
+          <a:p>
+            <a:r>
+              <a:rPr lang="en-AU" dirty="0" smtClean="0"/>
+              <a:t>Edit</a:t>
+            </a:r>
+            <a:r>
+              <a:rPr lang="en-AU" smtClean="0"/>
+              <a:t>, F5, Profit</a:t>
+            </a:r>
+            <a:endParaRPr lang="en-AU" dirty="0" smtClean="0"/>
+          </a:p>
+          <a:p>
+            <a:endParaRPr lang="en-AU" dirty="0"/>
+          </a:p>
+          <a:p>
+            <a:r>
+              <a:rPr lang="en-AU" dirty="0" smtClean="0"/>
+              <a:t>Caveat:</a:t>
+            </a:r>
+          </a:p>
+          <a:p>
+            <a:pPr lvl="1"/>
+            <a:r>
+              <a:rPr lang="en-AU" dirty="0" smtClean="0"/>
+              <a:t>Do not change any serialized properties</a:t>
+            </a:r>
+          </a:p>
+          <a:p>
+            <a:pPr lvl="2"/>
+            <a:r>
+              <a:rPr lang="en-AU" dirty="0" smtClean="0"/>
+              <a:t>Public</a:t>
+            </a:r>
+          </a:p>
+          <a:p>
+            <a:pPr lvl="2"/>
+            <a:r>
+              <a:rPr lang="en-AU" dirty="0" smtClean="0"/>
+              <a:t>[</a:t>
+            </a:r>
+            <a:r>
+              <a:rPr lang="en-AU" dirty="0" err="1" smtClean="0"/>
+              <a:t>Serializable</a:t>
+            </a:r>
+            <a:r>
+              <a:rPr lang="en-AU" dirty="0" smtClean="0"/>
+              <a:t>]</a:t>
+            </a:r>
+            <a:endParaRPr lang="en-AU" dirty="0"/>
           </a:p>
         </p:txBody>
       </p:sp>
     </p:spTree>
     <p:extLst>
       <p:ext uri="{BB962C8B-B14F-4D97-AF65-F5344CB8AC3E}">
-        <p14:creationId xmlns:p14="http://schemas.microsoft.com/office/powerpoint/2010/main" val="3745320194"/>
+        <p14:creationId xmlns:p14="http://schemas.microsoft.com/office/powerpoint/2010/main" val="3332073422"/>
       </p:ext>
     </p:extLst>
   </p:cSld>
@@ -8046,12 +9373,8 @@
           <a:lstStyle/>
           <a:p>
             <a:r>
-              <a:rPr lang="en-AU" dirty="0" smtClean="0"/>
-              <a:t>Cert – </a:t>
-            </a:r>
-            <a:r>
-              <a:rPr lang="en-AU" dirty="0" smtClean="0"/>
-              <a:t>Icons</a:t>
+              <a:rPr lang="en-AU" dirty="0" err="1" smtClean="0"/>
+              <a:t>UnityEngine.WSA</a:t>
             </a:r>
             <a:endParaRPr lang="en-AU" dirty="0"/>
           </a:p>
@@ -8069,95 +9392,92 @@
         </p:nvSpPr>
         <p:spPr/>
         <p:txBody>
-          <a:bodyPr/>
-          <a:lstStyle/>
-          <a:p>
-            <a:r>
-              <a:rPr lang="en-AU" dirty="0" smtClean="0"/>
-              <a:t>Icons</a:t>
+          <a:bodyPr>
+            <a:normAutofit lnSpcReduction="10000"/>
+          </a:bodyPr>
+          <a:lstStyle/>
+          <a:p>
+            <a:r>
+              <a:rPr lang="en-AU" dirty="0" smtClean="0"/>
+              <a:t>Namespace for Windows Store App integration points</a:t>
+            </a:r>
+          </a:p>
+          <a:p>
+            <a:r>
+              <a:rPr lang="en-AU" dirty="0" smtClean="0"/>
+              <a:t>More being added all the time by Unity</a:t>
+            </a:r>
+          </a:p>
+          <a:p>
+            <a:r>
+              <a:rPr lang="en-AU" dirty="0" smtClean="0"/>
+              <a:t>Can use this or your own plugin</a:t>
             </a:r>
           </a:p>
           <a:p>
             <a:pPr lvl="1"/>
             <a:r>
-              <a:rPr lang="en-AU" dirty="0" smtClean="0"/>
-              <a:t>Store </a:t>
-            </a:r>
-            <a:r>
-              <a:rPr lang="en-AU" dirty="0" smtClean="0"/>
-              <a:t>Icon (50x50)</a:t>
+              <a:rPr lang="en-AU" dirty="0" err="1" smtClean="0"/>
+              <a:t>UnityEngine.WSA.Tile</a:t>
             </a:r>
             <a:endParaRPr lang="en-AU" dirty="0" smtClean="0"/>
           </a:p>
           <a:p>
             <a:pPr lvl="1"/>
             <a:r>
-              <a:rPr lang="en-AU" dirty="0" smtClean="0"/>
-              <a:t>Medium </a:t>
-            </a:r>
-            <a:r>
-              <a:rPr lang="en-AU" dirty="0" smtClean="0"/>
-              <a:t>Tile (150x150)</a:t>
+              <a:rPr lang="en-AU" dirty="0" err="1" smtClean="0"/>
+              <a:t>UnityEngine.WSA.SecondaryTile</a:t>
             </a:r>
             <a:endParaRPr lang="en-AU" dirty="0" smtClean="0"/>
           </a:p>
           <a:p>
             <a:pPr lvl="1"/>
             <a:r>
-              <a:rPr lang="en-AU" dirty="0" smtClean="0"/>
-              <a:t>Small </a:t>
-            </a:r>
-            <a:r>
-              <a:rPr lang="en-AU" dirty="0" smtClean="0"/>
-              <a:t>Tile (70x70)</a:t>
-            </a:r>
+              <a:rPr lang="en-AU" dirty="0" err="1" smtClean="0"/>
+              <a:t>UnityEngine.WSA.Toast</a:t>
+            </a:r>
+            <a:endParaRPr lang="en-AU" dirty="0" smtClean="0"/>
           </a:p>
           <a:p>
             <a:pPr lvl="1"/>
-            <a:r>
-              <a:rPr lang="en-AU" dirty="0" smtClean="0"/>
-              <a:t>Wide (310x150)</a:t>
-            </a:r>
+            <a:endParaRPr lang="en-AU" dirty="0"/>
+          </a:p>
+          <a:p>
+            <a:r>
+              <a:rPr lang="en-AU" dirty="0" err="1" smtClean="0"/>
+              <a:t>UnityEngine.Windows.LicenseInformation</a:t>
+            </a:r>
+            <a:endParaRPr lang="en-AU" dirty="0" smtClean="0"/>
           </a:p>
           <a:p>
             <a:pPr lvl="1"/>
             <a:r>
               <a:rPr lang="en-AU" dirty="0" smtClean="0"/>
-              <a:t>Large (310x310)</a:t>
-            </a:r>
+              <a:t>.</a:t>
+            </a:r>
+            <a:r>
+              <a:rPr lang="en-AU" dirty="0" err="1" smtClean="0"/>
+              <a:t>IsOnAppTrial</a:t>
+            </a:r>
+            <a:endParaRPr lang="en-AU" dirty="0" smtClean="0"/>
           </a:p>
           <a:p>
             <a:pPr lvl="1"/>
             <a:r>
-              <a:rPr lang="en-AU" dirty="0" smtClean="0"/>
-              <a:t>Square (30x30)</a:t>
-            </a:r>
-            <a:endParaRPr lang="en-AU" dirty="0"/>
-          </a:p>
-          <a:p>
-            <a:r>
-              <a:rPr lang="en-AU" dirty="0" smtClean="0"/>
-              <a:t>Splash </a:t>
-            </a:r>
-            <a:r>
-              <a:rPr lang="en-AU" dirty="0" smtClean="0"/>
-              <a:t>Screen (620x300)</a:t>
-            </a:r>
-          </a:p>
-          <a:p>
-            <a:pPr lvl="1"/>
-            <a:r>
-              <a:rPr lang="en-AU" dirty="0" smtClean="0"/>
-              <a:t>Rest of screen is filled with a specified colour</a:t>
-            </a:r>
-            <a:endParaRPr lang="en-AU" dirty="0"/>
+              <a:rPr lang="en-AU" dirty="0" err="1" smtClean="0"/>
+              <a:t>PurchaseApp</a:t>
+            </a:r>
+            <a:r>
+              <a:rPr lang="en-AU" dirty="0" smtClean="0"/>
+              <a:t>()</a:t>
+            </a:r>
           </a:p>
         </p:txBody>
       </p:sp>
     </p:spTree>
     <p:extLst>
       <p:ext uri="{BB962C8B-B14F-4D97-AF65-F5344CB8AC3E}">
-        <p14:creationId xmlns:p14="http://schemas.microsoft.com/office/powerpoint/2010/main" val="2438723005"/>
+        <p14:creationId xmlns:p14="http://schemas.microsoft.com/office/powerpoint/2010/main" val="357982477"/>
       </p:ext>
     </p:extLst>
   </p:cSld>
@@ -8186,7 +9506,7 @@
       </p:grpSpPr>
       <p:sp>
         <p:nvSpPr>
-          <p:cNvPr id="4" name="Title 3"/>
+          <p:cNvPr id="2" name="Title 1"/>
           <p:cNvSpPr>
             <a:spLocks noGrp="1"/>
           </p:cNvSpPr>
@@ -8201,7 +9521,7 @@
           <a:p>
             <a:r>
               <a:rPr lang="en-AU" dirty="0" smtClean="0"/>
-              <a:t>Let’s Finish a Game</a:t>
+              <a:t>Cert – Privacy and Settings</a:t>
             </a:r>
             <a:endParaRPr lang="en-AU" dirty="0"/>
           </a:p>
@@ -8209,31 +9529,70 @@
       </p:sp>
       <p:sp>
         <p:nvSpPr>
-          <p:cNvPr id="5" name="Text Placeholder 4"/>
-          <p:cNvSpPr>
-            <a:spLocks noGrp="1"/>
-          </p:cNvSpPr>
-          <p:nvPr>
-            <p:ph type="body" idx="1"/>
-          </p:nvPr>
-        </p:nvSpPr>
-        <p:spPr/>
-        <p:txBody>
-          <a:bodyPr/>
-          <a:lstStyle/>
-          <a:p>
-            <a:r>
-              <a:rPr lang="en-AU" dirty="0" smtClean="0"/>
-              <a:t>Demo Part 2</a:t>
+          <p:cNvPr id="3" name="Content Placeholder 2"/>
+          <p:cNvSpPr>
+            <a:spLocks noGrp="1"/>
+          </p:cNvSpPr>
+          <p:nvPr>
+            <p:ph idx="1"/>
+          </p:nvPr>
+        </p:nvSpPr>
+        <p:spPr/>
+        <p:txBody>
+          <a:bodyPr/>
+          <a:lstStyle/>
+          <a:p>
+            <a:r>
+              <a:rPr lang="en-AU" dirty="0" smtClean="0"/>
+              <a:t>When you need a Privacy Policy:</a:t>
+            </a:r>
+          </a:p>
+          <a:p>
+            <a:pPr lvl="1"/>
+            <a:r>
+              <a:rPr lang="en-AU" dirty="0" smtClean="0"/>
+              <a:t>When you collect personal information</a:t>
+            </a:r>
+          </a:p>
+          <a:p>
+            <a:pPr lvl="1"/>
+            <a:r>
+              <a:rPr lang="en-AU" dirty="0" smtClean="0"/>
+              <a:t>When you connect to the internet</a:t>
+            </a:r>
+          </a:p>
+          <a:p>
+            <a:pPr lvl="2"/>
+            <a:r>
+              <a:rPr lang="en-AU" dirty="0" smtClean="0"/>
+              <a:t>IP Addresses are considered personally identifiable</a:t>
             </a:r>
             <a:endParaRPr lang="en-AU" dirty="0"/>
+          </a:p>
+          <a:p>
+            <a:r>
+              <a:rPr lang="en-AU" dirty="0" smtClean="0"/>
+              <a:t>Place this online at a URL that does not change</a:t>
+            </a:r>
+          </a:p>
+          <a:p>
+            <a:r>
+              <a:rPr lang="en-AU" dirty="0" smtClean="0"/>
+              <a:t>Add link to the store dashboard</a:t>
+            </a:r>
+          </a:p>
+          <a:p>
+            <a:r>
+              <a:rPr lang="en-AU" dirty="0" smtClean="0"/>
+              <a:t>Add link to app settings</a:t>
+            </a:r>
           </a:p>
         </p:txBody>
       </p:sp>
     </p:spTree>
     <p:extLst>
       <p:ext uri="{BB962C8B-B14F-4D97-AF65-F5344CB8AC3E}">
-        <p14:creationId xmlns:p14="http://schemas.microsoft.com/office/powerpoint/2010/main" val="1641751476"/>
+        <p14:creationId xmlns:p14="http://schemas.microsoft.com/office/powerpoint/2010/main" val="1562890118"/>
       </p:ext>
     </p:extLst>
   </p:cSld>
@@ -8262,7 +9621,7 @@
       </p:grpSpPr>
       <p:sp>
         <p:nvSpPr>
-          <p:cNvPr id="4" name="Title 3"/>
+          <p:cNvPr id="2" name="Title 1"/>
           <p:cNvSpPr>
             <a:spLocks noGrp="1"/>
           </p:cNvSpPr>
@@ -8277,7 +9636,7 @@
           <a:p>
             <a:r>
               <a:rPr lang="en-US" dirty="0" smtClean="0"/>
-              <a:t>Further Reading</a:t>
+              <a:t>App Settings</a:t>
             </a:r>
             <a:endParaRPr lang="en-US" dirty="0"/>
           </a:p>
@@ -8285,7 +9644,7 @@
       </p:sp>
       <p:sp>
         <p:nvSpPr>
-          <p:cNvPr id="5" name="Content Placeholder 4"/>
+          <p:cNvPr id="3" name="Content Placeholder 2"/>
           <p:cNvSpPr>
             <a:spLocks noGrp="1"/>
           </p:cNvSpPr>
@@ -8300,19 +9659,8 @@
           <a:p>
             <a:r>
               <a:rPr lang="en-US" dirty="0" smtClean="0"/>
-              <a:t>http://unity3d.com/learn</a:t>
-            </a:r>
-          </a:p>
-          <a:p>
-            <a:r>
-              <a:rPr lang="en-US" dirty="0" smtClean="0"/>
-              <a:t>http://unity3d.com/pages/windows</a:t>
-            </a:r>
-          </a:p>
-          <a:p>
-            <a:pPr marL="0" indent="0">
-              <a:buNone/>
-            </a:pPr>
+              <a:t>CODE SAMPLE HERE</a:t>
+            </a:r>
             <a:endParaRPr lang="en-US" dirty="0"/>
           </a:p>
         </p:txBody>
@@ -8320,7 +9668,7 @@
     </p:spTree>
     <p:extLst>
       <p:ext uri="{BB962C8B-B14F-4D97-AF65-F5344CB8AC3E}">
-        <p14:creationId xmlns:p14="http://schemas.microsoft.com/office/powerpoint/2010/main" val="3633209509"/>
+        <p14:creationId xmlns:p14="http://schemas.microsoft.com/office/powerpoint/2010/main" val="3745320194"/>
       </p:ext>
     </p:extLst>
   </p:cSld>
@@ -8449,6 +9797,414 @@
     <p:extLst>
       <p:ext uri="{BB962C8B-B14F-4D97-AF65-F5344CB8AC3E}">
         <p14:creationId xmlns:p14="http://schemas.microsoft.com/office/powerpoint/2010/main" val="2683337612"/>
+      </p:ext>
+    </p:extLst>
+  </p:cSld>
+  <p:clrMapOvr>
+    <a:masterClrMapping/>
+  </p:clrMapOvr>
+</p:sld>
+</file>
+
+<file path=ppt/slides/slide40.xml><?xml version="1.0" encoding="utf-8"?>
+<p:sld xmlns:a="http://schemas.openxmlformats.org/drawingml/2006/main" xmlns:r="http://schemas.openxmlformats.org/officeDocument/2006/relationships" xmlns:p="http://schemas.openxmlformats.org/presentationml/2006/main">
+  <p:cSld>
+    <p:spTree>
+      <p:nvGrpSpPr>
+        <p:cNvPr id="1" name=""/>
+        <p:cNvGrpSpPr/>
+        <p:nvPr/>
+      </p:nvGrpSpPr>
+      <p:grpSpPr>
+        <a:xfrm>
+          <a:off x="0" y="0"/>
+          <a:ext cx="0" cy="0"/>
+          <a:chOff x="0" y="0"/>
+          <a:chExt cx="0" cy="0"/>
+        </a:xfrm>
+      </p:grpSpPr>
+      <p:sp>
+        <p:nvSpPr>
+          <p:cNvPr id="2" name="Title 1"/>
+          <p:cNvSpPr>
+            <a:spLocks noGrp="1"/>
+          </p:cNvSpPr>
+          <p:nvPr>
+            <p:ph type="title"/>
+          </p:nvPr>
+        </p:nvSpPr>
+        <p:spPr/>
+        <p:txBody>
+          <a:bodyPr/>
+          <a:lstStyle/>
+          <a:p>
+            <a:r>
+              <a:rPr lang="en-AU" dirty="0" smtClean="0"/>
+              <a:t>Cert – Icons</a:t>
+            </a:r>
+            <a:endParaRPr lang="en-AU" dirty="0"/>
+          </a:p>
+        </p:txBody>
+      </p:sp>
+      <p:sp>
+        <p:nvSpPr>
+          <p:cNvPr id="3" name="Content Placeholder 2"/>
+          <p:cNvSpPr>
+            <a:spLocks noGrp="1"/>
+          </p:cNvSpPr>
+          <p:nvPr>
+            <p:ph idx="1"/>
+          </p:nvPr>
+        </p:nvSpPr>
+        <p:spPr/>
+        <p:txBody>
+          <a:bodyPr/>
+          <a:lstStyle/>
+          <a:p>
+            <a:r>
+              <a:rPr lang="en-AU" dirty="0" smtClean="0"/>
+              <a:t>Icons</a:t>
+            </a:r>
+          </a:p>
+          <a:p>
+            <a:pPr lvl="1"/>
+            <a:r>
+              <a:rPr lang="en-AU" dirty="0" smtClean="0"/>
+              <a:t>Store Icon (50x50)</a:t>
+            </a:r>
+          </a:p>
+          <a:p>
+            <a:pPr lvl="1"/>
+            <a:r>
+              <a:rPr lang="en-AU" dirty="0" smtClean="0"/>
+              <a:t>Medium Tile (150x150)</a:t>
+            </a:r>
+          </a:p>
+          <a:p>
+            <a:pPr lvl="1"/>
+            <a:r>
+              <a:rPr lang="en-AU" dirty="0" smtClean="0"/>
+              <a:t>Small Tile (70x70)</a:t>
+            </a:r>
+          </a:p>
+          <a:p>
+            <a:pPr lvl="1"/>
+            <a:r>
+              <a:rPr lang="en-AU" dirty="0" smtClean="0"/>
+              <a:t>Wide (310x150)</a:t>
+            </a:r>
+          </a:p>
+          <a:p>
+            <a:pPr lvl="1"/>
+            <a:r>
+              <a:rPr lang="en-AU" dirty="0" smtClean="0"/>
+              <a:t>Large (310x310)</a:t>
+            </a:r>
+          </a:p>
+          <a:p>
+            <a:pPr lvl="1"/>
+            <a:r>
+              <a:rPr lang="en-AU" dirty="0" smtClean="0"/>
+              <a:t>Square (30x30)</a:t>
+            </a:r>
+            <a:endParaRPr lang="en-AU" dirty="0"/>
+          </a:p>
+          <a:p>
+            <a:r>
+              <a:rPr lang="en-AU" dirty="0" smtClean="0"/>
+              <a:t>Splash Screen (620x300)</a:t>
+            </a:r>
+          </a:p>
+          <a:p>
+            <a:pPr lvl="1"/>
+            <a:r>
+              <a:rPr lang="en-AU" dirty="0" smtClean="0"/>
+              <a:t>Rest of screen is filled with a specified colour</a:t>
+            </a:r>
+            <a:endParaRPr lang="en-AU" dirty="0"/>
+          </a:p>
+        </p:txBody>
+      </p:sp>
+    </p:spTree>
+    <p:extLst>
+      <p:ext uri="{BB962C8B-B14F-4D97-AF65-F5344CB8AC3E}">
+        <p14:creationId xmlns:p14="http://schemas.microsoft.com/office/powerpoint/2010/main" val="2438723005"/>
+      </p:ext>
+    </p:extLst>
+  </p:cSld>
+  <p:clrMapOvr>
+    <a:masterClrMapping/>
+  </p:clrMapOvr>
+</p:sld>
+</file>
+
+<file path=ppt/slides/slide41.xml><?xml version="1.0" encoding="utf-8"?>
+<p:sld xmlns:a="http://schemas.openxmlformats.org/drawingml/2006/main" xmlns:r="http://schemas.openxmlformats.org/officeDocument/2006/relationships" xmlns:p="http://schemas.openxmlformats.org/presentationml/2006/main">
+  <p:cSld>
+    <p:spTree>
+      <p:nvGrpSpPr>
+        <p:cNvPr id="1" name=""/>
+        <p:cNvGrpSpPr/>
+        <p:nvPr/>
+      </p:nvGrpSpPr>
+      <p:grpSpPr>
+        <a:xfrm>
+          <a:off x="0" y="0"/>
+          <a:ext cx="0" cy="0"/>
+          <a:chOff x="0" y="0"/>
+          <a:chExt cx="0" cy="0"/>
+        </a:xfrm>
+      </p:grpSpPr>
+      <p:sp>
+        <p:nvSpPr>
+          <p:cNvPr id="2" name="Title 1"/>
+          <p:cNvSpPr>
+            <a:spLocks noGrp="1"/>
+          </p:cNvSpPr>
+          <p:nvPr>
+            <p:ph type="title"/>
+          </p:nvPr>
+        </p:nvSpPr>
+        <p:spPr/>
+        <p:txBody>
+          <a:bodyPr/>
+          <a:lstStyle/>
+          <a:p>
+            <a:r>
+              <a:rPr lang="en-AU" dirty="0" smtClean="0"/>
+              <a:t>Platform Macros</a:t>
+            </a:r>
+            <a:endParaRPr lang="en-AU" dirty="0"/>
+          </a:p>
+        </p:txBody>
+      </p:sp>
+      <p:sp>
+        <p:nvSpPr>
+          <p:cNvPr id="3" name="Content Placeholder 2"/>
+          <p:cNvSpPr>
+            <a:spLocks noGrp="1"/>
+          </p:cNvSpPr>
+          <p:nvPr>
+            <p:ph idx="1"/>
+          </p:nvPr>
+        </p:nvSpPr>
+        <p:spPr/>
+        <p:txBody>
+          <a:bodyPr>
+            <a:normAutofit/>
+          </a:bodyPr>
+          <a:lstStyle/>
+          <a:p>
+            <a:r>
+              <a:rPr lang="en-AU" dirty="0" smtClean="0"/>
+              <a:t>Conditional compilation based on chosen platform</a:t>
+            </a:r>
+          </a:p>
+          <a:p>
+            <a:r>
+              <a:rPr lang="en-AU" dirty="0" smtClean="0"/>
+              <a:t>Platform specific macros exist in the editor</a:t>
+            </a:r>
+          </a:p>
+          <a:p>
+            <a:pPr marL="0" indent="0">
+              <a:buNone/>
+            </a:pPr>
+            <a:endParaRPr lang="en-AU" dirty="0"/>
+          </a:p>
+          <a:p>
+            <a:r>
+              <a:rPr lang="en-AU" dirty="0" smtClean="0"/>
+              <a:t>Windows 8: UNITY_METRO</a:t>
+            </a:r>
+          </a:p>
+          <a:p>
+            <a:r>
+              <a:rPr lang="en-AU" dirty="0" smtClean="0"/>
+              <a:t>Windows Phone 8: UNITY_WP8</a:t>
+            </a:r>
+          </a:p>
+          <a:p>
+            <a:r>
+              <a:rPr lang="en-AU" dirty="0" smtClean="0"/>
+              <a:t>Combined: UNITY_WINRT</a:t>
+            </a:r>
+          </a:p>
+          <a:p>
+            <a:r>
+              <a:rPr lang="en-AU" dirty="0" smtClean="0"/>
+              <a:t>Editor: UNITY_EDITOR</a:t>
+            </a:r>
+          </a:p>
+        </p:txBody>
+      </p:sp>
+    </p:spTree>
+    <p:extLst>
+      <p:ext uri="{BB962C8B-B14F-4D97-AF65-F5344CB8AC3E}">
+        <p14:creationId xmlns:p14="http://schemas.microsoft.com/office/powerpoint/2010/main" val="2516529684"/>
+      </p:ext>
+    </p:extLst>
+  </p:cSld>
+  <p:clrMapOvr>
+    <a:masterClrMapping/>
+  </p:clrMapOvr>
+</p:sld>
+</file>
+
+<file path=ppt/slides/slide42.xml><?xml version="1.0" encoding="utf-8"?>
+<p:sld xmlns:a="http://schemas.openxmlformats.org/drawingml/2006/main" xmlns:r="http://schemas.openxmlformats.org/officeDocument/2006/relationships" xmlns:p="http://schemas.openxmlformats.org/presentationml/2006/main">
+  <p:cSld>
+    <p:spTree>
+      <p:nvGrpSpPr>
+        <p:cNvPr id="1" name=""/>
+        <p:cNvGrpSpPr/>
+        <p:nvPr/>
+      </p:nvGrpSpPr>
+      <p:grpSpPr>
+        <a:xfrm>
+          <a:off x="0" y="0"/>
+          <a:ext cx="0" cy="0"/>
+          <a:chOff x="0" y="0"/>
+          <a:chExt cx="0" cy="0"/>
+        </a:xfrm>
+      </p:grpSpPr>
+      <p:sp>
+        <p:nvSpPr>
+          <p:cNvPr id="4" name="Title 3"/>
+          <p:cNvSpPr>
+            <a:spLocks noGrp="1"/>
+          </p:cNvSpPr>
+          <p:nvPr>
+            <p:ph type="title"/>
+          </p:nvPr>
+        </p:nvSpPr>
+        <p:spPr/>
+        <p:txBody>
+          <a:bodyPr/>
+          <a:lstStyle/>
+          <a:p>
+            <a:r>
+              <a:rPr lang="en-AU" dirty="0" smtClean="0"/>
+              <a:t>Let’s Finish a Game</a:t>
+            </a:r>
+            <a:endParaRPr lang="en-AU" dirty="0"/>
+          </a:p>
+        </p:txBody>
+      </p:sp>
+      <p:sp>
+        <p:nvSpPr>
+          <p:cNvPr id="5" name="Text Placeholder 4"/>
+          <p:cNvSpPr>
+            <a:spLocks noGrp="1"/>
+          </p:cNvSpPr>
+          <p:nvPr>
+            <p:ph type="body" idx="1"/>
+          </p:nvPr>
+        </p:nvSpPr>
+        <p:spPr/>
+        <p:txBody>
+          <a:bodyPr/>
+          <a:lstStyle/>
+          <a:p>
+            <a:r>
+              <a:rPr lang="en-AU" dirty="0" smtClean="0"/>
+              <a:t>Demo Part 2</a:t>
+            </a:r>
+            <a:endParaRPr lang="en-AU" dirty="0"/>
+          </a:p>
+        </p:txBody>
+      </p:sp>
+    </p:spTree>
+    <p:extLst>
+      <p:ext uri="{BB962C8B-B14F-4D97-AF65-F5344CB8AC3E}">
+        <p14:creationId xmlns:p14="http://schemas.microsoft.com/office/powerpoint/2010/main" val="1641751476"/>
+      </p:ext>
+    </p:extLst>
+  </p:cSld>
+  <p:clrMapOvr>
+    <a:masterClrMapping/>
+  </p:clrMapOvr>
+</p:sld>
+</file>
+
+<file path=ppt/slides/slide43.xml><?xml version="1.0" encoding="utf-8"?>
+<p:sld xmlns:a="http://schemas.openxmlformats.org/drawingml/2006/main" xmlns:r="http://schemas.openxmlformats.org/officeDocument/2006/relationships" xmlns:p="http://schemas.openxmlformats.org/presentationml/2006/main">
+  <p:cSld>
+    <p:spTree>
+      <p:nvGrpSpPr>
+        <p:cNvPr id="1" name=""/>
+        <p:cNvGrpSpPr/>
+        <p:nvPr/>
+      </p:nvGrpSpPr>
+      <p:grpSpPr>
+        <a:xfrm>
+          <a:off x="0" y="0"/>
+          <a:ext cx="0" cy="0"/>
+          <a:chOff x="0" y="0"/>
+          <a:chExt cx="0" cy="0"/>
+        </a:xfrm>
+      </p:grpSpPr>
+      <p:sp>
+        <p:nvSpPr>
+          <p:cNvPr id="4" name="Title 3"/>
+          <p:cNvSpPr>
+            <a:spLocks noGrp="1"/>
+          </p:cNvSpPr>
+          <p:nvPr>
+            <p:ph type="title"/>
+          </p:nvPr>
+        </p:nvSpPr>
+        <p:spPr/>
+        <p:txBody>
+          <a:bodyPr/>
+          <a:lstStyle/>
+          <a:p>
+            <a:r>
+              <a:rPr lang="en-US" dirty="0" smtClean="0"/>
+              <a:t>Further Reading</a:t>
+            </a:r>
+            <a:endParaRPr lang="en-US" dirty="0"/>
+          </a:p>
+        </p:txBody>
+      </p:sp>
+      <p:sp>
+        <p:nvSpPr>
+          <p:cNvPr id="5" name="Content Placeholder 4"/>
+          <p:cNvSpPr>
+            <a:spLocks noGrp="1"/>
+          </p:cNvSpPr>
+          <p:nvPr>
+            <p:ph idx="1"/>
+          </p:nvPr>
+        </p:nvSpPr>
+        <p:spPr/>
+        <p:txBody>
+          <a:bodyPr/>
+          <a:lstStyle/>
+          <a:p>
+            <a:r>
+              <a:rPr lang="en-US" dirty="0" smtClean="0"/>
+              <a:t>http://unity3d.com/learn</a:t>
+            </a:r>
+          </a:p>
+          <a:p>
+            <a:r>
+              <a:rPr lang="en-US" dirty="0" smtClean="0"/>
+              <a:t>http://unity3d.com/pages/windows</a:t>
+            </a:r>
+          </a:p>
+          <a:p>
+            <a:pPr marL="0" indent="0">
+              <a:buNone/>
+            </a:pPr>
+            <a:endParaRPr lang="en-US" dirty="0"/>
+          </a:p>
+        </p:txBody>
+      </p:sp>
+    </p:spTree>
+    <p:extLst>
+      <p:ext uri="{BB962C8B-B14F-4D97-AF65-F5344CB8AC3E}">
+        <p14:creationId xmlns:p14="http://schemas.microsoft.com/office/powerpoint/2010/main" val="3633209509"/>
       </p:ext>
     </p:extLst>
   </p:cSld>

</xml_diff>